<commit_message>
updating puerto_rico_stoch for rivanna
</commit_message>
<xml_diff>
--- a/projects/puerto_rico_stoch/data/scenario_overview.pptx
+++ b/projects/puerto_rico_stoch/data/scenario_overview.pptx
@@ -6,6 +6,7 @@
   </p:sldMasterIdLst>
   <p:sldIdLst>
     <p:sldId id="257" r:id="rId2"/>
+    <p:sldId id="259" r:id="rId3"/>
   </p:sldIdLst>
   <p:sldSz cx="12192000" cy="6858000"/>
   <p:notesSz cx="6858000" cy="9144000"/>
@@ -154,10 +155,9 @@
           </a:lstStyle>
           <a:p>
             <a:r>
-              <a:rPr lang="en-US" smtClean="0"/>
+              <a:rPr lang="en-US"/>
               <a:t>Click to edit Master title style</a:t>
             </a:r>
-            <a:endParaRPr lang="en-US"/>
           </a:p>
         </p:txBody>
       </p:sp>
@@ -219,10 +219,9 @@
           </a:lstStyle>
           <a:p>
             <a:r>
-              <a:rPr lang="en-US" smtClean="0"/>
+              <a:rPr lang="en-US"/>
               <a:t>Click to edit Master subtitle style</a:t>
             </a:r>
-            <a:endParaRPr lang="en-US"/>
           </a:p>
         </p:txBody>
       </p:sp>
@@ -243,7 +242,7 @@
           <a:p>
             <a:fld id="{4E0D474A-36D6-42D7-8D99-A750CFDD9A60}" type="datetimeFigureOut">
               <a:rPr lang="en-US" smtClean="0"/>
-              <a:t>1/15/2020</a:t>
+              <a:t>3/19/2020</a:t>
             </a:fld>
             <a:endParaRPr lang="en-US"/>
           </a:p>
@@ -337,10 +336,9 @@
           <a:lstStyle/>
           <a:p>
             <a:r>
-              <a:rPr lang="en-US" smtClean="0"/>
+              <a:rPr lang="en-US"/>
               <a:t>Click to edit Master title style</a:t>
             </a:r>
-            <a:endParaRPr lang="en-US"/>
           </a:p>
         </p:txBody>
       </p:sp>
@@ -361,38 +359,37 @@
           <a:p>
             <a:pPr lvl="0"/>
             <a:r>
-              <a:rPr lang="en-US" smtClean="0"/>
+              <a:rPr lang="en-US"/>
               <a:t>Edit Master text styles</a:t>
             </a:r>
           </a:p>
           <a:p>
             <a:pPr lvl="1"/>
             <a:r>
-              <a:rPr lang="en-US" smtClean="0"/>
+              <a:rPr lang="en-US"/>
               <a:t>Second level</a:t>
             </a:r>
           </a:p>
           <a:p>
             <a:pPr lvl="2"/>
             <a:r>
-              <a:rPr lang="en-US" smtClean="0"/>
+              <a:rPr lang="en-US"/>
               <a:t>Third level</a:t>
             </a:r>
           </a:p>
           <a:p>
             <a:pPr lvl="3"/>
             <a:r>
-              <a:rPr lang="en-US" smtClean="0"/>
+              <a:rPr lang="en-US"/>
               <a:t>Fourth level</a:t>
             </a:r>
           </a:p>
           <a:p>
             <a:pPr lvl="4"/>
             <a:r>
-              <a:rPr lang="en-US" smtClean="0"/>
+              <a:rPr lang="en-US"/>
               <a:t>Fifth level</a:t>
             </a:r>
-            <a:endParaRPr lang="en-US"/>
           </a:p>
         </p:txBody>
       </p:sp>
@@ -413,7 +410,7 @@
           <a:p>
             <a:fld id="{4E0D474A-36D6-42D7-8D99-A750CFDD9A60}" type="datetimeFigureOut">
               <a:rPr lang="en-US" smtClean="0"/>
-              <a:t>1/15/2020</a:t>
+              <a:t>3/19/2020</a:t>
             </a:fld>
             <a:endParaRPr lang="en-US"/>
           </a:p>
@@ -512,10 +509,9 @@
           <a:lstStyle/>
           <a:p>
             <a:r>
-              <a:rPr lang="en-US" smtClean="0"/>
+              <a:rPr lang="en-US"/>
               <a:t>Click to edit Master title style</a:t>
             </a:r>
-            <a:endParaRPr lang="en-US"/>
           </a:p>
         </p:txBody>
       </p:sp>
@@ -541,38 +537,37 @@
           <a:p>
             <a:pPr lvl="0"/>
             <a:r>
-              <a:rPr lang="en-US" smtClean="0"/>
+              <a:rPr lang="en-US"/>
               <a:t>Edit Master text styles</a:t>
             </a:r>
           </a:p>
           <a:p>
             <a:pPr lvl="1"/>
             <a:r>
-              <a:rPr lang="en-US" smtClean="0"/>
+              <a:rPr lang="en-US"/>
               <a:t>Second level</a:t>
             </a:r>
           </a:p>
           <a:p>
             <a:pPr lvl="2"/>
             <a:r>
-              <a:rPr lang="en-US" smtClean="0"/>
+              <a:rPr lang="en-US"/>
               <a:t>Third level</a:t>
             </a:r>
           </a:p>
           <a:p>
             <a:pPr lvl="3"/>
             <a:r>
-              <a:rPr lang="en-US" smtClean="0"/>
+              <a:rPr lang="en-US"/>
               <a:t>Fourth level</a:t>
             </a:r>
           </a:p>
           <a:p>
             <a:pPr lvl="4"/>
             <a:r>
-              <a:rPr lang="en-US" smtClean="0"/>
+              <a:rPr lang="en-US"/>
               <a:t>Fifth level</a:t>
             </a:r>
-            <a:endParaRPr lang="en-US"/>
           </a:p>
         </p:txBody>
       </p:sp>
@@ -593,7 +588,7 @@
           <a:p>
             <a:fld id="{4E0D474A-36D6-42D7-8D99-A750CFDD9A60}" type="datetimeFigureOut">
               <a:rPr lang="en-US" smtClean="0"/>
-              <a:t>1/15/2020</a:t>
+              <a:t>3/19/2020</a:t>
             </a:fld>
             <a:endParaRPr lang="en-US"/>
           </a:p>
@@ -687,10 +682,9 @@
           <a:lstStyle/>
           <a:p>
             <a:r>
-              <a:rPr lang="en-US" smtClean="0"/>
+              <a:rPr lang="en-US"/>
               <a:t>Click to edit Master title style</a:t>
             </a:r>
-            <a:endParaRPr lang="en-US"/>
           </a:p>
         </p:txBody>
       </p:sp>
@@ -711,38 +705,37 @@
           <a:p>
             <a:pPr lvl="0"/>
             <a:r>
-              <a:rPr lang="en-US" smtClean="0"/>
+              <a:rPr lang="en-US"/>
               <a:t>Edit Master text styles</a:t>
             </a:r>
           </a:p>
           <a:p>
             <a:pPr lvl="1"/>
             <a:r>
-              <a:rPr lang="en-US" smtClean="0"/>
+              <a:rPr lang="en-US"/>
               <a:t>Second level</a:t>
             </a:r>
           </a:p>
           <a:p>
             <a:pPr lvl="2"/>
             <a:r>
-              <a:rPr lang="en-US" smtClean="0"/>
+              <a:rPr lang="en-US"/>
               <a:t>Third level</a:t>
             </a:r>
           </a:p>
           <a:p>
             <a:pPr lvl="3"/>
             <a:r>
-              <a:rPr lang="en-US" smtClean="0"/>
+              <a:rPr lang="en-US"/>
               <a:t>Fourth level</a:t>
             </a:r>
           </a:p>
           <a:p>
             <a:pPr lvl="4"/>
             <a:r>
-              <a:rPr lang="en-US" smtClean="0"/>
+              <a:rPr lang="en-US"/>
               <a:t>Fifth level</a:t>
             </a:r>
-            <a:endParaRPr lang="en-US"/>
           </a:p>
         </p:txBody>
       </p:sp>
@@ -763,7 +756,7 @@
           <a:p>
             <a:fld id="{4E0D474A-36D6-42D7-8D99-A750CFDD9A60}" type="datetimeFigureOut">
               <a:rPr lang="en-US" smtClean="0"/>
-              <a:t>1/15/2020</a:t>
+              <a:t>3/19/2020</a:t>
             </a:fld>
             <a:endParaRPr lang="en-US"/>
           </a:p>
@@ -866,10 +859,9 @@
           </a:lstStyle>
           <a:p>
             <a:r>
-              <a:rPr lang="en-US" smtClean="0"/>
+              <a:rPr lang="en-US"/>
               <a:t>Click to edit Master title style</a:t>
             </a:r>
-            <a:endParaRPr lang="en-US"/>
           </a:p>
         </p:txBody>
       </p:sp>
@@ -986,7 +978,7 @@
           <a:p>
             <a:pPr lvl="0"/>
             <a:r>
-              <a:rPr lang="en-US" smtClean="0"/>
+              <a:rPr lang="en-US"/>
               <a:t>Edit Master text styles</a:t>
             </a:r>
           </a:p>
@@ -1009,7 +1001,7 @@
           <a:p>
             <a:fld id="{4E0D474A-36D6-42D7-8D99-A750CFDD9A60}" type="datetimeFigureOut">
               <a:rPr lang="en-US" smtClean="0"/>
-              <a:t>1/15/2020</a:t>
+              <a:t>3/19/2020</a:t>
             </a:fld>
             <a:endParaRPr lang="en-US"/>
           </a:p>
@@ -1103,10 +1095,9 @@
           <a:lstStyle/>
           <a:p>
             <a:r>
-              <a:rPr lang="en-US" smtClean="0"/>
+              <a:rPr lang="en-US"/>
               <a:t>Click to edit Master title style</a:t>
             </a:r>
-            <a:endParaRPr lang="en-US"/>
           </a:p>
         </p:txBody>
       </p:sp>
@@ -1132,38 +1123,37 @@
           <a:p>
             <a:pPr lvl="0"/>
             <a:r>
-              <a:rPr lang="en-US" smtClean="0"/>
+              <a:rPr lang="en-US"/>
               <a:t>Edit Master text styles</a:t>
             </a:r>
           </a:p>
           <a:p>
             <a:pPr lvl="1"/>
             <a:r>
-              <a:rPr lang="en-US" smtClean="0"/>
+              <a:rPr lang="en-US"/>
               <a:t>Second level</a:t>
             </a:r>
           </a:p>
           <a:p>
             <a:pPr lvl="2"/>
             <a:r>
-              <a:rPr lang="en-US" smtClean="0"/>
+              <a:rPr lang="en-US"/>
               <a:t>Third level</a:t>
             </a:r>
           </a:p>
           <a:p>
             <a:pPr lvl="3"/>
             <a:r>
-              <a:rPr lang="en-US" smtClean="0"/>
+              <a:rPr lang="en-US"/>
               <a:t>Fourth level</a:t>
             </a:r>
           </a:p>
           <a:p>
             <a:pPr lvl="4"/>
             <a:r>
-              <a:rPr lang="en-US" smtClean="0"/>
+              <a:rPr lang="en-US"/>
               <a:t>Fifth level</a:t>
             </a:r>
-            <a:endParaRPr lang="en-US"/>
           </a:p>
         </p:txBody>
       </p:sp>
@@ -1189,38 +1179,37 @@
           <a:p>
             <a:pPr lvl="0"/>
             <a:r>
-              <a:rPr lang="en-US" smtClean="0"/>
+              <a:rPr lang="en-US"/>
               <a:t>Edit Master text styles</a:t>
             </a:r>
           </a:p>
           <a:p>
             <a:pPr lvl="1"/>
             <a:r>
-              <a:rPr lang="en-US" smtClean="0"/>
+              <a:rPr lang="en-US"/>
               <a:t>Second level</a:t>
             </a:r>
           </a:p>
           <a:p>
             <a:pPr lvl="2"/>
             <a:r>
-              <a:rPr lang="en-US" smtClean="0"/>
+              <a:rPr lang="en-US"/>
               <a:t>Third level</a:t>
             </a:r>
           </a:p>
           <a:p>
             <a:pPr lvl="3"/>
             <a:r>
-              <a:rPr lang="en-US" smtClean="0"/>
+              <a:rPr lang="en-US"/>
               <a:t>Fourth level</a:t>
             </a:r>
           </a:p>
           <a:p>
             <a:pPr lvl="4"/>
             <a:r>
-              <a:rPr lang="en-US" smtClean="0"/>
+              <a:rPr lang="en-US"/>
               <a:t>Fifth level</a:t>
             </a:r>
-            <a:endParaRPr lang="en-US"/>
           </a:p>
         </p:txBody>
       </p:sp>
@@ -1241,7 +1230,7 @@
           <a:p>
             <a:fld id="{4E0D474A-36D6-42D7-8D99-A750CFDD9A60}" type="datetimeFigureOut">
               <a:rPr lang="en-US" smtClean="0"/>
-              <a:t>1/15/2020</a:t>
+              <a:t>3/19/2020</a:t>
             </a:fld>
             <a:endParaRPr lang="en-US"/>
           </a:p>
@@ -1340,10 +1329,9 @@
           <a:lstStyle/>
           <a:p>
             <a:r>
-              <a:rPr lang="en-US" smtClean="0"/>
+              <a:rPr lang="en-US"/>
               <a:t>Click to edit Master title style</a:t>
             </a:r>
-            <a:endParaRPr lang="en-US"/>
           </a:p>
         </p:txBody>
       </p:sp>
@@ -1406,7 +1394,7 @@
           <a:p>
             <a:pPr lvl="0"/>
             <a:r>
-              <a:rPr lang="en-US" smtClean="0"/>
+              <a:rPr lang="en-US"/>
               <a:t>Edit Master text styles</a:t>
             </a:r>
           </a:p>
@@ -1434,38 +1422,37 @@
           <a:p>
             <a:pPr lvl="0"/>
             <a:r>
-              <a:rPr lang="en-US" smtClean="0"/>
+              <a:rPr lang="en-US"/>
               <a:t>Edit Master text styles</a:t>
             </a:r>
           </a:p>
           <a:p>
             <a:pPr lvl="1"/>
             <a:r>
-              <a:rPr lang="en-US" smtClean="0"/>
+              <a:rPr lang="en-US"/>
               <a:t>Second level</a:t>
             </a:r>
           </a:p>
           <a:p>
             <a:pPr lvl="2"/>
             <a:r>
-              <a:rPr lang="en-US" smtClean="0"/>
+              <a:rPr lang="en-US"/>
               <a:t>Third level</a:t>
             </a:r>
           </a:p>
           <a:p>
             <a:pPr lvl="3"/>
             <a:r>
-              <a:rPr lang="en-US" smtClean="0"/>
+              <a:rPr lang="en-US"/>
               <a:t>Fourth level</a:t>
             </a:r>
           </a:p>
           <a:p>
             <a:pPr lvl="4"/>
             <a:r>
-              <a:rPr lang="en-US" smtClean="0"/>
+              <a:rPr lang="en-US"/>
               <a:t>Fifth level</a:t>
             </a:r>
-            <a:endParaRPr lang="en-US"/>
           </a:p>
         </p:txBody>
       </p:sp>
@@ -1528,7 +1515,7 @@
           <a:p>
             <a:pPr lvl="0"/>
             <a:r>
-              <a:rPr lang="en-US" smtClean="0"/>
+              <a:rPr lang="en-US"/>
               <a:t>Edit Master text styles</a:t>
             </a:r>
           </a:p>
@@ -1556,38 +1543,37 @@
           <a:p>
             <a:pPr lvl="0"/>
             <a:r>
-              <a:rPr lang="en-US" smtClean="0"/>
+              <a:rPr lang="en-US"/>
               <a:t>Edit Master text styles</a:t>
             </a:r>
           </a:p>
           <a:p>
             <a:pPr lvl="1"/>
             <a:r>
-              <a:rPr lang="en-US" smtClean="0"/>
+              <a:rPr lang="en-US"/>
               <a:t>Second level</a:t>
             </a:r>
           </a:p>
           <a:p>
             <a:pPr lvl="2"/>
             <a:r>
-              <a:rPr lang="en-US" smtClean="0"/>
+              <a:rPr lang="en-US"/>
               <a:t>Third level</a:t>
             </a:r>
           </a:p>
           <a:p>
             <a:pPr lvl="3"/>
             <a:r>
-              <a:rPr lang="en-US" smtClean="0"/>
+              <a:rPr lang="en-US"/>
               <a:t>Fourth level</a:t>
             </a:r>
           </a:p>
           <a:p>
             <a:pPr lvl="4"/>
             <a:r>
-              <a:rPr lang="en-US" smtClean="0"/>
+              <a:rPr lang="en-US"/>
               <a:t>Fifth level</a:t>
             </a:r>
-            <a:endParaRPr lang="en-US"/>
           </a:p>
         </p:txBody>
       </p:sp>
@@ -1608,7 +1594,7 @@
           <a:p>
             <a:fld id="{4E0D474A-36D6-42D7-8D99-A750CFDD9A60}" type="datetimeFigureOut">
               <a:rPr lang="en-US" smtClean="0"/>
-              <a:t>1/15/2020</a:t>
+              <a:t>3/19/2020</a:t>
             </a:fld>
             <a:endParaRPr lang="en-US"/>
           </a:p>
@@ -1702,10 +1688,9 @@
           <a:lstStyle/>
           <a:p>
             <a:r>
-              <a:rPr lang="en-US" smtClean="0"/>
+              <a:rPr lang="en-US"/>
               <a:t>Click to edit Master title style</a:t>
             </a:r>
-            <a:endParaRPr lang="en-US"/>
           </a:p>
         </p:txBody>
       </p:sp>
@@ -1726,7 +1711,7 @@
           <a:p>
             <a:fld id="{4E0D474A-36D6-42D7-8D99-A750CFDD9A60}" type="datetimeFigureOut">
               <a:rPr lang="en-US" smtClean="0"/>
-              <a:t>1/15/2020</a:t>
+              <a:t>3/19/2020</a:t>
             </a:fld>
             <a:endParaRPr lang="en-US"/>
           </a:p>
@@ -1821,7 +1806,7 @@
           <a:p>
             <a:fld id="{4E0D474A-36D6-42D7-8D99-A750CFDD9A60}" type="datetimeFigureOut">
               <a:rPr lang="en-US" smtClean="0"/>
-              <a:t>1/15/2020</a:t>
+              <a:t>3/19/2020</a:t>
             </a:fld>
             <a:endParaRPr lang="en-US"/>
           </a:p>
@@ -1924,10 +1909,9 @@
           </a:lstStyle>
           <a:p>
             <a:r>
-              <a:rPr lang="en-US" smtClean="0"/>
+              <a:rPr lang="en-US"/>
               <a:t>Click to edit Master title style</a:t>
             </a:r>
-            <a:endParaRPr lang="en-US"/>
           </a:p>
         </p:txBody>
       </p:sp>
@@ -1981,38 +1965,37 @@
           <a:p>
             <a:pPr lvl="0"/>
             <a:r>
-              <a:rPr lang="en-US" smtClean="0"/>
+              <a:rPr lang="en-US"/>
               <a:t>Edit Master text styles</a:t>
             </a:r>
           </a:p>
           <a:p>
             <a:pPr lvl="1"/>
             <a:r>
-              <a:rPr lang="en-US" smtClean="0"/>
+              <a:rPr lang="en-US"/>
               <a:t>Second level</a:t>
             </a:r>
           </a:p>
           <a:p>
             <a:pPr lvl="2"/>
             <a:r>
-              <a:rPr lang="en-US" smtClean="0"/>
+              <a:rPr lang="en-US"/>
               <a:t>Third level</a:t>
             </a:r>
           </a:p>
           <a:p>
             <a:pPr lvl="3"/>
             <a:r>
-              <a:rPr lang="en-US" smtClean="0"/>
+              <a:rPr lang="en-US"/>
               <a:t>Fourth level</a:t>
             </a:r>
           </a:p>
           <a:p>
             <a:pPr lvl="4"/>
             <a:r>
-              <a:rPr lang="en-US" smtClean="0"/>
+              <a:rPr lang="en-US"/>
               <a:t>Fifth level</a:t>
             </a:r>
-            <a:endParaRPr lang="en-US"/>
           </a:p>
         </p:txBody>
       </p:sp>
@@ -2075,7 +2058,7 @@
           <a:p>
             <a:pPr lvl="0"/>
             <a:r>
-              <a:rPr lang="en-US" smtClean="0"/>
+              <a:rPr lang="en-US"/>
               <a:t>Edit Master text styles</a:t>
             </a:r>
           </a:p>
@@ -2098,7 +2081,7 @@
           <a:p>
             <a:fld id="{4E0D474A-36D6-42D7-8D99-A750CFDD9A60}" type="datetimeFigureOut">
               <a:rPr lang="en-US" smtClean="0"/>
-              <a:t>1/15/2020</a:t>
+              <a:t>3/19/2020</a:t>
             </a:fld>
             <a:endParaRPr lang="en-US"/>
           </a:p>
@@ -2201,10 +2184,9 @@
           </a:lstStyle>
           <a:p>
             <a:r>
-              <a:rPr lang="en-US" smtClean="0"/>
+              <a:rPr lang="en-US"/>
               <a:t>Click to edit Master title style</a:t>
             </a:r>
-            <a:endParaRPr lang="en-US"/>
           </a:p>
         </p:txBody>
       </p:sp>
@@ -2328,7 +2310,7 @@
           <a:p>
             <a:pPr lvl="0"/>
             <a:r>
-              <a:rPr lang="en-US" smtClean="0"/>
+              <a:rPr lang="en-US"/>
               <a:t>Edit Master text styles</a:t>
             </a:r>
           </a:p>
@@ -2351,7 +2333,7 @@
           <a:p>
             <a:fld id="{4E0D474A-36D6-42D7-8D99-A750CFDD9A60}" type="datetimeFigureOut">
               <a:rPr lang="en-US" smtClean="0"/>
-              <a:t>1/15/2020</a:t>
+              <a:t>3/19/2020</a:t>
             </a:fld>
             <a:endParaRPr lang="en-US"/>
           </a:p>
@@ -2460,10 +2442,9 @@
           <a:lstStyle/>
           <a:p>
             <a:r>
-              <a:rPr lang="en-US" smtClean="0"/>
+              <a:rPr lang="en-US"/>
               <a:t>Click to edit Master title style</a:t>
             </a:r>
-            <a:endParaRPr lang="en-US"/>
           </a:p>
         </p:txBody>
       </p:sp>
@@ -2494,38 +2475,37 @@
           <a:p>
             <a:pPr lvl="0"/>
             <a:r>
-              <a:rPr lang="en-US" smtClean="0"/>
+              <a:rPr lang="en-US"/>
               <a:t>Edit Master text styles</a:t>
             </a:r>
           </a:p>
           <a:p>
             <a:pPr lvl="1"/>
             <a:r>
-              <a:rPr lang="en-US" smtClean="0"/>
+              <a:rPr lang="en-US"/>
               <a:t>Second level</a:t>
             </a:r>
           </a:p>
           <a:p>
             <a:pPr lvl="2"/>
             <a:r>
-              <a:rPr lang="en-US" smtClean="0"/>
+              <a:rPr lang="en-US"/>
               <a:t>Third level</a:t>
             </a:r>
           </a:p>
           <a:p>
             <a:pPr lvl="3"/>
             <a:r>
-              <a:rPr lang="en-US" smtClean="0"/>
+              <a:rPr lang="en-US"/>
               <a:t>Fourth level</a:t>
             </a:r>
           </a:p>
           <a:p>
             <a:pPr lvl="4"/>
             <a:r>
-              <a:rPr lang="en-US" smtClean="0"/>
+              <a:rPr lang="en-US"/>
               <a:t>Fifth level</a:t>
             </a:r>
-            <a:endParaRPr lang="en-US"/>
           </a:p>
         </p:txBody>
       </p:sp>
@@ -2564,7 +2544,7 @@
           <a:p>
             <a:fld id="{4E0D474A-36D6-42D7-8D99-A750CFDD9A60}" type="datetimeFigureOut">
               <a:rPr lang="en-US" smtClean="0"/>
-              <a:t>1/15/2020</a:t>
+              <a:t>3/19/2020</a:t>
             </a:fld>
             <a:endParaRPr lang="en-US"/>
           </a:p>
@@ -3016,24 +2996,22 @@
                     <a:lstStyle/>
                     <a:p>
                       <a:r>
-                        <a:rPr lang="en-US" dirty="0" smtClean="0"/>
+                        <a:rPr lang="en-US" dirty="0"/>
                         <a:t>Suffix</a:t>
                       </a:r>
-                      <a:endParaRPr lang="en-US" dirty="0"/>
-                    </a:p>
-                  </a:txBody>
-                  <a:tcPr/>
-                </a:tc>
-                <a:tc>
-                  <a:txBody>
-                    <a:bodyPr/>
-                    <a:lstStyle/>
-                    <a:p>
-                      <a:r>
-                        <a:rPr lang="en-US" dirty="0" smtClean="0"/>
+                    </a:p>
+                  </a:txBody>
+                  <a:tcPr/>
+                </a:tc>
+                <a:tc>
+                  <a:txBody>
+                    <a:bodyPr/>
+                    <a:lstStyle/>
+                    <a:p>
+                      <a:r>
+                        <a:rPr lang="en-US" dirty="0"/>
                         <a:t>Technology Groups</a:t>
                       </a:r>
-                      <a:endParaRPr lang="en-US" dirty="0"/>
                     </a:p>
                   </a:txBody>
                   <a:tcPr/>
@@ -3051,24 +3029,22 @@
                     <a:lstStyle/>
                     <a:p>
                       <a:r>
-                        <a:rPr lang="en-US" dirty="0" smtClean="0"/>
+                        <a:rPr lang="en-US" dirty="0"/>
                         <a:t>A</a:t>
                       </a:r>
-                      <a:endParaRPr lang="en-US" dirty="0"/>
-                    </a:p>
-                  </a:txBody>
-                  <a:tcPr/>
-                </a:tc>
-                <a:tc>
-                  <a:txBody>
-                    <a:bodyPr/>
-                    <a:lstStyle/>
-                    <a:p>
-                      <a:r>
-                        <a:rPr lang="en-US" dirty="0" smtClean="0"/>
+                    </a:p>
+                  </a:txBody>
+                  <a:tcPr/>
+                </a:tc>
+                <a:tc>
+                  <a:txBody>
+                    <a:bodyPr/>
+                    <a:lstStyle/>
+                    <a:p>
+                      <a:r>
+                        <a:rPr lang="en-US" dirty="0"/>
                         <a:t>Centralized – Natural Gas</a:t>
                       </a:r>
-                      <a:endParaRPr lang="en-US" dirty="0"/>
                     </a:p>
                   </a:txBody>
                   <a:tcPr/>
@@ -3086,24 +3062,22 @@
                     <a:lstStyle/>
                     <a:p>
                       <a:r>
-                        <a:rPr lang="en-US" dirty="0" smtClean="0"/>
+                        <a:rPr lang="en-US" dirty="0"/>
                         <a:t>B</a:t>
                       </a:r>
-                      <a:endParaRPr lang="en-US" dirty="0"/>
-                    </a:p>
-                  </a:txBody>
-                  <a:tcPr/>
-                </a:tc>
-                <a:tc>
-                  <a:txBody>
-                    <a:bodyPr/>
-                    <a:lstStyle/>
-                    <a:p>
-                      <a:r>
-                        <a:rPr lang="en-US" dirty="0" smtClean="0"/>
+                    </a:p>
+                  </a:txBody>
+                  <a:tcPr/>
+                </a:tc>
+                <a:tc>
+                  <a:txBody>
+                    <a:bodyPr/>
+                    <a:lstStyle/>
+                    <a:p>
+                      <a:r>
+                        <a:rPr lang="en-US" dirty="0"/>
                         <a:t>Centralized – Hybrid</a:t>
                       </a:r>
-                      <a:endParaRPr lang="en-US" dirty="0"/>
                     </a:p>
                   </a:txBody>
                   <a:tcPr/>
@@ -3121,24 +3095,22 @@
                     <a:lstStyle/>
                     <a:p>
                       <a:r>
-                        <a:rPr lang="en-US" dirty="0" smtClean="0"/>
+                        <a:rPr lang="en-US" dirty="0"/>
                         <a:t>C</a:t>
                       </a:r>
-                      <a:endParaRPr lang="en-US" dirty="0"/>
-                    </a:p>
-                  </a:txBody>
-                  <a:tcPr/>
-                </a:tc>
-                <a:tc>
-                  <a:txBody>
-                    <a:bodyPr/>
-                    <a:lstStyle/>
-                    <a:p>
-                      <a:r>
-                        <a:rPr lang="en-US" dirty="0" smtClean="0"/>
+                    </a:p>
+                  </a:txBody>
+                  <a:tcPr/>
+                </a:tc>
+                <a:tc>
+                  <a:txBody>
+                    <a:bodyPr/>
+                    <a:lstStyle/>
+                    <a:p>
+                      <a:r>
+                        <a:rPr lang="en-US" dirty="0"/>
                         <a:t>Distributed – Natural Gas</a:t>
                       </a:r>
-                      <a:endParaRPr lang="en-US" dirty="0"/>
                     </a:p>
                   </a:txBody>
                   <a:tcPr/>
@@ -3156,10 +3128,9 @@
                     <a:lstStyle/>
                     <a:p>
                       <a:r>
-                        <a:rPr lang="en-US" dirty="0" smtClean="0"/>
+                        <a:rPr lang="en-US" dirty="0"/>
                         <a:t>D</a:t>
                       </a:r>
-                      <a:endParaRPr lang="en-US" dirty="0"/>
                     </a:p>
                   </a:txBody>
                   <a:tcPr/>
@@ -3187,7 +3158,7 @@
                         <a:defRPr/>
                       </a:pPr>
                       <a:r>
-                        <a:rPr lang="en-US" dirty="0" smtClean="0"/>
+                        <a:rPr lang="en-US" dirty="0"/>
                         <a:t>Distributed – Hybrid</a:t>
                       </a:r>
                     </a:p>
@@ -3251,24 +3222,22 @@
                     <a:lstStyle/>
                     <a:p>
                       <a:r>
-                        <a:rPr lang="en-US" dirty="0" smtClean="0"/>
+                        <a:rPr lang="en-US" dirty="0"/>
                         <a:t>Prefix</a:t>
                       </a:r>
-                      <a:endParaRPr lang="en-US" dirty="0"/>
-                    </a:p>
-                  </a:txBody>
-                  <a:tcPr/>
-                </a:tc>
-                <a:tc>
-                  <a:txBody>
-                    <a:bodyPr/>
-                    <a:lstStyle/>
-                    <a:p>
-                      <a:r>
-                        <a:rPr lang="en-US" dirty="0" smtClean="0"/>
+                    </a:p>
+                  </a:txBody>
+                  <a:tcPr/>
+                </a:tc>
+                <a:tc>
+                  <a:txBody>
+                    <a:bodyPr/>
+                    <a:lstStyle/>
+                    <a:p>
+                      <a:r>
+                        <a:rPr lang="en-US" dirty="0"/>
                         <a:t>Scenario</a:t>
                       </a:r>
-                      <a:endParaRPr lang="en-US" dirty="0"/>
                     </a:p>
                   </a:txBody>
                   <a:tcPr/>
@@ -3286,24 +3255,22 @@
                     <a:lstStyle/>
                     <a:p>
                       <a:r>
-                        <a:rPr lang="en-US" dirty="0" smtClean="0"/>
+                        <a:rPr lang="en-US" dirty="0"/>
                         <a:t>T</a:t>
                       </a:r>
-                      <a:endParaRPr lang="en-US" dirty="0"/>
-                    </a:p>
-                  </a:txBody>
-                  <a:tcPr/>
-                </a:tc>
-                <a:tc>
-                  <a:txBody>
-                    <a:bodyPr/>
-                    <a:lstStyle/>
-                    <a:p>
-                      <a:r>
-                        <a:rPr lang="en-US" baseline="0" dirty="0" smtClean="0"/>
+                    </a:p>
+                  </a:txBody>
+                  <a:tcPr/>
+                </a:tc>
+                <a:tc>
+                  <a:txBody>
+                    <a:bodyPr/>
+                    <a:lstStyle/>
+                    <a:p>
+                      <a:r>
+                        <a:rPr lang="en-US" baseline="0" dirty="0"/>
                         <a:t>All technologies w/o Carbon Tax</a:t>
                       </a:r>
-                      <a:endParaRPr lang="en-US" baseline="0" dirty="0" smtClean="0"/>
                     </a:p>
                   </a:txBody>
                   <a:tcPr/>
@@ -3321,10 +3288,9 @@
                     <a:lstStyle/>
                     <a:p>
                       <a:r>
-                        <a:rPr lang="en-US" dirty="0" smtClean="0"/>
+                        <a:rPr lang="en-US" dirty="0"/>
                         <a:t>U</a:t>
                       </a:r>
-                      <a:endParaRPr lang="en-US" dirty="0"/>
                     </a:p>
                   </a:txBody>
                   <a:tcPr/>
@@ -3352,7 +3318,7 @@
                         <a:defRPr/>
                       </a:pPr>
                       <a:r>
-                        <a:rPr lang="en-US" baseline="0" dirty="0" smtClean="0"/>
+                        <a:rPr lang="en-US" baseline="0" dirty="0"/>
                         <a:t>All technologies w/ Carbon Tax</a:t>
                       </a:r>
                     </a:p>
@@ -3372,25 +3338,24 @@
                     <a:lstStyle/>
                     <a:p>
                       <a:r>
-                        <a:rPr lang="en-US" dirty="0" smtClean="0"/>
+                        <a:rPr lang="en-US" dirty="0"/>
                         <a:t>W</a:t>
                       </a:r>
-                      <a:endParaRPr lang="en-US" dirty="0"/>
-                    </a:p>
-                  </a:txBody>
-                  <a:tcPr/>
-                </a:tc>
-                <a:tc>
-                  <a:txBody>
-                    <a:bodyPr/>
-                    <a:lstStyle/>
-                    <a:p>
-                      <a:r>
-                        <a:rPr lang="en-US" dirty="0" smtClean="0"/>
+                    </a:p>
+                  </a:txBody>
+                  <a:tcPr/>
+                </a:tc>
+                <a:tc>
+                  <a:txBody>
+                    <a:bodyPr/>
+                    <a:lstStyle/>
+                    <a:p>
+                      <a:r>
+                        <a:rPr lang="en-US" dirty="0"/>
                         <a:t>Current Infra w/o</a:t>
                       </a:r>
                       <a:r>
-                        <a:rPr lang="en-US" baseline="0" dirty="0" smtClean="0"/>
+                        <a:rPr lang="en-US" baseline="0" dirty="0"/>
                         <a:t> Carbon Tax</a:t>
                       </a:r>
                     </a:p>
@@ -3410,25 +3375,24 @@
                     <a:lstStyle/>
                     <a:p>
                       <a:r>
-                        <a:rPr lang="en-US" dirty="0" smtClean="0"/>
+                        <a:rPr lang="en-US" dirty="0"/>
                         <a:t>X</a:t>
                       </a:r>
-                      <a:endParaRPr lang="en-US" dirty="0"/>
-                    </a:p>
-                  </a:txBody>
-                  <a:tcPr/>
-                </a:tc>
-                <a:tc>
-                  <a:txBody>
-                    <a:bodyPr/>
-                    <a:lstStyle/>
-                    <a:p>
-                      <a:r>
-                        <a:rPr lang="en-US" dirty="0" smtClean="0"/>
+                    </a:p>
+                  </a:txBody>
+                  <a:tcPr/>
+                </a:tc>
+                <a:tc>
+                  <a:txBody>
+                    <a:bodyPr/>
+                    <a:lstStyle/>
+                    <a:p>
+                      <a:r>
+                        <a:rPr lang="en-US" dirty="0"/>
                         <a:t>Hardened Infra w/o</a:t>
                       </a:r>
                       <a:r>
-                        <a:rPr lang="en-US" baseline="0" dirty="0" smtClean="0"/>
+                        <a:rPr lang="en-US" baseline="0" dirty="0"/>
                         <a:t> Carbon Tax</a:t>
                       </a:r>
                     </a:p>
@@ -3448,25 +3412,24 @@
                     <a:lstStyle/>
                     <a:p>
                       <a:r>
-                        <a:rPr lang="en-US" dirty="0" smtClean="0"/>
+                        <a:rPr lang="en-US" dirty="0"/>
                         <a:t>Y</a:t>
                       </a:r>
-                      <a:endParaRPr lang="en-US" dirty="0"/>
-                    </a:p>
-                  </a:txBody>
-                  <a:tcPr/>
-                </a:tc>
-                <a:tc>
-                  <a:txBody>
-                    <a:bodyPr/>
-                    <a:lstStyle/>
-                    <a:p>
-                      <a:r>
-                        <a:rPr lang="en-US" dirty="0" smtClean="0"/>
+                    </a:p>
+                  </a:txBody>
+                  <a:tcPr/>
+                </a:tc>
+                <a:tc>
+                  <a:txBody>
+                    <a:bodyPr/>
+                    <a:lstStyle/>
+                    <a:p>
+                      <a:r>
+                        <a:rPr lang="en-US" dirty="0"/>
                         <a:t>Current Infra w/</a:t>
                       </a:r>
                       <a:r>
-                        <a:rPr lang="en-US" baseline="0" dirty="0" smtClean="0"/>
+                        <a:rPr lang="en-US" baseline="0" dirty="0"/>
                         <a:t> Carbon Tax</a:t>
                       </a:r>
                     </a:p>
@@ -3486,25 +3449,24 @@
                     <a:lstStyle/>
                     <a:p>
                       <a:r>
-                        <a:rPr lang="en-US" dirty="0" smtClean="0"/>
+                        <a:rPr lang="en-US" dirty="0"/>
                         <a:t>Z</a:t>
                       </a:r>
-                      <a:endParaRPr lang="en-US" dirty="0"/>
-                    </a:p>
-                  </a:txBody>
-                  <a:tcPr/>
-                </a:tc>
-                <a:tc>
-                  <a:txBody>
-                    <a:bodyPr/>
-                    <a:lstStyle/>
-                    <a:p>
-                      <a:r>
-                        <a:rPr lang="en-US" dirty="0" smtClean="0"/>
+                    </a:p>
+                  </a:txBody>
+                  <a:tcPr/>
+                </a:tc>
+                <a:tc>
+                  <a:txBody>
+                    <a:bodyPr/>
+                    <a:lstStyle/>
+                    <a:p>
+                      <a:r>
+                        <a:rPr lang="en-US" dirty="0"/>
                         <a:t>Hardened Infra w/</a:t>
                       </a:r>
                       <a:r>
-                        <a:rPr lang="en-US" baseline="0" dirty="0" smtClean="0"/>
+                        <a:rPr lang="en-US" baseline="0" dirty="0"/>
                         <a:t> Carbon Tax</a:t>
                       </a:r>
                     </a:p>
@@ -3585,24 +3547,22 @@
                     <a:lstStyle/>
                     <a:p>
                       <a:r>
-                        <a:rPr lang="en-US" dirty="0" smtClean="0"/>
+                        <a:rPr lang="en-US" dirty="0"/>
                         <a:t>Scenarios</a:t>
                       </a:r>
-                      <a:endParaRPr lang="en-US" dirty="0"/>
-                    </a:p>
-                  </a:txBody>
-                  <a:tcPr/>
-                </a:tc>
-                <a:tc>
-                  <a:txBody>
-                    <a:bodyPr/>
-                    <a:lstStyle/>
-                    <a:p>
-                      <a:r>
-                        <a:rPr lang="en-US" dirty="0" smtClean="0"/>
+                    </a:p>
+                  </a:txBody>
+                  <a:tcPr/>
+                </a:tc>
+                <a:tc>
+                  <a:txBody>
+                    <a:bodyPr/>
+                    <a:lstStyle/>
+                    <a:p>
+                      <a:r>
+                        <a:rPr lang="en-US" dirty="0"/>
                         <a:t>Technology Groups</a:t>
                       </a:r>
-                      <a:endParaRPr lang="en-US" dirty="0"/>
                     </a:p>
                   </a:txBody>
                   <a:tcPr/>
@@ -3620,10 +3580,9 @@
                     <a:lstStyle/>
                     <a:p>
                       <a:r>
-                        <a:rPr lang="en-US" dirty="0" smtClean="0"/>
+                        <a:rPr lang="en-US" dirty="0"/>
                         <a:t>WA</a:t>
                       </a:r>
-                      <a:endParaRPr lang="en-US" dirty="0"/>
                     </a:p>
                   </a:txBody>
                   <a:tcPr/>
@@ -3651,11 +3610,11 @@
                         <a:defRPr/>
                       </a:pPr>
                       <a:r>
-                        <a:rPr lang="en-US" dirty="0" smtClean="0"/>
+                        <a:rPr lang="en-US" dirty="0"/>
                         <a:t>Current Infra w/o</a:t>
                       </a:r>
                       <a:r>
-                        <a:rPr lang="en-US" baseline="0" dirty="0" smtClean="0"/>
+                        <a:rPr lang="en-US" baseline="0" dirty="0"/>
                         <a:t> Carbon Tax</a:t>
                       </a:r>
                     </a:p>
@@ -3668,10 +3627,9 @@
                     <a:lstStyle/>
                     <a:p>
                       <a:r>
-                        <a:rPr lang="en-US" dirty="0" smtClean="0"/>
+                        <a:rPr lang="en-US" dirty="0"/>
                         <a:t>Centralized – Natural Gas</a:t>
                       </a:r>
-                      <a:endParaRPr lang="en-US" dirty="0"/>
                     </a:p>
                   </a:txBody>
                   <a:tcPr>
@@ -3695,10 +3653,9 @@
                     <a:lstStyle/>
                     <a:p>
                       <a:r>
-                        <a:rPr lang="en-US" dirty="0" smtClean="0"/>
+                        <a:rPr lang="en-US" dirty="0"/>
                         <a:t>WB</a:t>
                       </a:r>
-                      <a:endParaRPr lang="en-US" dirty="0"/>
                     </a:p>
                   </a:txBody>
                   <a:tcPr/>
@@ -3726,11 +3683,11 @@
                         <a:defRPr/>
                       </a:pPr>
                       <a:r>
-                        <a:rPr lang="en-US" dirty="0" smtClean="0"/>
+                        <a:rPr lang="en-US" dirty="0"/>
                         <a:t>Current Infra w/o</a:t>
                       </a:r>
                       <a:r>
-                        <a:rPr lang="en-US" baseline="0" dirty="0" smtClean="0"/>
+                        <a:rPr lang="en-US" baseline="0" dirty="0"/>
                         <a:t> Carbon Tax</a:t>
                       </a:r>
                     </a:p>
@@ -3743,10 +3700,9 @@
                     <a:lstStyle/>
                     <a:p>
                       <a:r>
-                        <a:rPr lang="en-US" dirty="0" smtClean="0"/>
+                        <a:rPr lang="en-US" dirty="0"/>
                         <a:t>Centralized – Hybrid</a:t>
                       </a:r>
-                      <a:endParaRPr lang="en-US" dirty="0"/>
                     </a:p>
                   </a:txBody>
                   <a:tcPr>
@@ -3771,10 +3727,9 @@
                     <a:lstStyle/>
                     <a:p>
                       <a:r>
-                        <a:rPr lang="en-US" dirty="0" smtClean="0"/>
+                        <a:rPr lang="en-US" dirty="0"/>
                         <a:t>WC</a:t>
                       </a:r>
-                      <a:endParaRPr lang="en-US" dirty="0"/>
                     </a:p>
                   </a:txBody>
                   <a:tcPr/>
@@ -3802,11 +3757,11 @@
                         <a:defRPr/>
                       </a:pPr>
                       <a:r>
-                        <a:rPr lang="en-US" dirty="0" smtClean="0"/>
+                        <a:rPr lang="en-US" dirty="0"/>
                         <a:t>Current Infra w/o</a:t>
                       </a:r>
                       <a:r>
-                        <a:rPr lang="en-US" baseline="0" dirty="0" smtClean="0"/>
+                        <a:rPr lang="en-US" baseline="0" dirty="0"/>
                         <a:t> Carbon Tax</a:t>
                       </a:r>
                     </a:p>
@@ -3819,10 +3774,9 @@
                     <a:lstStyle/>
                     <a:p>
                       <a:r>
-                        <a:rPr lang="en-US" dirty="0" smtClean="0"/>
+                        <a:rPr lang="en-US" dirty="0"/>
                         <a:t>Distributed – Natural Gas</a:t>
                       </a:r>
-                      <a:endParaRPr lang="en-US" dirty="0"/>
                     </a:p>
                   </a:txBody>
                   <a:tcPr>
@@ -3844,10 +3798,9 @@
                     <a:lstStyle/>
                     <a:p>
                       <a:r>
-                        <a:rPr lang="en-US" dirty="0" smtClean="0"/>
+                        <a:rPr lang="en-US" dirty="0"/>
                         <a:t>WD</a:t>
                       </a:r>
-                      <a:endParaRPr lang="en-US" dirty="0"/>
                     </a:p>
                   </a:txBody>
                   <a:tcPr/>
@@ -3875,11 +3828,11 @@
                         <a:defRPr/>
                       </a:pPr>
                       <a:r>
-                        <a:rPr lang="en-US" dirty="0" smtClean="0"/>
+                        <a:rPr lang="en-US" dirty="0"/>
                         <a:t>Current Infra w/o</a:t>
                       </a:r>
                       <a:r>
-                        <a:rPr lang="en-US" baseline="0" dirty="0" smtClean="0"/>
+                        <a:rPr lang="en-US" baseline="0" dirty="0"/>
                         <a:t> Carbon Tax</a:t>
                       </a:r>
                     </a:p>
@@ -3909,7 +3862,7 @@
                         <a:defRPr/>
                       </a:pPr>
                       <a:r>
-                        <a:rPr lang="en-US" dirty="0" smtClean="0"/>
+                        <a:rPr lang="en-US" dirty="0"/>
                         <a:t>Distributed – Hybrid</a:t>
                       </a:r>
                     </a:p>
@@ -3933,10 +3886,9 @@
                     <a:lstStyle/>
                     <a:p>
                       <a:r>
-                        <a:rPr lang="en-US" dirty="0" smtClean="0"/>
+                        <a:rPr lang="en-US" dirty="0"/>
                         <a:t>XA</a:t>
                       </a:r>
-                      <a:endParaRPr lang="en-US" dirty="0"/>
                     </a:p>
                   </a:txBody>
                   <a:tcPr/>
@@ -3964,11 +3916,11 @@
                         <a:defRPr/>
                       </a:pPr>
                       <a:r>
-                        <a:rPr lang="en-US" b="1" dirty="0" smtClean="0"/>
+                        <a:rPr lang="en-US" b="1" dirty="0"/>
                         <a:t>Hardened Infra w/o</a:t>
                       </a:r>
                       <a:r>
-                        <a:rPr lang="en-US" b="1" baseline="0" dirty="0" smtClean="0"/>
+                        <a:rPr lang="en-US" b="1" baseline="0" dirty="0"/>
                         <a:t> Carbon Tax</a:t>
                       </a:r>
                     </a:p>
@@ -3981,10 +3933,9 @@
                     <a:lstStyle/>
                     <a:p>
                       <a:r>
-                        <a:rPr lang="en-US" dirty="0" smtClean="0"/>
+                        <a:rPr lang="en-US" dirty="0"/>
                         <a:t>Centralized – Natural Gas</a:t>
                       </a:r>
-                      <a:endParaRPr lang="en-US" dirty="0"/>
                     </a:p>
                   </a:txBody>
                   <a:tcPr>
@@ -4008,10 +3959,9 @@
                     <a:lstStyle/>
                     <a:p>
                       <a:r>
-                        <a:rPr lang="en-US" dirty="0" smtClean="0"/>
+                        <a:rPr lang="en-US" dirty="0"/>
                         <a:t>XB</a:t>
                       </a:r>
-                      <a:endParaRPr lang="en-US" dirty="0"/>
                     </a:p>
                   </a:txBody>
                   <a:tcPr/>
@@ -4039,11 +3989,11 @@
                         <a:defRPr/>
                       </a:pPr>
                       <a:r>
-                        <a:rPr lang="en-US" b="1" dirty="0" smtClean="0"/>
+                        <a:rPr lang="en-US" b="1" dirty="0"/>
                         <a:t>Hardened Infra w/o</a:t>
                       </a:r>
                       <a:r>
-                        <a:rPr lang="en-US" b="1" baseline="0" dirty="0" smtClean="0"/>
+                        <a:rPr lang="en-US" b="1" baseline="0" dirty="0"/>
                         <a:t> Carbon Tax</a:t>
                       </a:r>
                     </a:p>
@@ -4056,10 +4006,9 @@
                     <a:lstStyle/>
                     <a:p>
                       <a:r>
-                        <a:rPr lang="en-US" dirty="0" smtClean="0"/>
+                        <a:rPr lang="en-US" dirty="0"/>
                         <a:t>Centralized – Hybrid</a:t>
                       </a:r>
-                      <a:endParaRPr lang="en-US" dirty="0"/>
                     </a:p>
                   </a:txBody>
                   <a:tcPr>
@@ -4084,10 +4033,9 @@
                     <a:lstStyle/>
                     <a:p>
                       <a:r>
-                        <a:rPr lang="en-US" dirty="0" smtClean="0"/>
+                        <a:rPr lang="en-US" dirty="0"/>
                         <a:t>XC</a:t>
                       </a:r>
-                      <a:endParaRPr lang="en-US" dirty="0"/>
                     </a:p>
                   </a:txBody>
                   <a:tcPr/>
@@ -4115,11 +4063,11 @@
                         <a:defRPr/>
                       </a:pPr>
                       <a:r>
-                        <a:rPr lang="en-US" b="1" dirty="0" smtClean="0"/>
+                        <a:rPr lang="en-US" b="1" dirty="0"/>
                         <a:t>Hardened Infra w/o</a:t>
                       </a:r>
                       <a:r>
-                        <a:rPr lang="en-US" b="1" baseline="0" dirty="0" smtClean="0"/>
+                        <a:rPr lang="en-US" b="1" baseline="0" dirty="0"/>
                         <a:t> Carbon Tax</a:t>
                       </a:r>
                     </a:p>
@@ -4132,10 +4080,9 @@
                     <a:lstStyle/>
                     <a:p>
                       <a:r>
-                        <a:rPr lang="en-US" dirty="0" smtClean="0"/>
+                        <a:rPr lang="en-US" dirty="0"/>
                         <a:t>Distributed – Natural Gas</a:t>
                       </a:r>
-                      <a:endParaRPr lang="en-US" dirty="0"/>
                     </a:p>
                   </a:txBody>
                   <a:tcPr>
@@ -4157,10 +4104,9 @@
                     <a:lstStyle/>
                     <a:p>
                       <a:r>
-                        <a:rPr lang="en-US" dirty="0" smtClean="0"/>
+                        <a:rPr lang="en-US" dirty="0"/>
                         <a:t>XD</a:t>
                       </a:r>
-                      <a:endParaRPr lang="en-US" dirty="0"/>
                     </a:p>
                   </a:txBody>
                   <a:tcPr/>
@@ -4188,11 +4134,11 @@
                         <a:defRPr/>
                       </a:pPr>
                       <a:r>
-                        <a:rPr lang="en-US" b="1" dirty="0" smtClean="0"/>
+                        <a:rPr lang="en-US" b="1" dirty="0"/>
                         <a:t>Hardened Infra w/o</a:t>
                       </a:r>
                       <a:r>
-                        <a:rPr lang="en-US" b="1" baseline="0" dirty="0" smtClean="0"/>
+                        <a:rPr lang="en-US" b="1" baseline="0" dirty="0"/>
                         <a:t> Carbon Tax</a:t>
                       </a:r>
                     </a:p>
@@ -4222,7 +4168,7 @@
                         <a:defRPr/>
                       </a:pPr>
                       <a:r>
-                        <a:rPr lang="en-US" dirty="0" smtClean="0"/>
+                        <a:rPr lang="en-US" dirty="0"/>
                         <a:t>Distributed – Hybrid</a:t>
                       </a:r>
                     </a:p>
@@ -4246,10 +4192,9 @@
                     <a:lstStyle/>
                     <a:p>
                       <a:r>
-                        <a:rPr lang="en-US" dirty="0" smtClean="0"/>
+                        <a:rPr lang="en-US" dirty="0"/>
                         <a:t>YA</a:t>
                       </a:r>
-                      <a:endParaRPr lang="en-US" dirty="0"/>
                     </a:p>
                   </a:txBody>
                   <a:tcPr/>
@@ -4277,11 +4222,11 @@
                         <a:defRPr/>
                       </a:pPr>
                       <a:r>
-                        <a:rPr lang="en-US" dirty="0" smtClean="0"/>
+                        <a:rPr lang="en-US" dirty="0"/>
                         <a:t>Current Infra w/</a:t>
                       </a:r>
                       <a:r>
-                        <a:rPr lang="en-US" baseline="0" dirty="0" smtClean="0"/>
+                        <a:rPr lang="en-US" baseline="0" dirty="0"/>
                         <a:t> Carbon Tax</a:t>
                       </a:r>
                     </a:p>
@@ -4294,10 +4239,9 @@
                     <a:lstStyle/>
                     <a:p>
                       <a:r>
-                        <a:rPr lang="en-US" dirty="0" smtClean="0"/>
+                        <a:rPr lang="en-US" dirty="0"/>
                         <a:t>Centralized – Natural Gas</a:t>
                       </a:r>
-                      <a:endParaRPr lang="en-US" dirty="0"/>
                     </a:p>
                   </a:txBody>
                   <a:tcPr>
@@ -4321,10 +4265,9 @@
                     <a:lstStyle/>
                     <a:p>
                       <a:r>
-                        <a:rPr lang="en-US" dirty="0" smtClean="0"/>
+                        <a:rPr lang="en-US" dirty="0"/>
                         <a:t>YB</a:t>
                       </a:r>
-                      <a:endParaRPr lang="en-US" dirty="0"/>
                     </a:p>
                   </a:txBody>
                   <a:tcPr/>
@@ -4352,11 +4295,11 @@
                         <a:defRPr/>
                       </a:pPr>
                       <a:r>
-                        <a:rPr lang="en-US" dirty="0" smtClean="0"/>
+                        <a:rPr lang="en-US" dirty="0"/>
                         <a:t>Current Infra w/</a:t>
                       </a:r>
                       <a:r>
-                        <a:rPr lang="en-US" baseline="0" dirty="0" smtClean="0"/>
+                        <a:rPr lang="en-US" baseline="0" dirty="0"/>
                         <a:t> Carbon Tax</a:t>
                       </a:r>
                     </a:p>
@@ -4369,10 +4312,9 @@
                     <a:lstStyle/>
                     <a:p>
                       <a:r>
-                        <a:rPr lang="en-US" dirty="0" smtClean="0"/>
+                        <a:rPr lang="en-US" dirty="0"/>
                         <a:t>Centralized – Hybrid</a:t>
                       </a:r>
-                      <a:endParaRPr lang="en-US" dirty="0"/>
                     </a:p>
                   </a:txBody>
                   <a:tcPr>
@@ -4397,10 +4339,9 @@
                     <a:lstStyle/>
                     <a:p>
                       <a:r>
-                        <a:rPr lang="en-US" dirty="0" smtClean="0"/>
+                        <a:rPr lang="en-US" dirty="0"/>
                         <a:t>YC</a:t>
                       </a:r>
-                      <a:endParaRPr lang="en-US" dirty="0"/>
                     </a:p>
                   </a:txBody>
                   <a:tcPr/>
@@ -4428,11 +4369,11 @@
                         <a:defRPr/>
                       </a:pPr>
                       <a:r>
-                        <a:rPr lang="en-US" dirty="0" smtClean="0"/>
+                        <a:rPr lang="en-US" dirty="0"/>
                         <a:t>Current Infra w/</a:t>
                       </a:r>
                       <a:r>
-                        <a:rPr lang="en-US" baseline="0" dirty="0" smtClean="0"/>
+                        <a:rPr lang="en-US" baseline="0" dirty="0"/>
                         <a:t> Carbon Tax</a:t>
                       </a:r>
                     </a:p>
@@ -4445,10 +4386,9 @@
                     <a:lstStyle/>
                     <a:p>
                       <a:r>
-                        <a:rPr lang="en-US" dirty="0" smtClean="0"/>
+                        <a:rPr lang="en-US" dirty="0"/>
                         <a:t>Distributed – Natural Gas</a:t>
                       </a:r>
-                      <a:endParaRPr lang="en-US" dirty="0"/>
                     </a:p>
                   </a:txBody>
                   <a:tcPr>
@@ -4470,10 +4410,9 @@
                     <a:lstStyle/>
                     <a:p>
                       <a:r>
-                        <a:rPr lang="en-US" dirty="0" smtClean="0"/>
+                        <a:rPr lang="en-US" dirty="0"/>
                         <a:t>YD</a:t>
                       </a:r>
-                      <a:endParaRPr lang="en-US" dirty="0"/>
                     </a:p>
                   </a:txBody>
                   <a:tcPr/>
@@ -4501,11 +4440,11 @@
                         <a:defRPr/>
                       </a:pPr>
                       <a:r>
-                        <a:rPr lang="en-US" dirty="0" smtClean="0"/>
+                        <a:rPr lang="en-US" dirty="0"/>
                         <a:t>Current Infra w/</a:t>
                       </a:r>
                       <a:r>
-                        <a:rPr lang="en-US" baseline="0" dirty="0" smtClean="0"/>
+                        <a:rPr lang="en-US" baseline="0" dirty="0"/>
                         <a:t> Carbon Tax</a:t>
                       </a:r>
                     </a:p>
@@ -4535,7 +4474,7 @@
                         <a:defRPr/>
                       </a:pPr>
                       <a:r>
-                        <a:rPr lang="en-US" dirty="0" smtClean="0"/>
+                        <a:rPr lang="en-US" dirty="0"/>
                         <a:t>Distributed – Hybrid</a:t>
                       </a:r>
                     </a:p>
@@ -4559,10 +4498,9 @@
                     <a:lstStyle/>
                     <a:p>
                       <a:r>
-                        <a:rPr lang="en-US" dirty="0" smtClean="0"/>
+                        <a:rPr lang="en-US" dirty="0"/>
                         <a:t>ZA</a:t>
                       </a:r>
-                      <a:endParaRPr lang="en-US" dirty="0"/>
                     </a:p>
                   </a:txBody>
                   <a:tcPr/>
@@ -4590,11 +4528,11 @@
                         <a:defRPr/>
                       </a:pPr>
                       <a:r>
-                        <a:rPr lang="en-US" b="1" dirty="0" smtClean="0"/>
+                        <a:rPr lang="en-US" b="1" dirty="0"/>
                         <a:t>Hardened Infra w/</a:t>
                       </a:r>
                       <a:r>
-                        <a:rPr lang="en-US" b="1" baseline="0" dirty="0" smtClean="0"/>
+                        <a:rPr lang="en-US" b="1" baseline="0" dirty="0"/>
                         <a:t> Carbon Tax</a:t>
                       </a:r>
                     </a:p>
@@ -4607,10 +4545,9 @@
                     <a:lstStyle/>
                     <a:p>
                       <a:r>
-                        <a:rPr lang="en-US" dirty="0" smtClean="0"/>
+                        <a:rPr lang="en-US" dirty="0"/>
                         <a:t>Centralized – Natural Gas</a:t>
                       </a:r>
-                      <a:endParaRPr lang="en-US" dirty="0"/>
                     </a:p>
                   </a:txBody>
                   <a:tcPr>
@@ -4634,10 +4571,9 @@
                     <a:lstStyle/>
                     <a:p>
                       <a:r>
-                        <a:rPr lang="en-US" dirty="0" smtClean="0"/>
+                        <a:rPr lang="en-US" dirty="0"/>
                         <a:t>ZB</a:t>
                       </a:r>
-                      <a:endParaRPr lang="en-US" dirty="0"/>
                     </a:p>
                   </a:txBody>
                   <a:tcPr/>
@@ -4665,11 +4601,11 @@
                         <a:defRPr/>
                       </a:pPr>
                       <a:r>
-                        <a:rPr lang="en-US" b="1" dirty="0" smtClean="0"/>
+                        <a:rPr lang="en-US" b="1" dirty="0"/>
                         <a:t>Hardened Infra w/</a:t>
                       </a:r>
                       <a:r>
-                        <a:rPr lang="en-US" b="1" baseline="0" dirty="0" smtClean="0"/>
+                        <a:rPr lang="en-US" b="1" baseline="0" dirty="0"/>
                         <a:t> Carbon Tax</a:t>
                       </a:r>
                     </a:p>
@@ -4682,10 +4618,9 @@
                     <a:lstStyle/>
                     <a:p>
                       <a:r>
-                        <a:rPr lang="en-US" dirty="0" smtClean="0"/>
+                        <a:rPr lang="en-US" dirty="0"/>
                         <a:t>Centralized – Hybrid</a:t>
                       </a:r>
-                      <a:endParaRPr lang="en-US" dirty="0"/>
                     </a:p>
                   </a:txBody>
                   <a:tcPr>
@@ -4710,10 +4645,9 @@
                     <a:lstStyle/>
                     <a:p>
                       <a:r>
-                        <a:rPr lang="en-US" dirty="0" smtClean="0"/>
+                        <a:rPr lang="en-US" dirty="0"/>
                         <a:t>ZC</a:t>
                       </a:r>
-                      <a:endParaRPr lang="en-US" dirty="0"/>
                     </a:p>
                   </a:txBody>
                   <a:tcPr/>
@@ -4741,11 +4675,11 @@
                         <a:defRPr/>
                       </a:pPr>
                       <a:r>
-                        <a:rPr lang="en-US" b="1" dirty="0" smtClean="0"/>
+                        <a:rPr lang="en-US" b="1" dirty="0"/>
                         <a:t>Hardened Infra w/</a:t>
                       </a:r>
                       <a:r>
-                        <a:rPr lang="en-US" b="1" baseline="0" dirty="0" smtClean="0"/>
+                        <a:rPr lang="en-US" b="1" baseline="0" dirty="0"/>
                         <a:t> Carbon Tax</a:t>
                       </a:r>
                     </a:p>
@@ -4758,10 +4692,9 @@
                     <a:lstStyle/>
                     <a:p>
                       <a:r>
-                        <a:rPr lang="en-US" dirty="0" smtClean="0"/>
+                        <a:rPr lang="en-US" dirty="0"/>
                         <a:t>Distributed – Natural Gas</a:t>
                       </a:r>
-                      <a:endParaRPr lang="en-US" dirty="0"/>
                     </a:p>
                   </a:txBody>
                   <a:tcPr>
@@ -4783,10 +4716,9 @@
                     <a:lstStyle/>
                     <a:p>
                       <a:r>
-                        <a:rPr lang="en-US" dirty="0" smtClean="0"/>
+                        <a:rPr lang="en-US" dirty="0"/>
                         <a:t>ZD</a:t>
                       </a:r>
-                      <a:endParaRPr lang="en-US" dirty="0"/>
                     </a:p>
                   </a:txBody>
                   <a:tcPr/>
@@ -4814,11 +4746,11 @@
                         <a:defRPr/>
                       </a:pPr>
                       <a:r>
-                        <a:rPr lang="en-US" b="1" dirty="0" smtClean="0"/>
+                        <a:rPr lang="en-US" b="1" dirty="0"/>
                         <a:t>Hardened Infra w/</a:t>
                       </a:r>
                       <a:r>
-                        <a:rPr lang="en-US" b="1" baseline="0" dirty="0" smtClean="0"/>
+                        <a:rPr lang="en-US" b="1" baseline="0" dirty="0"/>
                         <a:t> Carbon Tax</a:t>
                       </a:r>
                     </a:p>
@@ -4848,7 +4780,7 @@
                         <a:defRPr/>
                       </a:pPr>
                       <a:r>
-                        <a:rPr lang="en-US" dirty="0" smtClean="0"/>
+                        <a:rPr lang="en-US" dirty="0"/>
                         <a:t>Distributed – Hybrid</a:t>
                       </a:r>
                     </a:p>
@@ -4869,10 +4801,1507 @@
           </a:graphicData>
         </a:graphic>
       </p:graphicFrame>
+      <p:sp>
+        <p:nvSpPr>
+          <p:cNvPr id="5" name="TextBox 4">
+            <a:extLst>
+              <a:ext uri="{FF2B5EF4-FFF2-40B4-BE49-F238E27FC236}">
+                <a16:creationId xmlns:a16="http://schemas.microsoft.com/office/drawing/2014/main" id="{435ED644-9951-4C5F-A97B-6B437C92CCCA}"/>
+              </a:ext>
+            </a:extLst>
+          </p:cNvPr>
+          <p:cNvSpPr txBox="1"/>
+          <p:nvPr/>
+        </p:nvSpPr>
+        <p:spPr>
+          <a:xfrm>
+            <a:off x="1339272" y="33118"/>
+            <a:ext cx="1052468" cy="369332"/>
+          </a:xfrm>
+          <a:prstGeom prst="rect">
+            <a:avLst/>
+          </a:prstGeom>
+          <a:noFill/>
+        </p:spPr>
+        <p:txBody>
+          <a:bodyPr wrap="none" rtlCol="0">
+            <a:spAutoFit/>
+          </a:bodyPr>
+          <a:lstStyle/>
+          <a:p>
+            <a:r>
+              <a:rPr lang="en-US"/>
+              <a:t>Version 1</a:t>
+            </a:r>
+            <a:endParaRPr lang="en-US" dirty="0"/>
+          </a:p>
+        </p:txBody>
+      </p:sp>
     </p:spTree>
     <p:extLst>
       <p:ext uri="{BB962C8B-B14F-4D97-AF65-F5344CB8AC3E}">
         <p14:creationId xmlns:p14="http://schemas.microsoft.com/office/powerpoint/2010/main" val="590499767"/>
+      </p:ext>
+    </p:extLst>
+  </p:cSld>
+  <p:clrMapOvr>
+    <a:masterClrMapping/>
+  </p:clrMapOvr>
+</p:sld>
+</file>
+
+<file path=ppt/slides/slide2.xml><?xml version="1.0" encoding="utf-8"?>
+<p:sld xmlns:a="http://schemas.openxmlformats.org/drawingml/2006/main" xmlns:r="http://schemas.openxmlformats.org/officeDocument/2006/relationships" xmlns:p="http://schemas.openxmlformats.org/presentationml/2006/main">
+  <p:cSld>
+    <p:spTree>
+      <p:nvGrpSpPr>
+        <p:cNvPr id="1" name=""/>
+        <p:cNvGrpSpPr/>
+        <p:nvPr/>
+      </p:nvGrpSpPr>
+      <p:grpSpPr>
+        <a:xfrm>
+          <a:off x="0" y="0"/>
+          <a:ext cx="0" cy="0"/>
+          <a:chOff x="0" y="0"/>
+          <a:chExt cx="0" cy="0"/>
+        </a:xfrm>
+      </p:grpSpPr>
+      <p:graphicFrame>
+        <p:nvGraphicFramePr>
+          <p:cNvPr id="2" name="Table 1"/>
+          <p:cNvGraphicFramePr>
+            <a:graphicFrameLocks noGrp="1"/>
+          </p:cNvGraphicFramePr>
+          <p:nvPr>
+            <p:extLst>
+              <p:ext uri="{D42A27DB-BD31-4B8C-83A1-F6EECF244321}">
+                <p14:modId xmlns:p14="http://schemas.microsoft.com/office/powerpoint/2010/main" val="343347843"/>
+              </p:ext>
+            </p:extLst>
+          </p:nvPr>
+        </p:nvGraphicFramePr>
+        <p:xfrm>
+          <a:off x="128661" y="3354904"/>
+          <a:ext cx="4020322" cy="1483360"/>
+        </p:xfrm>
+        <a:graphic>
+          <a:graphicData uri="http://schemas.openxmlformats.org/drawingml/2006/table">
+            <a:tbl>
+              <a:tblPr firstRow="1" bandRow="1">
+                <a:tableStyleId>{5C22544A-7EE6-4342-B048-85BDC9FD1C3A}</a:tableStyleId>
+              </a:tblPr>
+              <a:tblGrid>
+                <a:gridCol w="823247">
+                  <a:extLst>
+                    <a:ext uri="{9D8B030D-6E8A-4147-A177-3AD203B41FA5}">
+                      <a16:colId xmlns:a16="http://schemas.microsoft.com/office/drawing/2014/main" val="2648408335"/>
+                    </a:ext>
+                  </a:extLst>
+                </a:gridCol>
+                <a:gridCol w="3197075">
+                  <a:extLst>
+                    <a:ext uri="{9D8B030D-6E8A-4147-A177-3AD203B41FA5}">
+                      <a16:colId xmlns:a16="http://schemas.microsoft.com/office/drawing/2014/main" val="545094443"/>
+                    </a:ext>
+                  </a:extLst>
+                </a:gridCol>
+              </a:tblGrid>
+              <a:tr h="370840">
+                <a:tc>
+                  <a:txBody>
+                    <a:bodyPr/>
+                    <a:lstStyle/>
+                    <a:p>
+                      <a:r>
+                        <a:rPr lang="en-US" dirty="0"/>
+                        <a:t>Suffix</a:t>
+                      </a:r>
+                    </a:p>
+                  </a:txBody>
+                  <a:tcPr/>
+                </a:tc>
+                <a:tc>
+                  <a:txBody>
+                    <a:bodyPr/>
+                    <a:lstStyle/>
+                    <a:p>
+                      <a:r>
+                        <a:rPr lang="en-US" dirty="0"/>
+                        <a:t>Technology Groups</a:t>
+                      </a:r>
+                    </a:p>
+                  </a:txBody>
+                  <a:tcPr/>
+                </a:tc>
+                <a:extLst>
+                  <a:ext uri="{0D108BD9-81ED-4DB2-BD59-A6C34878D82A}">
+                    <a16:rowId xmlns:a16="http://schemas.microsoft.com/office/drawing/2014/main" val="4043718998"/>
+                  </a:ext>
+                </a:extLst>
+              </a:tr>
+              <a:tr h="370840">
+                <a:tc>
+                  <a:txBody>
+                    <a:bodyPr/>
+                    <a:lstStyle/>
+                    <a:p>
+                      <a:r>
+                        <a:rPr lang="en-US" dirty="0"/>
+                        <a:t>A</a:t>
+                      </a:r>
+                    </a:p>
+                  </a:txBody>
+                  <a:tcPr/>
+                </a:tc>
+                <a:tc>
+                  <a:txBody>
+                    <a:bodyPr/>
+                    <a:lstStyle/>
+                    <a:p>
+                      <a:r>
+                        <a:rPr lang="en-US" dirty="0"/>
+                        <a:t>Centralized</a:t>
+                      </a:r>
+                    </a:p>
+                  </a:txBody>
+                  <a:tcPr/>
+                </a:tc>
+                <a:extLst>
+                  <a:ext uri="{0D108BD9-81ED-4DB2-BD59-A6C34878D82A}">
+                    <a16:rowId xmlns:a16="http://schemas.microsoft.com/office/drawing/2014/main" val="4153160432"/>
+                  </a:ext>
+                </a:extLst>
+              </a:tr>
+              <a:tr h="370840">
+                <a:tc>
+                  <a:txBody>
+                    <a:bodyPr/>
+                    <a:lstStyle/>
+                    <a:p>
+                      <a:r>
+                        <a:rPr lang="en-US" dirty="0"/>
+                        <a:t>B</a:t>
+                      </a:r>
+                    </a:p>
+                  </a:txBody>
+                  <a:tcPr/>
+                </a:tc>
+                <a:tc>
+                  <a:txBody>
+                    <a:bodyPr/>
+                    <a:lstStyle/>
+                    <a:p>
+                      <a:r>
+                        <a:rPr lang="en-US" dirty="0"/>
+                        <a:t>Distributed</a:t>
+                      </a:r>
+                    </a:p>
+                  </a:txBody>
+                  <a:tcPr/>
+                </a:tc>
+                <a:extLst>
+                  <a:ext uri="{0D108BD9-81ED-4DB2-BD59-A6C34878D82A}">
+                    <a16:rowId xmlns:a16="http://schemas.microsoft.com/office/drawing/2014/main" val="1374592847"/>
+                  </a:ext>
+                </a:extLst>
+              </a:tr>
+              <a:tr h="370840">
+                <a:tc>
+                  <a:txBody>
+                    <a:bodyPr/>
+                    <a:lstStyle/>
+                    <a:p>
+                      <a:r>
+                        <a:rPr lang="en-US" dirty="0"/>
+                        <a:t>C</a:t>
+                      </a:r>
+                    </a:p>
+                  </a:txBody>
+                  <a:tcPr/>
+                </a:tc>
+                <a:tc>
+                  <a:txBody>
+                    <a:bodyPr/>
+                    <a:lstStyle/>
+                    <a:p>
+                      <a:r>
+                        <a:rPr lang="en-US" dirty="0"/>
+                        <a:t>Business-as-usual (no IRP)</a:t>
+                      </a:r>
+                    </a:p>
+                  </a:txBody>
+                  <a:tcPr/>
+                </a:tc>
+                <a:extLst>
+                  <a:ext uri="{0D108BD9-81ED-4DB2-BD59-A6C34878D82A}">
+                    <a16:rowId xmlns:a16="http://schemas.microsoft.com/office/drawing/2014/main" val="1629897343"/>
+                  </a:ext>
+                </a:extLst>
+              </a:tr>
+            </a:tbl>
+          </a:graphicData>
+        </a:graphic>
+      </p:graphicFrame>
+      <p:graphicFrame>
+        <p:nvGraphicFramePr>
+          <p:cNvPr id="3" name="Table 2"/>
+          <p:cNvGraphicFramePr>
+            <a:graphicFrameLocks noGrp="1"/>
+          </p:cNvGraphicFramePr>
+          <p:nvPr>
+            <p:extLst>
+              <p:ext uri="{D42A27DB-BD31-4B8C-83A1-F6EECF244321}">
+                <p14:modId xmlns:p14="http://schemas.microsoft.com/office/powerpoint/2010/main" val="436431910"/>
+              </p:ext>
+            </p:extLst>
+          </p:nvPr>
+        </p:nvGraphicFramePr>
+        <p:xfrm>
+          <a:off x="61244" y="402450"/>
+          <a:ext cx="4155156" cy="2595880"/>
+        </p:xfrm>
+        <a:graphic>
+          <a:graphicData uri="http://schemas.openxmlformats.org/drawingml/2006/table">
+            <a:tbl>
+              <a:tblPr firstRow="1" bandRow="1">
+                <a:tableStyleId>{5C22544A-7EE6-4342-B048-85BDC9FD1C3A}</a:tableStyleId>
+              </a:tblPr>
+              <a:tblGrid>
+                <a:gridCol w="850857">
+                  <a:extLst>
+                    <a:ext uri="{9D8B030D-6E8A-4147-A177-3AD203B41FA5}">
+                      <a16:colId xmlns:a16="http://schemas.microsoft.com/office/drawing/2014/main" val="2648408335"/>
+                    </a:ext>
+                  </a:extLst>
+                </a:gridCol>
+                <a:gridCol w="3304299">
+                  <a:extLst>
+                    <a:ext uri="{9D8B030D-6E8A-4147-A177-3AD203B41FA5}">
+                      <a16:colId xmlns:a16="http://schemas.microsoft.com/office/drawing/2014/main" val="545094443"/>
+                    </a:ext>
+                  </a:extLst>
+                </a:gridCol>
+              </a:tblGrid>
+              <a:tr h="370840">
+                <a:tc>
+                  <a:txBody>
+                    <a:bodyPr/>
+                    <a:lstStyle/>
+                    <a:p>
+                      <a:r>
+                        <a:rPr lang="en-US" dirty="0"/>
+                        <a:t>Prefix</a:t>
+                      </a:r>
+                    </a:p>
+                  </a:txBody>
+                  <a:tcPr/>
+                </a:tc>
+                <a:tc>
+                  <a:txBody>
+                    <a:bodyPr/>
+                    <a:lstStyle/>
+                    <a:p>
+                      <a:r>
+                        <a:rPr lang="en-US" dirty="0"/>
+                        <a:t>Scenario</a:t>
+                      </a:r>
+                    </a:p>
+                  </a:txBody>
+                  <a:tcPr/>
+                </a:tc>
+                <a:extLst>
+                  <a:ext uri="{0D108BD9-81ED-4DB2-BD59-A6C34878D82A}">
+                    <a16:rowId xmlns:a16="http://schemas.microsoft.com/office/drawing/2014/main" val="4043718998"/>
+                  </a:ext>
+                </a:extLst>
+              </a:tr>
+              <a:tr h="370840">
+                <a:tc>
+                  <a:txBody>
+                    <a:bodyPr/>
+                    <a:lstStyle/>
+                    <a:p>
+                      <a:r>
+                        <a:rPr lang="en-US" dirty="0"/>
+                        <a:t>T</a:t>
+                      </a:r>
+                    </a:p>
+                  </a:txBody>
+                  <a:tcPr/>
+                </a:tc>
+                <a:tc>
+                  <a:txBody>
+                    <a:bodyPr/>
+                    <a:lstStyle/>
+                    <a:p>
+                      <a:r>
+                        <a:rPr lang="en-US" baseline="0" dirty="0"/>
+                        <a:t>All technologies w/o IRP</a:t>
+                      </a:r>
+                    </a:p>
+                  </a:txBody>
+                  <a:tcPr/>
+                </a:tc>
+                <a:extLst>
+                  <a:ext uri="{0D108BD9-81ED-4DB2-BD59-A6C34878D82A}">
+                    <a16:rowId xmlns:a16="http://schemas.microsoft.com/office/drawing/2014/main" val="4249334561"/>
+                  </a:ext>
+                </a:extLst>
+              </a:tr>
+              <a:tr h="370840">
+                <a:tc>
+                  <a:txBody>
+                    <a:bodyPr/>
+                    <a:lstStyle/>
+                    <a:p>
+                      <a:r>
+                        <a:rPr lang="en-US" dirty="0"/>
+                        <a:t>U</a:t>
+                      </a:r>
+                    </a:p>
+                  </a:txBody>
+                  <a:tcPr/>
+                </a:tc>
+                <a:tc>
+                  <a:txBody>
+                    <a:bodyPr/>
+                    <a:lstStyle/>
+                    <a:p>
+                      <a:pPr marL="0" marR="0" indent="0" algn="l" defTabSz="914400" rtl="0" eaLnBrk="1" fontAlgn="auto" latinLnBrk="0" hangingPunct="1">
+                        <a:lnSpc>
+                          <a:spcPct val="100000"/>
+                        </a:lnSpc>
+                        <a:spcBef>
+                          <a:spcPts val="0"/>
+                        </a:spcBef>
+                        <a:spcAft>
+                          <a:spcPts val="0"/>
+                        </a:spcAft>
+                        <a:buClrTx/>
+                        <a:buSzTx/>
+                        <a:buFontTx/>
+                        <a:buNone/>
+                        <a:tabLst/>
+                        <a:defRPr/>
+                      </a:pPr>
+                      <a:r>
+                        <a:rPr lang="en-US" baseline="0" dirty="0"/>
+                        <a:t>All technologies w/ IRP</a:t>
+                      </a:r>
+                    </a:p>
+                  </a:txBody>
+                  <a:tcPr/>
+                </a:tc>
+                <a:extLst>
+                  <a:ext uri="{0D108BD9-81ED-4DB2-BD59-A6C34878D82A}">
+                    <a16:rowId xmlns:a16="http://schemas.microsoft.com/office/drawing/2014/main" val="1987041860"/>
+                  </a:ext>
+                </a:extLst>
+              </a:tr>
+              <a:tr h="370840">
+                <a:tc>
+                  <a:txBody>
+                    <a:bodyPr/>
+                    <a:lstStyle/>
+                    <a:p>
+                      <a:r>
+                        <a:rPr lang="en-US" dirty="0"/>
+                        <a:t>W</a:t>
+                      </a:r>
+                    </a:p>
+                  </a:txBody>
+                  <a:tcPr/>
+                </a:tc>
+                <a:tc>
+                  <a:txBody>
+                    <a:bodyPr/>
+                    <a:lstStyle/>
+                    <a:p>
+                      <a:r>
+                        <a:rPr lang="en-US" dirty="0"/>
+                        <a:t>Current Infra w/o</a:t>
+                      </a:r>
+                      <a:r>
+                        <a:rPr lang="en-US" baseline="0" dirty="0"/>
+                        <a:t> IRP</a:t>
+                      </a:r>
+                    </a:p>
+                  </a:txBody>
+                  <a:tcPr/>
+                </a:tc>
+                <a:extLst>
+                  <a:ext uri="{0D108BD9-81ED-4DB2-BD59-A6C34878D82A}">
+                    <a16:rowId xmlns:a16="http://schemas.microsoft.com/office/drawing/2014/main" val="4153160432"/>
+                  </a:ext>
+                </a:extLst>
+              </a:tr>
+              <a:tr h="370840">
+                <a:tc>
+                  <a:txBody>
+                    <a:bodyPr/>
+                    <a:lstStyle/>
+                    <a:p>
+                      <a:r>
+                        <a:rPr lang="en-US" dirty="0"/>
+                        <a:t>X</a:t>
+                      </a:r>
+                    </a:p>
+                  </a:txBody>
+                  <a:tcPr/>
+                </a:tc>
+                <a:tc>
+                  <a:txBody>
+                    <a:bodyPr/>
+                    <a:lstStyle/>
+                    <a:p>
+                      <a:r>
+                        <a:rPr lang="en-US" dirty="0"/>
+                        <a:t>Hardened Infra w/o</a:t>
+                      </a:r>
+                      <a:r>
+                        <a:rPr lang="en-US" baseline="0" dirty="0"/>
+                        <a:t> IRP</a:t>
+                      </a:r>
+                    </a:p>
+                  </a:txBody>
+                  <a:tcPr/>
+                </a:tc>
+                <a:extLst>
+                  <a:ext uri="{0D108BD9-81ED-4DB2-BD59-A6C34878D82A}">
+                    <a16:rowId xmlns:a16="http://schemas.microsoft.com/office/drawing/2014/main" val="1374592847"/>
+                  </a:ext>
+                </a:extLst>
+              </a:tr>
+              <a:tr h="370840">
+                <a:tc>
+                  <a:txBody>
+                    <a:bodyPr/>
+                    <a:lstStyle/>
+                    <a:p>
+                      <a:r>
+                        <a:rPr lang="en-US" dirty="0"/>
+                        <a:t>Y</a:t>
+                      </a:r>
+                    </a:p>
+                  </a:txBody>
+                  <a:tcPr/>
+                </a:tc>
+                <a:tc>
+                  <a:txBody>
+                    <a:bodyPr/>
+                    <a:lstStyle/>
+                    <a:p>
+                      <a:r>
+                        <a:rPr lang="en-US" dirty="0"/>
+                        <a:t>Current Infra w/</a:t>
+                      </a:r>
+                      <a:r>
+                        <a:rPr lang="en-US" baseline="0" dirty="0"/>
+                        <a:t> IRP</a:t>
+                      </a:r>
+                    </a:p>
+                  </a:txBody>
+                  <a:tcPr/>
+                </a:tc>
+                <a:extLst>
+                  <a:ext uri="{0D108BD9-81ED-4DB2-BD59-A6C34878D82A}">
+                    <a16:rowId xmlns:a16="http://schemas.microsoft.com/office/drawing/2014/main" val="1629897343"/>
+                  </a:ext>
+                </a:extLst>
+              </a:tr>
+              <a:tr h="370840">
+                <a:tc>
+                  <a:txBody>
+                    <a:bodyPr/>
+                    <a:lstStyle/>
+                    <a:p>
+                      <a:r>
+                        <a:rPr lang="en-US" dirty="0"/>
+                        <a:t>Z</a:t>
+                      </a:r>
+                    </a:p>
+                  </a:txBody>
+                  <a:tcPr/>
+                </a:tc>
+                <a:tc>
+                  <a:txBody>
+                    <a:bodyPr/>
+                    <a:lstStyle/>
+                    <a:p>
+                      <a:r>
+                        <a:rPr lang="en-US" dirty="0"/>
+                        <a:t>Hardened Infra w/</a:t>
+                      </a:r>
+                      <a:r>
+                        <a:rPr lang="en-US" baseline="0" dirty="0"/>
+                        <a:t> IRP</a:t>
+                      </a:r>
+                    </a:p>
+                  </a:txBody>
+                  <a:tcPr/>
+                </a:tc>
+                <a:extLst>
+                  <a:ext uri="{0D108BD9-81ED-4DB2-BD59-A6C34878D82A}">
+                    <a16:rowId xmlns:a16="http://schemas.microsoft.com/office/drawing/2014/main" val="278724709"/>
+                  </a:ext>
+                </a:extLst>
+              </a:tr>
+            </a:tbl>
+          </a:graphicData>
+        </a:graphic>
+      </p:graphicFrame>
+      <p:graphicFrame>
+        <p:nvGraphicFramePr>
+          <p:cNvPr id="4" name="Table 3"/>
+          <p:cNvGraphicFramePr>
+            <a:graphicFrameLocks noGrp="1"/>
+          </p:cNvGraphicFramePr>
+          <p:nvPr>
+            <p:extLst>
+              <p:ext uri="{D42A27DB-BD31-4B8C-83A1-F6EECF244321}">
+                <p14:modId xmlns:p14="http://schemas.microsoft.com/office/powerpoint/2010/main" val="4130699278"/>
+              </p:ext>
+            </p:extLst>
+          </p:nvPr>
+        </p:nvGraphicFramePr>
+        <p:xfrm>
+          <a:off x="4399185" y="291355"/>
+          <a:ext cx="7721649" cy="4820920"/>
+        </p:xfrm>
+        <a:graphic>
+          <a:graphicData uri="http://schemas.openxmlformats.org/drawingml/2006/table">
+            <a:tbl>
+              <a:tblPr firstRow="1" bandRow="1">
+                <a:tableStyleId>{5C22544A-7EE6-4342-B048-85BDC9FD1C3A}</a:tableStyleId>
+              </a:tblPr>
+              <a:tblGrid>
+                <a:gridCol w="579755">
+                  <a:extLst>
+                    <a:ext uri="{9D8B030D-6E8A-4147-A177-3AD203B41FA5}">
+                      <a16:colId xmlns:a16="http://schemas.microsoft.com/office/drawing/2014/main" val="2648408335"/>
+                    </a:ext>
+                  </a:extLst>
+                </a:gridCol>
+                <a:gridCol w="3195892">
+                  <a:extLst>
+                    <a:ext uri="{9D8B030D-6E8A-4147-A177-3AD203B41FA5}">
+                      <a16:colId xmlns:a16="http://schemas.microsoft.com/office/drawing/2014/main" val="3573707232"/>
+                    </a:ext>
+                  </a:extLst>
+                </a:gridCol>
+                <a:gridCol w="3946002">
+                  <a:extLst>
+                    <a:ext uri="{9D8B030D-6E8A-4147-A177-3AD203B41FA5}">
+                      <a16:colId xmlns:a16="http://schemas.microsoft.com/office/drawing/2014/main" val="545094443"/>
+                    </a:ext>
+                  </a:extLst>
+                </a:gridCol>
+              </a:tblGrid>
+              <a:tr h="370840">
+                <a:tc>
+                  <a:txBody>
+                    <a:bodyPr/>
+                    <a:lstStyle/>
+                    <a:p>
+                      <a:endParaRPr lang="en-US" dirty="0"/>
+                    </a:p>
+                  </a:txBody>
+                  <a:tcPr/>
+                </a:tc>
+                <a:tc>
+                  <a:txBody>
+                    <a:bodyPr/>
+                    <a:lstStyle/>
+                    <a:p>
+                      <a:r>
+                        <a:rPr lang="en-US" dirty="0"/>
+                        <a:t>Scenarios</a:t>
+                      </a:r>
+                    </a:p>
+                  </a:txBody>
+                  <a:tcPr/>
+                </a:tc>
+                <a:tc>
+                  <a:txBody>
+                    <a:bodyPr/>
+                    <a:lstStyle/>
+                    <a:p>
+                      <a:r>
+                        <a:rPr lang="en-US" dirty="0"/>
+                        <a:t>Technology Groups</a:t>
+                      </a:r>
+                    </a:p>
+                  </a:txBody>
+                  <a:tcPr/>
+                </a:tc>
+                <a:extLst>
+                  <a:ext uri="{0D108BD9-81ED-4DB2-BD59-A6C34878D82A}">
+                    <a16:rowId xmlns:a16="http://schemas.microsoft.com/office/drawing/2014/main" val="4043718998"/>
+                  </a:ext>
+                </a:extLst>
+              </a:tr>
+              <a:tr h="370840">
+                <a:tc>
+                  <a:txBody>
+                    <a:bodyPr/>
+                    <a:lstStyle/>
+                    <a:p>
+                      <a:r>
+                        <a:rPr lang="en-US" dirty="0"/>
+                        <a:t>T</a:t>
+                      </a:r>
+                    </a:p>
+                  </a:txBody>
+                  <a:tcPr/>
+                </a:tc>
+                <a:tc>
+                  <a:txBody>
+                    <a:bodyPr/>
+                    <a:lstStyle/>
+                    <a:p>
+                      <a:r>
+                        <a:rPr lang="en-US" baseline="0" dirty="0"/>
+                        <a:t>All technologies w/o IRP</a:t>
+                      </a:r>
+                    </a:p>
+                  </a:txBody>
+                  <a:tcPr/>
+                </a:tc>
+                <a:tc>
+                  <a:txBody>
+                    <a:bodyPr/>
+                    <a:lstStyle/>
+                    <a:p>
+                      <a:r>
+                        <a:rPr lang="en-US" dirty="0"/>
+                        <a:t>All</a:t>
+                      </a:r>
+                    </a:p>
+                  </a:txBody>
+                  <a:tcPr>
+                    <a:solidFill>
+                      <a:schemeClr val="accent6">
+                        <a:lumMod val="40000"/>
+                        <a:lumOff val="60000"/>
+                      </a:schemeClr>
+                    </a:solidFill>
+                  </a:tcPr>
+                </a:tc>
+                <a:extLst>
+                  <a:ext uri="{0D108BD9-81ED-4DB2-BD59-A6C34878D82A}">
+                    <a16:rowId xmlns:a16="http://schemas.microsoft.com/office/drawing/2014/main" val="1008783455"/>
+                  </a:ext>
+                </a:extLst>
+              </a:tr>
+              <a:tr h="370840">
+                <a:tc>
+                  <a:txBody>
+                    <a:bodyPr/>
+                    <a:lstStyle/>
+                    <a:p>
+                      <a:r>
+                        <a:rPr lang="en-US" dirty="0"/>
+                        <a:t>U</a:t>
+                      </a:r>
+                    </a:p>
+                  </a:txBody>
+                  <a:tcPr/>
+                </a:tc>
+                <a:tc>
+                  <a:txBody>
+                    <a:bodyPr/>
+                    <a:lstStyle/>
+                    <a:p>
+                      <a:pPr marL="0" marR="0" indent="0" algn="l" defTabSz="914400" rtl="0" eaLnBrk="1" fontAlgn="auto" latinLnBrk="0" hangingPunct="1">
+                        <a:lnSpc>
+                          <a:spcPct val="100000"/>
+                        </a:lnSpc>
+                        <a:spcBef>
+                          <a:spcPts val="0"/>
+                        </a:spcBef>
+                        <a:spcAft>
+                          <a:spcPts val="0"/>
+                        </a:spcAft>
+                        <a:buClrTx/>
+                        <a:buSzTx/>
+                        <a:buFontTx/>
+                        <a:buNone/>
+                        <a:tabLst/>
+                        <a:defRPr/>
+                      </a:pPr>
+                      <a:r>
+                        <a:rPr lang="en-US" baseline="0" dirty="0"/>
+                        <a:t>All technologies w/ IRP</a:t>
+                      </a:r>
+                    </a:p>
+                  </a:txBody>
+                  <a:tcPr/>
+                </a:tc>
+                <a:tc>
+                  <a:txBody>
+                    <a:bodyPr/>
+                    <a:lstStyle/>
+                    <a:p>
+                      <a:r>
+                        <a:rPr lang="en-US" dirty="0"/>
+                        <a:t>All</a:t>
+                      </a:r>
+                    </a:p>
+                  </a:txBody>
+                  <a:tcPr>
+                    <a:solidFill>
+                      <a:schemeClr val="accent6">
+                        <a:lumMod val="40000"/>
+                        <a:lumOff val="60000"/>
+                      </a:schemeClr>
+                    </a:solidFill>
+                  </a:tcPr>
+                </a:tc>
+                <a:extLst>
+                  <a:ext uri="{0D108BD9-81ED-4DB2-BD59-A6C34878D82A}">
+                    <a16:rowId xmlns:a16="http://schemas.microsoft.com/office/drawing/2014/main" val="4005396690"/>
+                  </a:ext>
+                </a:extLst>
+              </a:tr>
+              <a:tr h="370840">
+                <a:tc>
+                  <a:txBody>
+                    <a:bodyPr/>
+                    <a:lstStyle/>
+                    <a:p>
+                      <a:r>
+                        <a:rPr lang="en-US" dirty="0"/>
+                        <a:t>WA</a:t>
+                      </a:r>
+                    </a:p>
+                  </a:txBody>
+                  <a:tcPr/>
+                </a:tc>
+                <a:tc>
+                  <a:txBody>
+                    <a:bodyPr/>
+                    <a:lstStyle/>
+                    <a:p>
+                      <a:pPr marL="0" marR="0" indent="0" algn="l" defTabSz="914400" rtl="0" eaLnBrk="1" fontAlgn="auto" latinLnBrk="0" hangingPunct="1">
+                        <a:lnSpc>
+                          <a:spcPct val="100000"/>
+                        </a:lnSpc>
+                        <a:spcBef>
+                          <a:spcPts val="0"/>
+                        </a:spcBef>
+                        <a:spcAft>
+                          <a:spcPts val="0"/>
+                        </a:spcAft>
+                        <a:buClrTx/>
+                        <a:buSzTx/>
+                        <a:buFontTx/>
+                        <a:buNone/>
+                        <a:tabLst/>
+                        <a:defRPr/>
+                      </a:pPr>
+                      <a:r>
+                        <a:rPr lang="en-US" dirty="0"/>
+                        <a:t>Current Infra w/o</a:t>
+                      </a:r>
+                      <a:r>
+                        <a:rPr lang="en-US" baseline="0" dirty="0"/>
+                        <a:t> IRP</a:t>
+                      </a:r>
+                    </a:p>
+                  </a:txBody>
+                  <a:tcPr/>
+                </a:tc>
+                <a:tc>
+                  <a:txBody>
+                    <a:bodyPr/>
+                    <a:lstStyle/>
+                    <a:p>
+                      <a:r>
+                        <a:rPr lang="en-US" dirty="0"/>
+                        <a:t>Centralized</a:t>
+                      </a:r>
+                    </a:p>
+                  </a:txBody>
+                  <a:tcPr>
+                    <a:solidFill>
+                      <a:schemeClr val="bg1">
+                        <a:lumMod val="75000"/>
+                      </a:schemeClr>
+                    </a:solidFill>
+                  </a:tcPr>
+                </a:tc>
+                <a:extLst>
+                  <a:ext uri="{0D108BD9-81ED-4DB2-BD59-A6C34878D82A}">
+                    <a16:rowId xmlns:a16="http://schemas.microsoft.com/office/drawing/2014/main" val="4153160432"/>
+                  </a:ext>
+                </a:extLst>
+              </a:tr>
+              <a:tr h="370840">
+                <a:tc>
+                  <a:txBody>
+                    <a:bodyPr/>
+                    <a:lstStyle/>
+                    <a:p>
+                      <a:r>
+                        <a:rPr lang="en-US" dirty="0"/>
+                        <a:t>WB</a:t>
+                      </a:r>
+                    </a:p>
+                  </a:txBody>
+                  <a:tcPr/>
+                </a:tc>
+                <a:tc>
+                  <a:txBody>
+                    <a:bodyPr/>
+                    <a:lstStyle/>
+                    <a:p>
+                      <a:pPr marL="0" marR="0" indent="0" algn="l" defTabSz="914400" rtl="0" eaLnBrk="1" fontAlgn="auto" latinLnBrk="0" hangingPunct="1">
+                        <a:lnSpc>
+                          <a:spcPct val="100000"/>
+                        </a:lnSpc>
+                        <a:spcBef>
+                          <a:spcPts val="0"/>
+                        </a:spcBef>
+                        <a:spcAft>
+                          <a:spcPts val="0"/>
+                        </a:spcAft>
+                        <a:buClrTx/>
+                        <a:buSzTx/>
+                        <a:buFontTx/>
+                        <a:buNone/>
+                        <a:tabLst/>
+                        <a:defRPr/>
+                      </a:pPr>
+                      <a:r>
+                        <a:rPr lang="en-US" dirty="0"/>
+                        <a:t>Current Infra w/o</a:t>
+                      </a:r>
+                      <a:r>
+                        <a:rPr lang="en-US" baseline="0" dirty="0"/>
+                        <a:t> IRP</a:t>
+                      </a:r>
+                    </a:p>
+                  </a:txBody>
+                  <a:tcPr/>
+                </a:tc>
+                <a:tc>
+                  <a:txBody>
+                    <a:bodyPr/>
+                    <a:lstStyle/>
+                    <a:p>
+                      <a:r>
+                        <a:rPr lang="en-US" dirty="0"/>
+                        <a:t>Distributed</a:t>
+                      </a:r>
+                    </a:p>
+                  </a:txBody>
+                  <a:tcPr>
+                    <a:solidFill>
+                      <a:schemeClr val="accent2">
+                        <a:lumMod val="60000"/>
+                        <a:lumOff val="40000"/>
+                      </a:schemeClr>
+                    </a:solidFill>
+                  </a:tcPr>
+                </a:tc>
+                <a:extLst>
+                  <a:ext uri="{0D108BD9-81ED-4DB2-BD59-A6C34878D82A}">
+                    <a16:rowId xmlns:a16="http://schemas.microsoft.com/office/drawing/2014/main" val="1374592847"/>
+                  </a:ext>
+                </a:extLst>
+              </a:tr>
+              <a:tr h="370840">
+                <a:tc>
+                  <a:txBody>
+                    <a:bodyPr/>
+                    <a:lstStyle/>
+                    <a:p>
+                      <a:r>
+                        <a:rPr lang="en-US" dirty="0"/>
+                        <a:t>WC</a:t>
+                      </a:r>
+                    </a:p>
+                  </a:txBody>
+                  <a:tcPr/>
+                </a:tc>
+                <a:tc>
+                  <a:txBody>
+                    <a:bodyPr/>
+                    <a:lstStyle/>
+                    <a:p>
+                      <a:pPr marL="0" marR="0" indent="0" algn="l" defTabSz="914400" rtl="0" eaLnBrk="1" fontAlgn="auto" latinLnBrk="0" hangingPunct="1">
+                        <a:lnSpc>
+                          <a:spcPct val="100000"/>
+                        </a:lnSpc>
+                        <a:spcBef>
+                          <a:spcPts val="0"/>
+                        </a:spcBef>
+                        <a:spcAft>
+                          <a:spcPts val="0"/>
+                        </a:spcAft>
+                        <a:buClrTx/>
+                        <a:buSzTx/>
+                        <a:buFontTx/>
+                        <a:buNone/>
+                        <a:tabLst/>
+                        <a:defRPr/>
+                      </a:pPr>
+                      <a:r>
+                        <a:rPr lang="en-US" dirty="0"/>
+                        <a:t>Current Infra w/o</a:t>
+                      </a:r>
+                      <a:r>
+                        <a:rPr lang="en-US" baseline="0" dirty="0"/>
+                        <a:t> IRP</a:t>
+                      </a:r>
+                    </a:p>
+                  </a:txBody>
+                  <a:tcPr/>
+                </a:tc>
+                <a:tc>
+                  <a:txBody>
+                    <a:bodyPr/>
+                    <a:lstStyle/>
+                    <a:p>
+                      <a:r>
+                        <a:rPr lang="en-US" dirty="0"/>
+                        <a:t>Business-as-usual</a:t>
+                      </a:r>
+                    </a:p>
+                  </a:txBody>
+                  <a:tcPr>
+                    <a:solidFill>
+                      <a:srgbClr val="0070C0"/>
+                    </a:solidFill>
+                  </a:tcPr>
+                </a:tc>
+                <a:extLst>
+                  <a:ext uri="{0D108BD9-81ED-4DB2-BD59-A6C34878D82A}">
+                    <a16:rowId xmlns:a16="http://schemas.microsoft.com/office/drawing/2014/main" val="1629897343"/>
+                  </a:ext>
+                </a:extLst>
+              </a:tr>
+              <a:tr h="370840">
+                <a:tc>
+                  <a:txBody>
+                    <a:bodyPr/>
+                    <a:lstStyle/>
+                    <a:p>
+                      <a:r>
+                        <a:rPr lang="en-US" dirty="0"/>
+                        <a:t>XA</a:t>
+                      </a:r>
+                    </a:p>
+                  </a:txBody>
+                  <a:tcPr/>
+                </a:tc>
+                <a:tc>
+                  <a:txBody>
+                    <a:bodyPr/>
+                    <a:lstStyle/>
+                    <a:p>
+                      <a:pPr marL="0" marR="0" indent="0" algn="l" defTabSz="914400" rtl="0" eaLnBrk="1" fontAlgn="auto" latinLnBrk="0" hangingPunct="1">
+                        <a:lnSpc>
+                          <a:spcPct val="100000"/>
+                        </a:lnSpc>
+                        <a:spcBef>
+                          <a:spcPts val="0"/>
+                        </a:spcBef>
+                        <a:spcAft>
+                          <a:spcPts val="0"/>
+                        </a:spcAft>
+                        <a:buClrTx/>
+                        <a:buSzTx/>
+                        <a:buFontTx/>
+                        <a:buNone/>
+                        <a:tabLst/>
+                        <a:defRPr/>
+                      </a:pPr>
+                      <a:r>
+                        <a:rPr lang="en-US" b="1" dirty="0"/>
+                        <a:t>Hardened Infra w/o</a:t>
+                      </a:r>
+                      <a:r>
+                        <a:rPr lang="en-US" b="1" baseline="0" dirty="0"/>
+                        <a:t> IRP</a:t>
+                      </a:r>
+                    </a:p>
+                  </a:txBody>
+                  <a:tcPr/>
+                </a:tc>
+                <a:tc>
+                  <a:txBody>
+                    <a:bodyPr/>
+                    <a:lstStyle/>
+                    <a:p>
+                      <a:r>
+                        <a:rPr lang="en-US" dirty="0"/>
+                        <a:t>Centralized</a:t>
+                      </a:r>
+                    </a:p>
+                  </a:txBody>
+                  <a:tcPr>
+                    <a:solidFill>
+                      <a:schemeClr val="bg1">
+                        <a:lumMod val="75000"/>
+                      </a:schemeClr>
+                    </a:solidFill>
+                  </a:tcPr>
+                </a:tc>
+                <a:extLst>
+                  <a:ext uri="{0D108BD9-81ED-4DB2-BD59-A6C34878D82A}">
+                    <a16:rowId xmlns:a16="http://schemas.microsoft.com/office/drawing/2014/main" val="653698369"/>
+                  </a:ext>
+                </a:extLst>
+              </a:tr>
+              <a:tr h="370840">
+                <a:tc>
+                  <a:txBody>
+                    <a:bodyPr/>
+                    <a:lstStyle/>
+                    <a:p>
+                      <a:r>
+                        <a:rPr lang="en-US" dirty="0"/>
+                        <a:t>XB</a:t>
+                      </a:r>
+                    </a:p>
+                  </a:txBody>
+                  <a:tcPr/>
+                </a:tc>
+                <a:tc>
+                  <a:txBody>
+                    <a:bodyPr/>
+                    <a:lstStyle/>
+                    <a:p>
+                      <a:pPr marL="0" marR="0" indent="0" algn="l" defTabSz="914400" rtl="0" eaLnBrk="1" fontAlgn="auto" latinLnBrk="0" hangingPunct="1">
+                        <a:lnSpc>
+                          <a:spcPct val="100000"/>
+                        </a:lnSpc>
+                        <a:spcBef>
+                          <a:spcPts val="0"/>
+                        </a:spcBef>
+                        <a:spcAft>
+                          <a:spcPts val="0"/>
+                        </a:spcAft>
+                        <a:buClrTx/>
+                        <a:buSzTx/>
+                        <a:buFontTx/>
+                        <a:buNone/>
+                        <a:tabLst/>
+                        <a:defRPr/>
+                      </a:pPr>
+                      <a:r>
+                        <a:rPr lang="en-US" b="1" dirty="0"/>
+                        <a:t>Hardened Infra w/o</a:t>
+                      </a:r>
+                      <a:r>
+                        <a:rPr lang="en-US" b="1" baseline="0" dirty="0"/>
+                        <a:t> IRP</a:t>
+                      </a:r>
+                    </a:p>
+                  </a:txBody>
+                  <a:tcPr/>
+                </a:tc>
+                <a:tc>
+                  <a:txBody>
+                    <a:bodyPr/>
+                    <a:lstStyle/>
+                    <a:p>
+                      <a:r>
+                        <a:rPr lang="en-US" dirty="0"/>
+                        <a:t>Distributed</a:t>
+                      </a:r>
+                    </a:p>
+                  </a:txBody>
+                  <a:tcPr>
+                    <a:solidFill>
+                      <a:schemeClr val="accent2">
+                        <a:lumMod val="60000"/>
+                        <a:lumOff val="40000"/>
+                      </a:schemeClr>
+                    </a:solidFill>
+                  </a:tcPr>
+                </a:tc>
+                <a:extLst>
+                  <a:ext uri="{0D108BD9-81ED-4DB2-BD59-A6C34878D82A}">
+                    <a16:rowId xmlns:a16="http://schemas.microsoft.com/office/drawing/2014/main" val="275822130"/>
+                  </a:ext>
+                </a:extLst>
+              </a:tr>
+              <a:tr h="370840">
+                <a:tc>
+                  <a:txBody>
+                    <a:bodyPr/>
+                    <a:lstStyle/>
+                    <a:p>
+                      <a:r>
+                        <a:rPr lang="en-US" dirty="0"/>
+                        <a:t>XC</a:t>
+                      </a:r>
+                    </a:p>
+                  </a:txBody>
+                  <a:tcPr/>
+                </a:tc>
+                <a:tc>
+                  <a:txBody>
+                    <a:bodyPr/>
+                    <a:lstStyle/>
+                    <a:p>
+                      <a:pPr marL="0" marR="0" indent="0" algn="l" defTabSz="914400" rtl="0" eaLnBrk="1" fontAlgn="auto" latinLnBrk="0" hangingPunct="1">
+                        <a:lnSpc>
+                          <a:spcPct val="100000"/>
+                        </a:lnSpc>
+                        <a:spcBef>
+                          <a:spcPts val="0"/>
+                        </a:spcBef>
+                        <a:spcAft>
+                          <a:spcPts val="0"/>
+                        </a:spcAft>
+                        <a:buClrTx/>
+                        <a:buSzTx/>
+                        <a:buFontTx/>
+                        <a:buNone/>
+                        <a:tabLst/>
+                        <a:defRPr/>
+                      </a:pPr>
+                      <a:r>
+                        <a:rPr lang="en-US" b="1" dirty="0"/>
+                        <a:t>Hardened Infra w/o</a:t>
+                      </a:r>
+                      <a:r>
+                        <a:rPr lang="en-US" b="1" baseline="0" dirty="0"/>
+                        <a:t> IRP</a:t>
+                      </a:r>
+                    </a:p>
+                  </a:txBody>
+                  <a:tcPr/>
+                </a:tc>
+                <a:tc>
+                  <a:txBody>
+                    <a:bodyPr/>
+                    <a:lstStyle/>
+                    <a:p>
+                      <a:r>
+                        <a:rPr lang="en-US" dirty="0"/>
+                        <a:t>Business-as-usual</a:t>
+                      </a:r>
+                    </a:p>
+                  </a:txBody>
+                  <a:tcPr>
+                    <a:solidFill>
+                      <a:srgbClr val="0070C0"/>
+                    </a:solidFill>
+                  </a:tcPr>
+                </a:tc>
+                <a:extLst>
+                  <a:ext uri="{0D108BD9-81ED-4DB2-BD59-A6C34878D82A}">
+                    <a16:rowId xmlns:a16="http://schemas.microsoft.com/office/drawing/2014/main" val="3258577534"/>
+                  </a:ext>
+                </a:extLst>
+              </a:tr>
+              <a:tr h="370840">
+                <a:tc>
+                  <a:txBody>
+                    <a:bodyPr/>
+                    <a:lstStyle/>
+                    <a:p>
+                      <a:r>
+                        <a:rPr lang="en-US" dirty="0"/>
+                        <a:t>YA</a:t>
+                      </a:r>
+                    </a:p>
+                  </a:txBody>
+                  <a:tcPr/>
+                </a:tc>
+                <a:tc>
+                  <a:txBody>
+                    <a:bodyPr/>
+                    <a:lstStyle/>
+                    <a:p>
+                      <a:pPr marL="0" marR="0" indent="0" algn="l" defTabSz="914400" rtl="0" eaLnBrk="1" fontAlgn="auto" latinLnBrk="0" hangingPunct="1">
+                        <a:lnSpc>
+                          <a:spcPct val="100000"/>
+                        </a:lnSpc>
+                        <a:spcBef>
+                          <a:spcPts val="0"/>
+                        </a:spcBef>
+                        <a:spcAft>
+                          <a:spcPts val="0"/>
+                        </a:spcAft>
+                        <a:buClrTx/>
+                        <a:buSzTx/>
+                        <a:buFontTx/>
+                        <a:buNone/>
+                        <a:tabLst/>
+                        <a:defRPr/>
+                      </a:pPr>
+                      <a:r>
+                        <a:rPr lang="en-US" dirty="0"/>
+                        <a:t>Current Infra w/</a:t>
+                      </a:r>
+                      <a:r>
+                        <a:rPr lang="en-US" baseline="0" dirty="0"/>
+                        <a:t> IRP</a:t>
+                      </a:r>
+                    </a:p>
+                  </a:txBody>
+                  <a:tcPr/>
+                </a:tc>
+                <a:tc>
+                  <a:txBody>
+                    <a:bodyPr/>
+                    <a:lstStyle/>
+                    <a:p>
+                      <a:r>
+                        <a:rPr lang="en-US" dirty="0"/>
+                        <a:t>Centralized</a:t>
+                      </a:r>
+                    </a:p>
+                  </a:txBody>
+                  <a:tcPr>
+                    <a:solidFill>
+                      <a:schemeClr val="bg1">
+                        <a:lumMod val="75000"/>
+                      </a:schemeClr>
+                    </a:solidFill>
+                  </a:tcPr>
+                </a:tc>
+                <a:extLst>
+                  <a:ext uri="{0D108BD9-81ED-4DB2-BD59-A6C34878D82A}">
+                    <a16:rowId xmlns:a16="http://schemas.microsoft.com/office/drawing/2014/main" val="3380108376"/>
+                  </a:ext>
+                </a:extLst>
+              </a:tr>
+              <a:tr h="370840">
+                <a:tc>
+                  <a:txBody>
+                    <a:bodyPr/>
+                    <a:lstStyle/>
+                    <a:p>
+                      <a:r>
+                        <a:rPr lang="en-US" dirty="0"/>
+                        <a:t>YB</a:t>
+                      </a:r>
+                    </a:p>
+                  </a:txBody>
+                  <a:tcPr/>
+                </a:tc>
+                <a:tc>
+                  <a:txBody>
+                    <a:bodyPr/>
+                    <a:lstStyle/>
+                    <a:p>
+                      <a:pPr marL="0" marR="0" indent="0" algn="l" defTabSz="914400" rtl="0" eaLnBrk="1" fontAlgn="auto" latinLnBrk="0" hangingPunct="1">
+                        <a:lnSpc>
+                          <a:spcPct val="100000"/>
+                        </a:lnSpc>
+                        <a:spcBef>
+                          <a:spcPts val="0"/>
+                        </a:spcBef>
+                        <a:spcAft>
+                          <a:spcPts val="0"/>
+                        </a:spcAft>
+                        <a:buClrTx/>
+                        <a:buSzTx/>
+                        <a:buFontTx/>
+                        <a:buNone/>
+                        <a:tabLst/>
+                        <a:defRPr/>
+                      </a:pPr>
+                      <a:r>
+                        <a:rPr lang="en-US" dirty="0"/>
+                        <a:t>Current Infra w/</a:t>
+                      </a:r>
+                      <a:r>
+                        <a:rPr lang="en-US" baseline="0" dirty="0"/>
+                        <a:t> IRP</a:t>
+                      </a:r>
+                    </a:p>
+                  </a:txBody>
+                  <a:tcPr/>
+                </a:tc>
+                <a:tc>
+                  <a:txBody>
+                    <a:bodyPr/>
+                    <a:lstStyle/>
+                    <a:p>
+                      <a:r>
+                        <a:rPr lang="en-US" dirty="0"/>
+                        <a:t>Distributed</a:t>
+                      </a:r>
+                    </a:p>
+                  </a:txBody>
+                  <a:tcPr>
+                    <a:solidFill>
+                      <a:schemeClr val="accent2">
+                        <a:lumMod val="60000"/>
+                        <a:lumOff val="40000"/>
+                      </a:schemeClr>
+                    </a:solidFill>
+                  </a:tcPr>
+                </a:tc>
+                <a:extLst>
+                  <a:ext uri="{0D108BD9-81ED-4DB2-BD59-A6C34878D82A}">
+                    <a16:rowId xmlns:a16="http://schemas.microsoft.com/office/drawing/2014/main" val="4171818030"/>
+                  </a:ext>
+                </a:extLst>
+              </a:tr>
+              <a:tr h="370840">
+                <a:tc>
+                  <a:txBody>
+                    <a:bodyPr/>
+                    <a:lstStyle/>
+                    <a:p>
+                      <a:r>
+                        <a:rPr lang="en-US" dirty="0"/>
+                        <a:t>ZA</a:t>
+                      </a:r>
+                    </a:p>
+                  </a:txBody>
+                  <a:tcPr/>
+                </a:tc>
+                <a:tc>
+                  <a:txBody>
+                    <a:bodyPr/>
+                    <a:lstStyle/>
+                    <a:p>
+                      <a:pPr marL="0" marR="0" indent="0" algn="l" defTabSz="914400" rtl="0" eaLnBrk="1" fontAlgn="auto" latinLnBrk="0" hangingPunct="1">
+                        <a:lnSpc>
+                          <a:spcPct val="100000"/>
+                        </a:lnSpc>
+                        <a:spcBef>
+                          <a:spcPts val="0"/>
+                        </a:spcBef>
+                        <a:spcAft>
+                          <a:spcPts val="0"/>
+                        </a:spcAft>
+                        <a:buClrTx/>
+                        <a:buSzTx/>
+                        <a:buFontTx/>
+                        <a:buNone/>
+                        <a:tabLst/>
+                        <a:defRPr/>
+                      </a:pPr>
+                      <a:r>
+                        <a:rPr lang="en-US" b="1" dirty="0"/>
+                        <a:t>Hardened Infra w/</a:t>
+                      </a:r>
+                      <a:r>
+                        <a:rPr lang="en-US" b="1" baseline="0" dirty="0"/>
+                        <a:t> IRP</a:t>
+                      </a:r>
+                    </a:p>
+                  </a:txBody>
+                  <a:tcPr/>
+                </a:tc>
+                <a:tc>
+                  <a:txBody>
+                    <a:bodyPr/>
+                    <a:lstStyle/>
+                    <a:p>
+                      <a:r>
+                        <a:rPr lang="en-US" dirty="0"/>
+                        <a:t>Centralized</a:t>
+                      </a:r>
+                    </a:p>
+                  </a:txBody>
+                  <a:tcPr>
+                    <a:solidFill>
+                      <a:schemeClr val="bg1">
+                        <a:lumMod val="75000"/>
+                      </a:schemeClr>
+                    </a:solidFill>
+                  </a:tcPr>
+                </a:tc>
+                <a:extLst>
+                  <a:ext uri="{0D108BD9-81ED-4DB2-BD59-A6C34878D82A}">
+                    <a16:rowId xmlns:a16="http://schemas.microsoft.com/office/drawing/2014/main" val="1475263509"/>
+                  </a:ext>
+                </a:extLst>
+              </a:tr>
+              <a:tr h="370840">
+                <a:tc>
+                  <a:txBody>
+                    <a:bodyPr/>
+                    <a:lstStyle/>
+                    <a:p>
+                      <a:r>
+                        <a:rPr lang="en-US" dirty="0"/>
+                        <a:t>ZB</a:t>
+                      </a:r>
+                    </a:p>
+                  </a:txBody>
+                  <a:tcPr/>
+                </a:tc>
+                <a:tc>
+                  <a:txBody>
+                    <a:bodyPr/>
+                    <a:lstStyle/>
+                    <a:p>
+                      <a:pPr marL="0" marR="0" indent="0" algn="l" defTabSz="914400" rtl="0" eaLnBrk="1" fontAlgn="auto" latinLnBrk="0" hangingPunct="1">
+                        <a:lnSpc>
+                          <a:spcPct val="100000"/>
+                        </a:lnSpc>
+                        <a:spcBef>
+                          <a:spcPts val="0"/>
+                        </a:spcBef>
+                        <a:spcAft>
+                          <a:spcPts val="0"/>
+                        </a:spcAft>
+                        <a:buClrTx/>
+                        <a:buSzTx/>
+                        <a:buFontTx/>
+                        <a:buNone/>
+                        <a:tabLst/>
+                        <a:defRPr/>
+                      </a:pPr>
+                      <a:r>
+                        <a:rPr lang="en-US" b="1" dirty="0"/>
+                        <a:t>Hardened Infra w/</a:t>
+                      </a:r>
+                      <a:r>
+                        <a:rPr lang="en-US" b="1" baseline="0" dirty="0"/>
+                        <a:t> IRP</a:t>
+                      </a:r>
+                    </a:p>
+                  </a:txBody>
+                  <a:tcPr/>
+                </a:tc>
+                <a:tc>
+                  <a:txBody>
+                    <a:bodyPr/>
+                    <a:lstStyle/>
+                    <a:p>
+                      <a:r>
+                        <a:rPr lang="en-US" dirty="0"/>
+                        <a:t>Distributed</a:t>
+                      </a:r>
+                    </a:p>
+                  </a:txBody>
+                  <a:tcPr>
+                    <a:solidFill>
+                      <a:schemeClr val="accent2">
+                        <a:lumMod val="60000"/>
+                        <a:lumOff val="40000"/>
+                      </a:schemeClr>
+                    </a:solidFill>
+                  </a:tcPr>
+                </a:tc>
+                <a:extLst>
+                  <a:ext uri="{0D108BD9-81ED-4DB2-BD59-A6C34878D82A}">
+                    <a16:rowId xmlns:a16="http://schemas.microsoft.com/office/drawing/2014/main" val="3826412125"/>
+                  </a:ext>
+                </a:extLst>
+              </a:tr>
+            </a:tbl>
+          </a:graphicData>
+        </a:graphic>
+      </p:graphicFrame>
+    </p:spTree>
+    <p:extLst>
+      <p:ext uri="{BB962C8B-B14F-4D97-AF65-F5344CB8AC3E}">
+        <p14:creationId xmlns:p14="http://schemas.microsoft.com/office/powerpoint/2010/main" val="903188008"/>
       </p:ext>
     </p:extLst>
   </p:cSld>

</xml_diff>

<commit_message>
updated puerto rico stochastics
</commit_message>
<xml_diff>
--- a/projects/puerto_rico_stoch/data/scenario_overview.pptx
+++ b/projects/puerto_rico_stoch/data/scenario_overview.pptx
@@ -5360,14 +5360,14 @@
           <p:nvPr>
             <p:extLst>
               <p:ext uri="{D42A27DB-BD31-4B8C-83A1-F6EECF244321}">
-                <p14:modId xmlns:p14="http://schemas.microsoft.com/office/powerpoint/2010/main" val="4130699278"/>
+                <p14:modId xmlns:p14="http://schemas.microsoft.com/office/powerpoint/2010/main" val="1295995901"/>
               </p:ext>
             </p:extLst>
           </p:nvPr>
         </p:nvGraphicFramePr>
         <p:xfrm>
           <a:off x="4399185" y="291355"/>
-          <a:ext cx="7721649" cy="4820920"/>
+          <a:ext cx="7721649" cy="6304280"/>
         </p:xfrm>
         <a:graphic>
           <a:graphicData uri="http://schemas.openxmlformats.org/drawingml/2006/table">
@@ -5764,44 +5764,7 @@
                     <a:bodyPr/>
                     <a:lstStyle/>
                     <a:p>
-                      <a:r>
-                        <a:rPr lang="en-US" dirty="0"/>
-                        <a:t>Business-as-usual</a:t>
-                      </a:r>
-                    </a:p>
-                  </a:txBody>
-                  <a:tcPr>
-                    <a:solidFill>
-                      <a:srgbClr val="0070C0"/>
-                    </a:solidFill>
-                  </a:tcPr>
-                </a:tc>
-                <a:extLst>
-                  <a:ext uri="{0D108BD9-81ED-4DB2-BD59-A6C34878D82A}">
-                    <a16:rowId xmlns:a16="http://schemas.microsoft.com/office/drawing/2014/main" val="1629897343"/>
-                  </a:ext>
-                </a:extLst>
-              </a:tr>
-              <a:tr h="370840">
-                <a:tc>
-                  <a:txBody>
-                    <a:bodyPr/>
-                    <a:lstStyle/>
-                    <a:p>
-                      <a:r>
-                        <a:rPr lang="en-US" dirty="0"/>
-                        <a:t>XA</a:t>
-                      </a:r>
-                    </a:p>
-                  </a:txBody>
-                  <a:tcPr/>
-                </a:tc>
-                <a:tc>
-                  <a:txBody>
-                    <a:bodyPr/>
-                    <a:lstStyle/>
-                    <a:p>
-                      <a:pPr marL="0" marR="0" indent="0" algn="l" defTabSz="914400" rtl="0" eaLnBrk="1" fontAlgn="auto" latinLnBrk="0" hangingPunct="1">
+                      <a:pPr marL="0" marR="0" lvl="0" indent="0" algn="l" defTabSz="914400" rtl="0" eaLnBrk="1" fontAlgn="auto" latinLnBrk="0" hangingPunct="1">
                         <a:lnSpc>
                           <a:spcPct val="100000"/>
                         </a:lnSpc>
@@ -5819,39 +5782,20 @@
                         <a:defRPr/>
                       </a:pPr>
                       <a:r>
-                        <a:rPr lang="en-US" b="1" dirty="0"/>
-                        <a:t>Hardened Infra w/o</a:t>
-                      </a:r>
-                      <a:r>
-                        <a:rPr lang="en-US" b="1" baseline="0" dirty="0"/>
-                        <a:t> IRP</a:t>
-                      </a:r>
-                    </a:p>
-                  </a:txBody>
-                  <a:tcPr/>
-                </a:tc>
-                <a:tc>
-                  <a:txBody>
-                    <a:bodyPr/>
-                    <a:lstStyle/>
-                    <a:p>
-                      <a:r>
-                        <a:rPr lang="en-US" dirty="0"/>
-                        <a:t>Centralized</a:t>
+                        <a:rPr lang="en-US" dirty="0"/>
+                        <a:t>Distributed w/o Wind</a:t>
                       </a:r>
                     </a:p>
                   </a:txBody>
                   <a:tcPr>
                     <a:solidFill>
-                      <a:schemeClr val="bg1">
-                        <a:lumMod val="75000"/>
-                      </a:schemeClr>
+                      <a:srgbClr val="7030A0"/>
                     </a:solidFill>
                   </a:tcPr>
                 </a:tc>
                 <a:extLst>
                   <a:ext uri="{0D108BD9-81ED-4DB2-BD59-A6C34878D82A}">
-                    <a16:rowId xmlns:a16="http://schemas.microsoft.com/office/drawing/2014/main" val="653698369"/>
+                    <a16:rowId xmlns:a16="http://schemas.microsoft.com/office/drawing/2014/main" val="1721866569"/>
                   </a:ext>
                 </a:extLst>
               </a:tr>
@@ -5863,7 +5807,7 @@
                     <a:p>
                       <a:r>
                         <a:rPr lang="en-US" dirty="0"/>
-                        <a:t>XB</a:t>
+                        <a:t>WD</a:t>
                       </a:r>
                     </a:p>
                   </a:txBody>
@@ -5892,6 +5836,150 @@
                         <a:defRPr/>
                       </a:pPr>
                       <a:r>
+                        <a:rPr lang="en-US" dirty="0"/>
+                        <a:t>Current Infra w/o</a:t>
+                      </a:r>
+                      <a:r>
+                        <a:rPr lang="en-US" baseline="0" dirty="0"/>
+                        <a:t> IRP</a:t>
+                      </a:r>
+                    </a:p>
+                  </a:txBody>
+                  <a:tcPr/>
+                </a:tc>
+                <a:tc>
+                  <a:txBody>
+                    <a:bodyPr/>
+                    <a:lstStyle/>
+                    <a:p>
+                      <a:r>
+                        <a:rPr lang="en-US" dirty="0"/>
+                        <a:t>Business-as-usual</a:t>
+                      </a:r>
+                    </a:p>
+                  </a:txBody>
+                  <a:tcPr>
+                    <a:solidFill>
+                      <a:srgbClr val="0070C0"/>
+                    </a:solidFill>
+                  </a:tcPr>
+                </a:tc>
+                <a:extLst>
+                  <a:ext uri="{0D108BD9-81ED-4DB2-BD59-A6C34878D82A}">
+                    <a16:rowId xmlns:a16="http://schemas.microsoft.com/office/drawing/2014/main" val="1629897343"/>
+                  </a:ext>
+                </a:extLst>
+              </a:tr>
+              <a:tr h="370840">
+                <a:tc>
+                  <a:txBody>
+                    <a:bodyPr/>
+                    <a:lstStyle/>
+                    <a:p>
+                      <a:r>
+                        <a:rPr lang="en-US" dirty="0"/>
+                        <a:t>XA</a:t>
+                      </a:r>
+                    </a:p>
+                  </a:txBody>
+                  <a:tcPr/>
+                </a:tc>
+                <a:tc>
+                  <a:txBody>
+                    <a:bodyPr/>
+                    <a:lstStyle/>
+                    <a:p>
+                      <a:pPr marL="0" marR="0" indent="0" algn="l" defTabSz="914400" rtl="0" eaLnBrk="1" fontAlgn="auto" latinLnBrk="0" hangingPunct="1">
+                        <a:lnSpc>
+                          <a:spcPct val="100000"/>
+                        </a:lnSpc>
+                        <a:spcBef>
+                          <a:spcPts val="0"/>
+                        </a:spcBef>
+                        <a:spcAft>
+                          <a:spcPts val="0"/>
+                        </a:spcAft>
+                        <a:buClrTx/>
+                        <a:buSzTx/>
+                        <a:buFontTx/>
+                        <a:buNone/>
+                        <a:tabLst/>
+                        <a:defRPr/>
+                      </a:pPr>
+                      <a:r>
+                        <a:rPr lang="en-US" b="1" dirty="0"/>
+                        <a:t>Hardened Infra w/o</a:t>
+                      </a:r>
+                      <a:r>
+                        <a:rPr lang="en-US" b="1" baseline="0" dirty="0"/>
+                        <a:t> IRP</a:t>
+                      </a:r>
+                    </a:p>
+                  </a:txBody>
+                  <a:tcPr/>
+                </a:tc>
+                <a:tc>
+                  <a:txBody>
+                    <a:bodyPr/>
+                    <a:lstStyle/>
+                    <a:p>
+                      <a:r>
+                        <a:rPr lang="en-US" dirty="0"/>
+                        <a:t>Centralized</a:t>
+                      </a:r>
+                    </a:p>
+                  </a:txBody>
+                  <a:tcPr>
+                    <a:solidFill>
+                      <a:schemeClr val="bg1">
+                        <a:lumMod val="75000"/>
+                      </a:schemeClr>
+                    </a:solidFill>
+                  </a:tcPr>
+                </a:tc>
+                <a:extLst>
+                  <a:ext uri="{0D108BD9-81ED-4DB2-BD59-A6C34878D82A}">
+                    <a16:rowId xmlns:a16="http://schemas.microsoft.com/office/drawing/2014/main" val="653698369"/>
+                  </a:ext>
+                </a:extLst>
+              </a:tr>
+              <a:tr h="370840">
+                <a:tc>
+                  <a:txBody>
+                    <a:bodyPr/>
+                    <a:lstStyle/>
+                    <a:p>
+                      <a:r>
+                        <a:rPr lang="en-US" dirty="0"/>
+                        <a:t>XB</a:t>
+                      </a:r>
+                    </a:p>
+                  </a:txBody>
+                  <a:tcPr/>
+                </a:tc>
+                <a:tc>
+                  <a:txBody>
+                    <a:bodyPr/>
+                    <a:lstStyle/>
+                    <a:p>
+                      <a:pPr marL="0" marR="0" indent="0" algn="l" defTabSz="914400" rtl="0" eaLnBrk="1" fontAlgn="auto" latinLnBrk="0" hangingPunct="1">
+                        <a:lnSpc>
+                          <a:spcPct val="100000"/>
+                        </a:lnSpc>
+                        <a:spcBef>
+                          <a:spcPts val="0"/>
+                        </a:spcBef>
+                        <a:spcAft>
+                          <a:spcPts val="0"/>
+                        </a:spcAft>
+                        <a:buClrTx/>
+                        <a:buSzTx/>
+                        <a:buFontTx/>
+                        <a:buNone/>
+                        <a:tabLst/>
+                        <a:defRPr/>
+                      </a:pPr>
+                      <a:r>
                         <a:rPr lang="en-US" b="1" dirty="0"/>
                         <a:t>Hardened Infra w/o</a:t>
                       </a:r>
@@ -5948,7 +6036,7 @@
                     <a:bodyPr/>
                     <a:lstStyle/>
                     <a:p>
-                      <a:pPr marL="0" marR="0" indent="0" algn="l" defTabSz="914400" rtl="0" eaLnBrk="1" fontAlgn="auto" latinLnBrk="0" hangingPunct="1">
+                      <a:pPr marL="0" marR="0" lvl="0" indent="0" algn="l" defTabSz="914400" rtl="0" eaLnBrk="1" fontAlgn="auto" latinLnBrk="0" hangingPunct="1">
                         <a:lnSpc>
                           <a:spcPct val="100000"/>
                         </a:lnSpc>
@@ -5982,44 +6070,7 @@
                     <a:bodyPr/>
                     <a:lstStyle/>
                     <a:p>
-                      <a:r>
-                        <a:rPr lang="en-US" dirty="0"/>
-                        <a:t>Business-as-usual</a:t>
-                      </a:r>
-                    </a:p>
-                  </a:txBody>
-                  <a:tcPr>
-                    <a:solidFill>
-                      <a:srgbClr val="0070C0"/>
-                    </a:solidFill>
-                  </a:tcPr>
-                </a:tc>
-                <a:extLst>
-                  <a:ext uri="{0D108BD9-81ED-4DB2-BD59-A6C34878D82A}">
-                    <a16:rowId xmlns:a16="http://schemas.microsoft.com/office/drawing/2014/main" val="3258577534"/>
-                  </a:ext>
-                </a:extLst>
-              </a:tr>
-              <a:tr h="370840">
-                <a:tc>
-                  <a:txBody>
-                    <a:bodyPr/>
-                    <a:lstStyle/>
-                    <a:p>
-                      <a:r>
-                        <a:rPr lang="en-US" dirty="0"/>
-                        <a:t>YA</a:t>
-                      </a:r>
-                    </a:p>
-                  </a:txBody>
-                  <a:tcPr/>
-                </a:tc>
-                <a:tc>
-                  <a:txBody>
-                    <a:bodyPr/>
-                    <a:lstStyle/>
-                    <a:p>
-                      <a:pPr marL="0" marR="0" indent="0" algn="l" defTabSz="914400" rtl="0" eaLnBrk="1" fontAlgn="auto" latinLnBrk="0" hangingPunct="1">
+                      <a:pPr marL="0" marR="0" lvl="0" indent="0" algn="l" defTabSz="914400" rtl="0" eaLnBrk="1" fontAlgn="auto" latinLnBrk="0" hangingPunct="1">
                         <a:lnSpc>
                           <a:spcPct val="100000"/>
                         </a:lnSpc>
@@ -6038,38 +6089,19 @@
                       </a:pPr>
                       <a:r>
                         <a:rPr lang="en-US" dirty="0"/>
-                        <a:t>Current Infra w/</a:t>
-                      </a:r>
-                      <a:r>
-                        <a:rPr lang="en-US" baseline="0" dirty="0"/>
-                        <a:t> IRP</a:t>
-                      </a:r>
-                    </a:p>
-                  </a:txBody>
-                  <a:tcPr/>
-                </a:tc>
-                <a:tc>
-                  <a:txBody>
-                    <a:bodyPr/>
-                    <a:lstStyle/>
-                    <a:p>
-                      <a:r>
-                        <a:rPr lang="en-US" dirty="0"/>
-                        <a:t>Centralized</a:t>
+                        <a:t>Distributed w/o Wind</a:t>
                       </a:r>
                     </a:p>
                   </a:txBody>
                   <a:tcPr>
                     <a:solidFill>
-                      <a:schemeClr val="bg1">
-                        <a:lumMod val="75000"/>
-                      </a:schemeClr>
+                      <a:srgbClr val="7030A0"/>
                     </a:solidFill>
                   </a:tcPr>
                 </a:tc>
                 <a:extLst>
                   <a:ext uri="{0D108BD9-81ED-4DB2-BD59-A6C34878D82A}">
-                    <a16:rowId xmlns:a16="http://schemas.microsoft.com/office/drawing/2014/main" val="3380108376"/>
+                    <a16:rowId xmlns:a16="http://schemas.microsoft.com/office/drawing/2014/main" val="1180886549"/>
                   </a:ext>
                 </a:extLst>
               </a:tr>
@@ -6081,7 +6113,7 @@
                     <a:p>
                       <a:r>
                         <a:rPr lang="en-US" dirty="0"/>
-                        <a:t>YB</a:t>
+                        <a:t>XD</a:t>
                       </a:r>
                     </a:p>
                   </a:txBody>
@@ -6110,6 +6142,150 @@
                         <a:defRPr/>
                       </a:pPr>
                       <a:r>
+                        <a:rPr lang="en-US" b="1" dirty="0"/>
+                        <a:t>Hardened Infra w/o</a:t>
+                      </a:r>
+                      <a:r>
+                        <a:rPr lang="en-US" b="1" baseline="0" dirty="0"/>
+                        <a:t> IRP</a:t>
+                      </a:r>
+                    </a:p>
+                  </a:txBody>
+                  <a:tcPr/>
+                </a:tc>
+                <a:tc>
+                  <a:txBody>
+                    <a:bodyPr/>
+                    <a:lstStyle/>
+                    <a:p>
+                      <a:r>
+                        <a:rPr lang="en-US" dirty="0"/>
+                        <a:t>Business-as-usual</a:t>
+                      </a:r>
+                    </a:p>
+                  </a:txBody>
+                  <a:tcPr>
+                    <a:solidFill>
+                      <a:srgbClr val="0070C0"/>
+                    </a:solidFill>
+                  </a:tcPr>
+                </a:tc>
+                <a:extLst>
+                  <a:ext uri="{0D108BD9-81ED-4DB2-BD59-A6C34878D82A}">
+                    <a16:rowId xmlns:a16="http://schemas.microsoft.com/office/drawing/2014/main" val="3258577534"/>
+                  </a:ext>
+                </a:extLst>
+              </a:tr>
+              <a:tr h="370840">
+                <a:tc>
+                  <a:txBody>
+                    <a:bodyPr/>
+                    <a:lstStyle/>
+                    <a:p>
+                      <a:r>
+                        <a:rPr lang="en-US" dirty="0"/>
+                        <a:t>YA</a:t>
+                      </a:r>
+                    </a:p>
+                  </a:txBody>
+                  <a:tcPr/>
+                </a:tc>
+                <a:tc>
+                  <a:txBody>
+                    <a:bodyPr/>
+                    <a:lstStyle/>
+                    <a:p>
+                      <a:pPr marL="0" marR="0" indent="0" algn="l" defTabSz="914400" rtl="0" eaLnBrk="1" fontAlgn="auto" latinLnBrk="0" hangingPunct="1">
+                        <a:lnSpc>
+                          <a:spcPct val="100000"/>
+                        </a:lnSpc>
+                        <a:spcBef>
+                          <a:spcPts val="0"/>
+                        </a:spcBef>
+                        <a:spcAft>
+                          <a:spcPts val="0"/>
+                        </a:spcAft>
+                        <a:buClrTx/>
+                        <a:buSzTx/>
+                        <a:buFontTx/>
+                        <a:buNone/>
+                        <a:tabLst/>
+                        <a:defRPr/>
+                      </a:pPr>
+                      <a:r>
+                        <a:rPr lang="en-US" dirty="0"/>
+                        <a:t>Current Infra w/</a:t>
+                      </a:r>
+                      <a:r>
+                        <a:rPr lang="en-US" baseline="0" dirty="0"/>
+                        <a:t> IRP</a:t>
+                      </a:r>
+                    </a:p>
+                  </a:txBody>
+                  <a:tcPr/>
+                </a:tc>
+                <a:tc>
+                  <a:txBody>
+                    <a:bodyPr/>
+                    <a:lstStyle/>
+                    <a:p>
+                      <a:r>
+                        <a:rPr lang="en-US" dirty="0"/>
+                        <a:t>Centralized</a:t>
+                      </a:r>
+                    </a:p>
+                  </a:txBody>
+                  <a:tcPr>
+                    <a:solidFill>
+                      <a:schemeClr val="bg1">
+                        <a:lumMod val="75000"/>
+                      </a:schemeClr>
+                    </a:solidFill>
+                  </a:tcPr>
+                </a:tc>
+                <a:extLst>
+                  <a:ext uri="{0D108BD9-81ED-4DB2-BD59-A6C34878D82A}">
+                    <a16:rowId xmlns:a16="http://schemas.microsoft.com/office/drawing/2014/main" val="3380108376"/>
+                  </a:ext>
+                </a:extLst>
+              </a:tr>
+              <a:tr h="370840">
+                <a:tc>
+                  <a:txBody>
+                    <a:bodyPr/>
+                    <a:lstStyle/>
+                    <a:p>
+                      <a:r>
+                        <a:rPr lang="en-US" dirty="0"/>
+                        <a:t>YB</a:t>
+                      </a:r>
+                    </a:p>
+                  </a:txBody>
+                  <a:tcPr/>
+                </a:tc>
+                <a:tc>
+                  <a:txBody>
+                    <a:bodyPr/>
+                    <a:lstStyle/>
+                    <a:p>
+                      <a:pPr marL="0" marR="0" indent="0" algn="l" defTabSz="914400" rtl="0" eaLnBrk="1" fontAlgn="auto" latinLnBrk="0" hangingPunct="1">
+                        <a:lnSpc>
+                          <a:spcPct val="100000"/>
+                        </a:lnSpc>
+                        <a:spcBef>
+                          <a:spcPts val="0"/>
+                        </a:spcBef>
+                        <a:spcAft>
+                          <a:spcPts val="0"/>
+                        </a:spcAft>
+                        <a:buClrTx/>
+                        <a:buSzTx/>
+                        <a:buFontTx/>
+                        <a:buNone/>
+                        <a:tabLst/>
+                        <a:defRPr/>
+                      </a:pPr>
+                      <a:r>
                         <a:rPr lang="en-US" dirty="0"/>
                         <a:t>Current Infra w/</a:t>
                       </a:r>
@@ -6155,18 +6331,18 @@
                     <a:p>
                       <a:r>
                         <a:rPr lang="en-US" dirty="0"/>
-                        <a:t>ZA</a:t>
-                      </a:r>
-                    </a:p>
-                  </a:txBody>
-                  <a:tcPr/>
-                </a:tc>
-                <a:tc>
-                  <a:txBody>
-                    <a:bodyPr/>
-                    <a:lstStyle/>
-                    <a:p>
-                      <a:pPr marL="0" marR="0" indent="0" algn="l" defTabSz="914400" rtl="0" eaLnBrk="1" fontAlgn="auto" latinLnBrk="0" hangingPunct="1">
+                        <a:t>YC</a:t>
+                      </a:r>
+                    </a:p>
+                  </a:txBody>
+                  <a:tcPr/>
+                </a:tc>
+                <a:tc>
+                  <a:txBody>
+                    <a:bodyPr/>
+                    <a:lstStyle/>
+                    <a:p>
+                      <a:pPr marL="0" marR="0" lvl="0" indent="0" algn="l" defTabSz="914400" rtl="0" eaLnBrk="1" fontAlgn="auto" latinLnBrk="0" hangingPunct="1">
                         <a:lnSpc>
                           <a:spcPct val="100000"/>
                         </a:lnSpc>
@@ -6184,11 +6360,11 @@
                         <a:defRPr/>
                       </a:pPr>
                       <a:r>
-                        <a:rPr lang="en-US" b="1" dirty="0"/>
-                        <a:t>Hardened Infra w/</a:t>
-                      </a:r>
-                      <a:r>
-                        <a:rPr lang="en-US" b="1" baseline="0" dirty="0"/>
+                        <a:rPr lang="en-US" dirty="0"/>
+                        <a:t>Current Infra w/</a:t>
+                      </a:r>
+                      <a:r>
+                        <a:rPr lang="en-US" baseline="0" dirty="0"/>
                         <a:t> IRP</a:t>
                       </a:r>
                     </a:p>
@@ -6202,21 +6378,19 @@
                     <a:p>
                       <a:r>
                         <a:rPr lang="en-US" dirty="0"/>
-                        <a:t>Centralized</a:t>
+                        <a:t>Distributed w/o Wind</a:t>
                       </a:r>
                     </a:p>
                   </a:txBody>
                   <a:tcPr>
                     <a:solidFill>
-                      <a:schemeClr val="bg1">
-                        <a:lumMod val="75000"/>
-                      </a:schemeClr>
+                      <a:srgbClr val="7030A0"/>
                     </a:solidFill>
                   </a:tcPr>
                 </a:tc>
                 <a:extLst>
                   <a:ext uri="{0D108BD9-81ED-4DB2-BD59-A6C34878D82A}">
-                    <a16:rowId xmlns:a16="http://schemas.microsoft.com/office/drawing/2014/main" val="1475263509"/>
+                    <a16:rowId xmlns:a16="http://schemas.microsoft.com/office/drawing/2014/main" val="2440716064"/>
                   </a:ext>
                 </a:extLst>
               </a:tr>
@@ -6228,7 +6402,7 @@
                     <a:p>
                       <a:r>
                         <a:rPr lang="en-US" dirty="0"/>
-                        <a:t>ZB</a:t>
+                        <a:t>ZA</a:t>
                       </a:r>
                     </a:p>
                   </a:txBody>
@@ -6275,6 +6449,79 @@
                     <a:p>
                       <a:r>
                         <a:rPr lang="en-US" dirty="0"/>
+                        <a:t>Centralized</a:t>
+                      </a:r>
+                    </a:p>
+                  </a:txBody>
+                  <a:tcPr>
+                    <a:solidFill>
+                      <a:schemeClr val="bg1">
+                        <a:lumMod val="75000"/>
+                      </a:schemeClr>
+                    </a:solidFill>
+                  </a:tcPr>
+                </a:tc>
+                <a:extLst>
+                  <a:ext uri="{0D108BD9-81ED-4DB2-BD59-A6C34878D82A}">
+                    <a16:rowId xmlns:a16="http://schemas.microsoft.com/office/drawing/2014/main" val="1475263509"/>
+                  </a:ext>
+                </a:extLst>
+              </a:tr>
+              <a:tr h="370840">
+                <a:tc>
+                  <a:txBody>
+                    <a:bodyPr/>
+                    <a:lstStyle/>
+                    <a:p>
+                      <a:r>
+                        <a:rPr lang="en-US" dirty="0"/>
+                        <a:t>ZB</a:t>
+                      </a:r>
+                    </a:p>
+                  </a:txBody>
+                  <a:tcPr/>
+                </a:tc>
+                <a:tc>
+                  <a:txBody>
+                    <a:bodyPr/>
+                    <a:lstStyle/>
+                    <a:p>
+                      <a:pPr marL="0" marR="0" indent="0" algn="l" defTabSz="914400" rtl="0" eaLnBrk="1" fontAlgn="auto" latinLnBrk="0" hangingPunct="1">
+                        <a:lnSpc>
+                          <a:spcPct val="100000"/>
+                        </a:lnSpc>
+                        <a:spcBef>
+                          <a:spcPts val="0"/>
+                        </a:spcBef>
+                        <a:spcAft>
+                          <a:spcPts val="0"/>
+                        </a:spcAft>
+                        <a:buClrTx/>
+                        <a:buSzTx/>
+                        <a:buFontTx/>
+                        <a:buNone/>
+                        <a:tabLst/>
+                        <a:defRPr/>
+                      </a:pPr>
+                      <a:r>
+                        <a:rPr lang="en-US" b="1" dirty="0"/>
+                        <a:t>Hardened Infra w/</a:t>
+                      </a:r>
+                      <a:r>
+                        <a:rPr lang="en-US" b="1" baseline="0" dirty="0"/>
+                        <a:t> IRP</a:t>
+                      </a:r>
+                    </a:p>
+                  </a:txBody>
+                  <a:tcPr/>
+                </a:tc>
+                <a:tc>
+                  <a:txBody>
+                    <a:bodyPr/>
+                    <a:lstStyle/>
+                    <a:p>
+                      <a:r>
+                        <a:rPr lang="en-US" dirty="0"/>
                         <a:t>Distributed</a:t>
                       </a:r>
                     </a:p>
@@ -6291,6 +6538,94 @@
                 <a:extLst>
                   <a:ext uri="{0D108BD9-81ED-4DB2-BD59-A6C34878D82A}">
                     <a16:rowId xmlns:a16="http://schemas.microsoft.com/office/drawing/2014/main" val="3826412125"/>
+                  </a:ext>
+                </a:extLst>
+              </a:tr>
+              <a:tr h="370840">
+                <a:tc>
+                  <a:txBody>
+                    <a:bodyPr/>
+                    <a:lstStyle/>
+                    <a:p>
+                      <a:r>
+                        <a:rPr lang="en-US" dirty="0"/>
+                        <a:t>ZC</a:t>
+                      </a:r>
+                    </a:p>
+                  </a:txBody>
+                  <a:tcPr/>
+                </a:tc>
+                <a:tc>
+                  <a:txBody>
+                    <a:bodyPr/>
+                    <a:lstStyle/>
+                    <a:p>
+                      <a:pPr marL="0" marR="0" lvl="0" indent="0" algn="l" defTabSz="914400" rtl="0" eaLnBrk="1" fontAlgn="auto" latinLnBrk="0" hangingPunct="1">
+                        <a:lnSpc>
+                          <a:spcPct val="100000"/>
+                        </a:lnSpc>
+                        <a:spcBef>
+                          <a:spcPts val="0"/>
+                        </a:spcBef>
+                        <a:spcAft>
+                          <a:spcPts val="0"/>
+                        </a:spcAft>
+                        <a:buClrTx/>
+                        <a:buSzTx/>
+                        <a:buFontTx/>
+                        <a:buNone/>
+                        <a:tabLst/>
+                        <a:defRPr/>
+                      </a:pPr>
+                      <a:r>
+                        <a:rPr lang="en-US" b="1" dirty="0"/>
+                        <a:t>Hardened Infra w/</a:t>
+                      </a:r>
+                      <a:r>
+                        <a:rPr lang="en-US" b="1" baseline="0" dirty="0"/>
+                        <a:t> IRP</a:t>
+                      </a:r>
+                    </a:p>
+                  </a:txBody>
+                  <a:tcPr/>
+                </a:tc>
+                <a:tc>
+                  <a:txBody>
+                    <a:bodyPr/>
+                    <a:lstStyle/>
+                    <a:p>
+                      <a:pPr marL="0" marR="0" lvl="0" indent="0" algn="l" defTabSz="914400" rtl="0" eaLnBrk="1" fontAlgn="auto" latinLnBrk="0" hangingPunct="1">
+                        <a:lnSpc>
+                          <a:spcPct val="100000"/>
+                        </a:lnSpc>
+                        <a:spcBef>
+                          <a:spcPts val="0"/>
+                        </a:spcBef>
+                        <a:spcAft>
+                          <a:spcPts val="0"/>
+                        </a:spcAft>
+                        <a:buClrTx/>
+                        <a:buSzTx/>
+                        <a:buFontTx/>
+                        <a:buNone/>
+                        <a:tabLst/>
+                        <a:defRPr/>
+                      </a:pPr>
+                      <a:r>
+                        <a:rPr lang="en-US" dirty="0"/>
+                        <a:t>Distributed w/o Wind</a:t>
+                      </a:r>
+                    </a:p>
+                  </a:txBody>
+                  <a:tcPr>
+                    <a:solidFill>
+                      <a:srgbClr val="7030A0"/>
+                    </a:solidFill>
+                  </a:tcPr>
+                </a:tc>
+                <a:extLst>
+                  <a:ext uri="{0D108BD9-81ED-4DB2-BD59-A6C34878D82A}">
+                    <a16:rowId xmlns:a16="http://schemas.microsoft.com/office/drawing/2014/main" val="731984826"/>
                   </a:ext>
                 </a:extLst>
               </a:tr>

</xml_diff>

<commit_message>
updated puerto rico stochastics post processing
</commit_message>
<xml_diff>
--- a/projects/puerto_rico_stoch/data/scenario_overview.pptx
+++ b/projects/puerto_rico_stoch/data/scenario_overview.pptx
@@ -7,6 +7,7 @@
   <p:sldIdLst>
     <p:sldId id="257" r:id="rId2"/>
     <p:sldId id="259" r:id="rId3"/>
+    <p:sldId id="260" r:id="rId4"/>
   </p:sldIdLst>
   <p:sldSz cx="12192000" cy="6858000"/>
   <p:notesSz cx="6858000" cy="9144000"/>
@@ -242,7 +243,7 @@
           <a:p>
             <a:fld id="{4E0D474A-36D6-42D7-8D99-A750CFDD9A60}" type="datetimeFigureOut">
               <a:rPr lang="en-US" smtClean="0"/>
-              <a:t>3/19/2020</a:t>
+              <a:t>3/20/2020</a:t>
             </a:fld>
             <a:endParaRPr lang="en-US"/>
           </a:p>
@@ -410,7 +411,7 @@
           <a:p>
             <a:fld id="{4E0D474A-36D6-42D7-8D99-A750CFDD9A60}" type="datetimeFigureOut">
               <a:rPr lang="en-US" smtClean="0"/>
-              <a:t>3/19/2020</a:t>
+              <a:t>3/20/2020</a:t>
             </a:fld>
             <a:endParaRPr lang="en-US"/>
           </a:p>
@@ -588,7 +589,7 @@
           <a:p>
             <a:fld id="{4E0D474A-36D6-42D7-8D99-A750CFDD9A60}" type="datetimeFigureOut">
               <a:rPr lang="en-US" smtClean="0"/>
-              <a:t>3/19/2020</a:t>
+              <a:t>3/20/2020</a:t>
             </a:fld>
             <a:endParaRPr lang="en-US"/>
           </a:p>
@@ -756,7 +757,7 @@
           <a:p>
             <a:fld id="{4E0D474A-36D6-42D7-8D99-A750CFDD9A60}" type="datetimeFigureOut">
               <a:rPr lang="en-US" smtClean="0"/>
-              <a:t>3/19/2020</a:t>
+              <a:t>3/20/2020</a:t>
             </a:fld>
             <a:endParaRPr lang="en-US"/>
           </a:p>
@@ -1001,7 +1002,7 @@
           <a:p>
             <a:fld id="{4E0D474A-36D6-42D7-8D99-A750CFDD9A60}" type="datetimeFigureOut">
               <a:rPr lang="en-US" smtClean="0"/>
-              <a:t>3/19/2020</a:t>
+              <a:t>3/20/2020</a:t>
             </a:fld>
             <a:endParaRPr lang="en-US"/>
           </a:p>
@@ -1230,7 +1231,7 @@
           <a:p>
             <a:fld id="{4E0D474A-36D6-42D7-8D99-A750CFDD9A60}" type="datetimeFigureOut">
               <a:rPr lang="en-US" smtClean="0"/>
-              <a:t>3/19/2020</a:t>
+              <a:t>3/20/2020</a:t>
             </a:fld>
             <a:endParaRPr lang="en-US"/>
           </a:p>
@@ -1594,7 +1595,7 @@
           <a:p>
             <a:fld id="{4E0D474A-36D6-42D7-8D99-A750CFDD9A60}" type="datetimeFigureOut">
               <a:rPr lang="en-US" smtClean="0"/>
-              <a:t>3/19/2020</a:t>
+              <a:t>3/20/2020</a:t>
             </a:fld>
             <a:endParaRPr lang="en-US"/>
           </a:p>
@@ -1711,7 +1712,7 @@
           <a:p>
             <a:fld id="{4E0D474A-36D6-42D7-8D99-A750CFDD9A60}" type="datetimeFigureOut">
               <a:rPr lang="en-US" smtClean="0"/>
-              <a:t>3/19/2020</a:t>
+              <a:t>3/20/2020</a:t>
             </a:fld>
             <a:endParaRPr lang="en-US"/>
           </a:p>
@@ -1806,7 +1807,7 @@
           <a:p>
             <a:fld id="{4E0D474A-36D6-42D7-8D99-A750CFDD9A60}" type="datetimeFigureOut">
               <a:rPr lang="en-US" smtClean="0"/>
-              <a:t>3/19/2020</a:t>
+              <a:t>3/20/2020</a:t>
             </a:fld>
             <a:endParaRPr lang="en-US"/>
           </a:p>
@@ -2081,7 +2082,7 @@
           <a:p>
             <a:fld id="{4E0D474A-36D6-42D7-8D99-A750CFDD9A60}" type="datetimeFigureOut">
               <a:rPr lang="en-US" smtClean="0"/>
-              <a:t>3/19/2020</a:t>
+              <a:t>3/20/2020</a:t>
             </a:fld>
             <a:endParaRPr lang="en-US"/>
           </a:p>
@@ -2333,7 +2334,7 @@
           <a:p>
             <a:fld id="{4E0D474A-36D6-42D7-8D99-A750CFDD9A60}" type="datetimeFigureOut">
               <a:rPr lang="en-US" smtClean="0"/>
-              <a:t>3/19/2020</a:t>
+              <a:t>3/20/2020</a:t>
             </a:fld>
             <a:endParaRPr lang="en-US"/>
           </a:p>
@@ -2544,7 +2545,7 @@
           <a:p>
             <a:fld id="{4E0D474A-36D6-42D7-8D99-A750CFDD9A60}" type="datetimeFigureOut">
               <a:rPr lang="en-US" smtClean="0"/>
-              <a:t>3/19/2020</a:t>
+              <a:t>3/20/2020</a:t>
             </a:fld>
             <a:endParaRPr lang="en-US"/>
           </a:p>
@@ -6646,6 +6647,2273 @@
 </p:sld>
 </file>
 
+<file path=ppt/slides/slide3.xml><?xml version="1.0" encoding="utf-8"?>
+<p:sld xmlns:a="http://schemas.openxmlformats.org/drawingml/2006/main" xmlns:r="http://schemas.openxmlformats.org/officeDocument/2006/relationships" xmlns:p="http://schemas.openxmlformats.org/presentationml/2006/main">
+  <p:cSld>
+    <p:spTree>
+      <p:nvGrpSpPr>
+        <p:cNvPr id="1" name=""/>
+        <p:cNvGrpSpPr/>
+        <p:nvPr/>
+      </p:nvGrpSpPr>
+      <p:grpSpPr>
+        <a:xfrm>
+          <a:off x="0" y="0"/>
+          <a:ext cx="0" cy="0"/>
+          <a:chOff x="0" y="0"/>
+          <a:chExt cx="0" cy="0"/>
+        </a:xfrm>
+      </p:grpSpPr>
+      <p:graphicFrame>
+        <p:nvGraphicFramePr>
+          <p:cNvPr id="2" name="Table 1"/>
+          <p:cNvGraphicFramePr>
+            <a:graphicFrameLocks noGrp="1"/>
+          </p:cNvGraphicFramePr>
+          <p:nvPr/>
+        </p:nvGraphicFramePr>
+        <p:xfrm>
+          <a:off x="128661" y="3354904"/>
+          <a:ext cx="4020322" cy="1483360"/>
+        </p:xfrm>
+        <a:graphic>
+          <a:graphicData uri="http://schemas.openxmlformats.org/drawingml/2006/table">
+            <a:tbl>
+              <a:tblPr firstRow="1" bandRow="1">
+                <a:tableStyleId>{5C22544A-7EE6-4342-B048-85BDC9FD1C3A}</a:tableStyleId>
+              </a:tblPr>
+              <a:tblGrid>
+                <a:gridCol w="823247">
+                  <a:extLst>
+                    <a:ext uri="{9D8B030D-6E8A-4147-A177-3AD203B41FA5}">
+                      <a16:colId xmlns:a16="http://schemas.microsoft.com/office/drawing/2014/main" val="2648408335"/>
+                    </a:ext>
+                  </a:extLst>
+                </a:gridCol>
+                <a:gridCol w="3197075">
+                  <a:extLst>
+                    <a:ext uri="{9D8B030D-6E8A-4147-A177-3AD203B41FA5}">
+                      <a16:colId xmlns:a16="http://schemas.microsoft.com/office/drawing/2014/main" val="545094443"/>
+                    </a:ext>
+                  </a:extLst>
+                </a:gridCol>
+              </a:tblGrid>
+              <a:tr h="370840">
+                <a:tc>
+                  <a:txBody>
+                    <a:bodyPr/>
+                    <a:lstStyle/>
+                    <a:p>
+                      <a:r>
+                        <a:rPr lang="en-US" dirty="0"/>
+                        <a:t>Suffix</a:t>
+                      </a:r>
+                    </a:p>
+                  </a:txBody>
+                  <a:tcPr/>
+                </a:tc>
+                <a:tc>
+                  <a:txBody>
+                    <a:bodyPr/>
+                    <a:lstStyle/>
+                    <a:p>
+                      <a:r>
+                        <a:rPr lang="en-US" dirty="0"/>
+                        <a:t>Technology Groups</a:t>
+                      </a:r>
+                    </a:p>
+                  </a:txBody>
+                  <a:tcPr/>
+                </a:tc>
+                <a:extLst>
+                  <a:ext uri="{0D108BD9-81ED-4DB2-BD59-A6C34878D82A}">
+                    <a16:rowId xmlns:a16="http://schemas.microsoft.com/office/drawing/2014/main" val="4043718998"/>
+                  </a:ext>
+                </a:extLst>
+              </a:tr>
+              <a:tr h="370840">
+                <a:tc>
+                  <a:txBody>
+                    <a:bodyPr/>
+                    <a:lstStyle/>
+                    <a:p>
+                      <a:r>
+                        <a:rPr lang="en-US" dirty="0"/>
+                        <a:t>A</a:t>
+                      </a:r>
+                    </a:p>
+                  </a:txBody>
+                  <a:tcPr/>
+                </a:tc>
+                <a:tc>
+                  <a:txBody>
+                    <a:bodyPr/>
+                    <a:lstStyle/>
+                    <a:p>
+                      <a:r>
+                        <a:rPr lang="en-US" dirty="0"/>
+                        <a:t>Centralized</a:t>
+                      </a:r>
+                    </a:p>
+                  </a:txBody>
+                  <a:tcPr/>
+                </a:tc>
+                <a:extLst>
+                  <a:ext uri="{0D108BD9-81ED-4DB2-BD59-A6C34878D82A}">
+                    <a16:rowId xmlns:a16="http://schemas.microsoft.com/office/drawing/2014/main" val="4153160432"/>
+                  </a:ext>
+                </a:extLst>
+              </a:tr>
+              <a:tr h="370840">
+                <a:tc>
+                  <a:txBody>
+                    <a:bodyPr/>
+                    <a:lstStyle/>
+                    <a:p>
+                      <a:r>
+                        <a:rPr lang="en-US" dirty="0"/>
+                        <a:t>B</a:t>
+                      </a:r>
+                    </a:p>
+                  </a:txBody>
+                  <a:tcPr/>
+                </a:tc>
+                <a:tc>
+                  <a:txBody>
+                    <a:bodyPr/>
+                    <a:lstStyle/>
+                    <a:p>
+                      <a:r>
+                        <a:rPr lang="en-US" dirty="0"/>
+                        <a:t>Distributed</a:t>
+                      </a:r>
+                    </a:p>
+                  </a:txBody>
+                  <a:tcPr/>
+                </a:tc>
+                <a:extLst>
+                  <a:ext uri="{0D108BD9-81ED-4DB2-BD59-A6C34878D82A}">
+                    <a16:rowId xmlns:a16="http://schemas.microsoft.com/office/drawing/2014/main" val="1374592847"/>
+                  </a:ext>
+                </a:extLst>
+              </a:tr>
+              <a:tr h="370840">
+                <a:tc>
+                  <a:txBody>
+                    <a:bodyPr/>
+                    <a:lstStyle/>
+                    <a:p>
+                      <a:r>
+                        <a:rPr lang="en-US" dirty="0"/>
+                        <a:t>C</a:t>
+                      </a:r>
+                    </a:p>
+                  </a:txBody>
+                  <a:tcPr/>
+                </a:tc>
+                <a:tc>
+                  <a:txBody>
+                    <a:bodyPr/>
+                    <a:lstStyle/>
+                    <a:p>
+                      <a:r>
+                        <a:rPr lang="en-US" dirty="0"/>
+                        <a:t>Business-as-usual (no IRP)</a:t>
+                      </a:r>
+                    </a:p>
+                  </a:txBody>
+                  <a:tcPr/>
+                </a:tc>
+                <a:extLst>
+                  <a:ext uri="{0D108BD9-81ED-4DB2-BD59-A6C34878D82A}">
+                    <a16:rowId xmlns:a16="http://schemas.microsoft.com/office/drawing/2014/main" val="1629897343"/>
+                  </a:ext>
+                </a:extLst>
+              </a:tr>
+            </a:tbl>
+          </a:graphicData>
+        </a:graphic>
+      </p:graphicFrame>
+      <p:graphicFrame>
+        <p:nvGraphicFramePr>
+          <p:cNvPr id="3" name="Table 2"/>
+          <p:cNvGraphicFramePr>
+            <a:graphicFrameLocks noGrp="1"/>
+          </p:cNvGraphicFramePr>
+          <p:nvPr/>
+        </p:nvGraphicFramePr>
+        <p:xfrm>
+          <a:off x="61244" y="402450"/>
+          <a:ext cx="4155156" cy="2595880"/>
+        </p:xfrm>
+        <a:graphic>
+          <a:graphicData uri="http://schemas.openxmlformats.org/drawingml/2006/table">
+            <a:tbl>
+              <a:tblPr firstRow="1" bandRow="1">
+                <a:tableStyleId>{5C22544A-7EE6-4342-B048-85BDC9FD1C3A}</a:tableStyleId>
+              </a:tblPr>
+              <a:tblGrid>
+                <a:gridCol w="850857">
+                  <a:extLst>
+                    <a:ext uri="{9D8B030D-6E8A-4147-A177-3AD203B41FA5}">
+                      <a16:colId xmlns:a16="http://schemas.microsoft.com/office/drawing/2014/main" val="2648408335"/>
+                    </a:ext>
+                  </a:extLst>
+                </a:gridCol>
+                <a:gridCol w="3304299">
+                  <a:extLst>
+                    <a:ext uri="{9D8B030D-6E8A-4147-A177-3AD203B41FA5}">
+                      <a16:colId xmlns:a16="http://schemas.microsoft.com/office/drawing/2014/main" val="545094443"/>
+                    </a:ext>
+                  </a:extLst>
+                </a:gridCol>
+              </a:tblGrid>
+              <a:tr h="370840">
+                <a:tc>
+                  <a:txBody>
+                    <a:bodyPr/>
+                    <a:lstStyle/>
+                    <a:p>
+                      <a:r>
+                        <a:rPr lang="en-US" dirty="0"/>
+                        <a:t>Prefix</a:t>
+                      </a:r>
+                    </a:p>
+                  </a:txBody>
+                  <a:tcPr/>
+                </a:tc>
+                <a:tc>
+                  <a:txBody>
+                    <a:bodyPr/>
+                    <a:lstStyle/>
+                    <a:p>
+                      <a:r>
+                        <a:rPr lang="en-US" dirty="0"/>
+                        <a:t>Scenario</a:t>
+                      </a:r>
+                    </a:p>
+                  </a:txBody>
+                  <a:tcPr/>
+                </a:tc>
+                <a:extLst>
+                  <a:ext uri="{0D108BD9-81ED-4DB2-BD59-A6C34878D82A}">
+                    <a16:rowId xmlns:a16="http://schemas.microsoft.com/office/drawing/2014/main" val="4043718998"/>
+                  </a:ext>
+                </a:extLst>
+              </a:tr>
+              <a:tr h="370840">
+                <a:tc>
+                  <a:txBody>
+                    <a:bodyPr/>
+                    <a:lstStyle/>
+                    <a:p>
+                      <a:r>
+                        <a:rPr lang="en-US" dirty="0"/>
+                        <a:t>T</a:t>
+                      </a:r>
+                    </a:p>
+                  </a:txBody>
+                  <a:tcPr/>
+                </a:tc>
+                <a:tc>
+                  <a:txBody>
+                    <a:bodyPr/>
+                    <a:lstStyle/>
+                    <a:p>
+                      <a:r>
+                        <a:rPr lang="en-US" baseline="0" dirty="0"/>
+                        <a:t>All technologies w/o IRP</a:t>
+                      </a:r>
+                    </a:p>
+                  </a:txBody>
+                  <a:tcPr/>
+                </a:tc>
+                <a:extLst>
+                  <a:ext uri="{0D108BD9-81ED-4DB2-BD59-A6C34878D82A}">
+                    <a16:rowId xmlns:a16="http://schemas.microsoft.com/office/drawing/2014/main" val="4249334561"/>
+                  </a:ext>
+                </a:extLst>
+              </a:tr>
+              <a:tr h="370840">
+                <a:tc>
+                  <a:txBody>
+                    <a:bodyPr/>
+                    <a:lstStyle/>
+                    <a:p>
+                      <a:r>
+                        <a:rPr lang="en-US" dirty="0"/>
+                        <a:t>U</a:t>
+                      </a:r>
+                    </a:p>
+                  </a:txBody>
+                  <a:tcPr/>
+                </a:tc>
+                <a:tc>
+                  <a:txBody>
+                    <a:bodyPr/>
+                    <a:lstStyle/>
+                    <a:p>
+                      <a:pPr marL="0" marR="0" indent="0" algn="l" defTabSz="914400" rtl="0" eaLnBrk="1" fontAlgn="auto" latinLnBrk="0" hangingPunct="1">
+                        <a:lnSpc>
+                          <a:spcPct val="100000"/>
+                        </a:lnSpc>
+                        <a:spcBef>
+                          <a:spcPts val="0"/>
+                        </a:spcBef>
+                        <a:spcAft>
+                          <a:spcPts val="0"/>
+                        </a:spcAft>
+                        <a:buClrTx/>
+                        <a:buSzTx/>
+                        <a:buFontTx/>
+                        <a:buNone/>
+                        <a:tabLst/>
+                        <a:defRPr/>
+                      </a:pPr>
+                      <a:r>
+                        <a:rPr lang="en-US" baseline="0" dirty="0"/>
+                        <a:t>All technologies w/ IRP</a:t>
+                      </a:r>
+                    </a:p>
+                  </a:txBody>
+                  <a:tcPr/>
+                </a:tc>
+                <a:extLst>
+                  <a:ext uri="{0D108BD9-81ED-4DB2-BD59-A6C34878D82A}">
+                    <a16:rowId xmlns:a16="http://schemas.microsoft.com/office/drawing/2014/main" val="1987041860"/>
+                  </a:ext>
+                </a:extLst>
+              </a:tr>
+              <a:tr h="370840">
+                <a:tc>
+                  <a:txBody>
+                    <a:bodyPr/>
+                    <a:lstStyle/>
+                    <a:p>
+                      <a:r>
+                        <a:rPr lang="en-US" dirty="0"/>
+                        <a:t>W</a:t>
+                      </a:r>
+                    </a:p>
+                  </a:txBody>
+                  <a:tcPr/>
+                </a:tc>
+                <a:tc>
+                  <a:txBody>
+                    <a:bodyPr/>
+                    <a:lstStyle/>
+                    <a:p>
+                      <a:r>
+                        <a:rPr lang="en-US" dirty="0"/>
+                        <a:t>Current Infra w/o</a:t>
+                      </a:r>
+                      <a:r>
+                        <a:rPr lang="en-US" baseline="0" dirty="0"/>
+                        <a:t> IRP</a:t>
+                      </a:r>
+                    </a:p>
+                  </a:txBody>
+                  <a:tcPr/>
+                </a:tc>
+                <a:extLst>
+                  <a:ext uri="{0D108BD9-81ED-4DB2-BD59-A6C34878D82A}">
+                    <a16:rowId xmlns:a16="http://schemas.microsoft.com/office/drawing/2014/main" val="4153160432"/>
+                  </a:ext>
+                </a:extLst>
+              </a:tr>
+              <a:tr h="370840">
+                <a:tc>
+                  <a:txBody>
+                    <a:bodyPr/>
+                    <a:lstStyle/>
+                    <a:p>
+                      <a:r>
+                        <a:rPr lang="en-US" dirty="0"/>
+                        <a:t>X</a:t>
+                      </a:r>
+                    </a:p>
+                  </a:txBody>
+                  <a:tcPr/>
+                </a:tc>
+                <a:tc>
+                  <a:txBody>
+                    <a:bodyPr/>
+                    <a:lstStyle/>
+                    <a:p>
+                      <a:r>
+                        <a:rPr lang="en-US" dirty="0"/>
+                        <a:t>Hardened Infra w/o</a:t>
+                      </a:r>
+                      <a:r>
+                        <a:rPr lang="en-US" baseline="0" dirty="0"/>
+                        <a:t> IRP</a:t>
+                      </a:r>
+                    </a:p>
+                  </a:txBody>
+                  <a:tcPr/>
+                </a:tc>
+                <a:extLst>
+                  <a:ext uri="{0D108BD9-81ED-4DB2-BD59-A6C34878D82A}">
+                    <a16:rowId xmlns:a16="http://schemas.microsoft.com/office/drawing/2014/main" val="1374592847"/>
+                  </a:ext>
+                </a:extLst>
+              </a:tr>
+              <a:tr h="370840">
+                <a:tc>
+                  <a:txBody>
+                    <a:bodyPr/>
+                    <a:lstStyle/>
+                    <a:p>
+                      <a:r>
+                        <a:rPr lang="en-US" dirty="0"/>
+                        <a:t>Y</a:t>
+                      </a:r>
+                    </a:p>
+                  </a:txBody>
+                  <a:tcPr/>
+                </a:tc>
+                <a:tc>
+                  <a:txBody>
+                    <a:bodyPr/>
+                    <a:lstStyle/>
+                    <a:p>
+                      <a:r>
+                        <a:rPr lang="en-US" dirty="0"/>
+                        <a:t>Current Infra w/</a:t>
+                      </a:r>
+                      <a:r>
+                        <a:rPr lang="en-US" baseline="0" dirty="0"/>
+                        <a:t> IRP</a:t>
+                      </a:r>
+                    </a:p>
+                  </a:txBody>
+                  <a:tcPr/>
+                </a:tc>
+                <a:extLst>
+                  <a:ext uri="{0D108BD9-81ED-4DB2-BD59-A6C34878D82A}">
+                    <a16:rowId xmlns:a16="http://schemas.microsoft.com/office/drawing/2014/main" val="1629897343"/>
+                  </a:ext>
+                </a:extLst>
+              </a:tr>
+              <a:tr h="370840">
+                <a:tc>
+                  <a:txBody>
+                    <a:bodyPr/>
+                    <a:lstStyle/>
+                    <a:p>
+                      <a:r>
+                        <a:rPr lang="en-US" dirty="0"/>
+                        <a:t>Z</a:t>
+                      </a:r>
+                    </a:p>
+                  </a:txBody>
+                  <a:tcPr/>
+                </a:tc>
+                <a:tc>
+                  <a:txBody>
+                    <a:bodyPr/>
+                    <a:lstStyle/>
+                    <a:p>
+                      <a:r>
+                        <a:rPr lang="en-US" dirty="0"/>
+                        <a:t>Hardened Infra w/</a:t>
+                      </a:r>
+                      <a:r>
+                        <a:rPr lang="en-US" baseline="0" dirty="0"/>
+                        <a:t> IRP</a:t>
+                      </a:r>
+                    </a:p>
+                  </a:txBody>
+                  <a:tcPr/>
+                </a:tc>
+                <a:extLst>
+                  <a:ext uri="{0D108BD9-81ED-4DB2-BD59-A6C34878D82A}">
+                    <a16:rowId xmlns:a16="http://schemas.microsoft.com/office/drawing/2014/main" val="278724709"/>
+                  </a:ext>
+                </a:extLst>
+              </a:tr>
+            </a:tbl>
+          </a:graphicData>
+        </a:graphic>
+      </p:graphicFrame>
+      <p:graphicFrame>
+        <p:nvGraphicFramePr>
+          <p:cNvPr id="4" name="Table 3"/>
+          <p:cNvGraphicFramePr>
+            <a:graphicFrameLocks noGrp="1"/>
+          </p:cNvGraphicFramePr>
+          <p:nvPr>
+            <p:extLst>
+              <p:ext uri="{D42A27DB-BD31-4B8C-83A1-F6EECF244321}">
+                <p14:modId xmlns:p14="http://schemas.microsoft.com/office/powerpoint/2010/main" val="1828852294"/>
+              </p:ext>
+            </p:extLst>
+          </p:nvPr>
+        </p:nvGraphicFramePr>
+        <p:xfrm>
+          <a:off x="4341690" y="9312"/>
+          <a:ext cx="7721649" cy="6691183"/>
+        </p:xfrm>
+        <a:graphic>
+          <a:graphicData uri="http://schemas.openxmlformats.org/drawingml/2006/table">
+            <a:tbl>
+              <a:tblPr firstRow="1" bandRow="1">
+                <a:tableStyleId>{5C22544A-7EE6-4342-B048-85BDC9FD1C3A}</a:tableStyleId>
+              </a:tblPr>
+              <a:tblGrid>
+                <a:gridCol w="579755">
+                  <a:extLst>
+                    <a:ext uri="{9D8B030D-6E8A-4147-A177-3AD203B41FA5}">
+                      <a16:colId xmlns:a16="http://schemas.microsoft.com/office/drawing/2014/main" val="2648408335"/>
+                    </a:ext>
+                  </a:extLst>
+                </a:gridCol>
+                <a:gridCol w="3195892">
+                  <a:extLst>
+                    <a:ext uri="{9D8B030D-6E8A-4147-A177-3AD203B41FA5}">
+                      <a16:colId xmlns:a16="http://schemas.microsoft.com/office/drawing/2014/main" val="3573707232"/>
+                    </a:ext>
+                  </a:extLst>
+                </a:gridCol>
+                <a:gridCol w="3946002">
+                  <a:extLst>
+                    <a:ext uri="{9D8B030D-6E8A-4147-A177-3AD203B41FA5}">
+                      <a16:colId xmlns:a16="http://schemas.microsoft.com/office/drawing/2014/main" val="545094443"/>
+                    </a:ext>
+                  </a:extLst>
+                </a:gridCol>
+              </a:tblGrid>
+              <a:tr h="290921">
+                <a:tc>
+                  <a:txBody>
+                    <a:bodyPr/>
+                    <a:lstStyle/>
+                    <a:p>
+                      <a:endParaRPr lang="en-US" sz="1200" dirty="0"/>
+                    </a:p>
+                  </a:txBody>
+                  <a:tcPr/>
+                </a:tc>
+                <a:tc>
+                  <a:txBody>
+                    <a:bodyPr/>
+                    <a:lstStyle/>
+                    <a:p>
+                      <a:r>
+                        <a:rPr lang="en-US" sz="1200" dirty="0"/>
+                        <a:t>Scenarios</a:t>
+                      </a:r>
+                    </a:p>
+                  </a:txBody>
+                  <a:tcPr/>
+                </a:tc>
+                <a:tc>
+                  <a:txBody>
+                    <a:bodyPr/>
+                    <a:lstStyle/>
+                    <a:p>
+                      <a:r>
+                        <a:rPr lang="en-US" sz="1200" dirty="0"/>
+                        <a:t>Technology Groups</a:t>
+                      </a:r>
+                    </a:p>
+                  </a:txBody>
+                  <a:tcPr/>
+                </a:tc>
+                <a:extLst>
+                  <a:ext uri="{0D108BD9-81ED-4DB2-BD59-A6C34878D82A}">
+                    <a16:rowId xmlns:a16="http://schemas.microsoft.com/office/drawing/2014/main" val="4043718998"/>
+                  </a:ext>
+                </a:extLst>
+              </a:tr>
+              <a:tr h="290921">
+                <a:tc>
+                  <a:txBody>
+                    <a:bodyPr/>
+                    <a:lstStyle/>
+                    <a:p>
+                      <a:r>
+                        <a:rPr lang="en-US" sz="1200" dirty="0"/>
+                        <a:t>T</a:t>
+                      </a:r>
+                    </a:p>
+                  </a:txBody>
+                  <a:tcPr/>
+                </a:tc>
+                <a:tc>
+                  <a:txBody>
+                    <a:bodyPr/>
+                    <a:lstStyle/>
+                    <a:p>
+                      <a:r>
+                        <a:rPr lang="en-US" sz="1200" baseline="0" dirty="0"/>
+                        <a:t>All technologies w/o IRP</a:t>
+                      </a:r>
+                    </a:p>
+                  </a:txBody>
+                  <a:tcPr/>
+                </a:tc>
+                <a:tc>
+                  <a:txBody>
+                    <a:bodyPr/>
+                    <a:lstStyle/>
+                    <a:p>
+                      <a:r>
+                        <a:rPr lang="en-US" sz="1200" dirty="0"/>
+                        <a:t>All</a:t>
+                      </a:r>
+                    </a:p>
+                  </a:txBody>
+                  <a:tcPr>
+                    <a:solidFill>
+                      <a:schemeClr val="accent6">
+                        <a:lumMod val="40000"/>
+                        <a:lumOff val="60000"/>
+                      </a:schemeClr>
+                    </a:solidFill>
+                  </a:tcPr>
+                </a:tc>
+                <a:extLst>
+                  <a:ext uri="{0D108BD9-81ED-4DB2-BD59-A6C34878D82A}">
+                    <a16:rowId xmlns:a16="http://schemas.microsoft.com/office/drawing/2014/main" val="1008783455"/>
+                  </a:ext>
+                </a:extLst>
+              </a:tr>
+              <a:tr h="290921">
+                <a:tc>
+                  <a:txBody>
+                    <a:bodyPr/>
+                    <a:lstStyle/>
+                    <a:p>
+                      <a:r>
+                        <a:rPr lang="en-US" sz="1200" dirty="0">
+                          <a:solidFill>
+                            <a:srgbClr val="FF0000"/>
+                          </a:solidFill>
+                        </a:rPr>
+                        <a:t>T2</a:t>
+                      </a:r>
+                    </a:p>
+                  </a:txBody>
+                  <a:tcPr/>
+                </a:tc>
+                <a:tc>
+                  <a:txBody>
+                    <a:bodyPr/>
+                    <a:lstStyle/>
+                    <a:p>
+                      <a:pPr marL="0" marR="0" lvl="0" indent="0" algn="l" defTabSz="914400" rtl="0" eaLnBrk="1" fontAlgn="auto" latinLnBrk="0" hangingPunct="1">
+                        <a:lnSpc>
+                          <a:spcPct val="100000"/>
+                        </a:lnSpc>
+                        <a:spcBef>
+                          <a:spcPts val="0"/>
+                        </a:spcBef>
+                        <a:spcAft>
+                          <a:spcPts val="0"/>
+                        </a:spcAft>
+                        <a:buClrTx/>
+                        <a:buSzTx/>
+                        <a:buFontTx/>
+                        <a:buNone/>
+                        <a:tabLst/>
+                        <a:defRPr/>
+                      </a:pPr>
+                      <a:r>
+                        <a:rPr lang="en-US" sz="1200" baseline="0" dirty="0">
+                          <a:solidFill>
+                            <a:schemeClr val="tx1"/>
+                          </a:solidFill>
+                        </a:rPr>
+                        <a:t>All technologies w/o IRP</a:t>
+                      </a:r>
+                    </a:p>
+                  </a:txBody>
+                  <a:tcPr/>
+                </a:tc>
+                <a:tc>
+                  <a:txBody>
+                    <a:bodyPr/>
+                    <a:lstStyle/>
+                    <a:p>
+                      <a:r>
+                        <a:rPr lang="en-US" sz="1200" dirty="0"/>
+                        <a:t>All w/o distributed wind</a:t>
+                      </a:r>
+                    </a:p>
+                  </a:txBody>
+                  <a:tcPr>
+                    <a:solidFill>
+                      <a:schemeClr val="bg1"/>
+                    </a:solidFill>
+                  </a:tcPr>
+                </a:tc>
+                <a:extLst>
+                  <a:ext uri="{0D108BD9-81ED-4DB2-BD59-A6C34878D82A}">
+                    <a16:rowId xmlns:a16="http://schemas.microsoft.com/office/drawing/2014/main" val="348010728"/>
+                  </a:ext>
+                </a:extLst>
+              </a:tr>
+              <a:tr h="290921">
+                <a:tc>
+                  <a:txBody>
+                    <a:bodyPr/>
+                    <a:lstStyle/>
+                    <a:p>
+                      <a:r>
+                        <a:rPr lang="en-US" sz="1200" dirty="0"/>
+                        <a:t>U</a:t>
+                      </a:r>
+                    </a:p>
+                  </a:txBody>
+                  <a:tcPr/>
+                </a:tc>
+                <a:tc>
+                  <a:txBody>
+                    <a:bodyPr/>
+                    <a:lstStyle/>
+                    <a:p>
+                      <a:pPr marL="0" marR="0" indent="0" algn="l" defTabSz="914400" rtl="0" eaLnBrk="1" fontAlgn="auto" latinLnBrk="0" hangingPunct="1">
+                        <a:lnSpc>
+                          <a:spcPct val="100000"/>
+                        </a:lnSpc>
+                        <a:spcBef>
+                          <a:spcPts val="0"/>
+                        </a:spcBef>
+                        <a:spcAft>
+                          <a:spcPts val="0"/>
+                        </a:spcAft>
+                        <a:buClrTx/>
+                        <a:buSzTx/>
+                        <a:buFontTx/>
+                        <a:buNone/>
+                        <a:tabLst/>
+                        <a:defRPr/>
+                      </a:pPr>
+                      <a:r>
+                        <a:rPr lang="en-US" sz="1200" baseline="0" dirty="0"/>
+                        <a:t>All technologies w/ IRP</a:t>
+                      </a:r>
+                    </a:p>
+                  </a:txBody>
+                  <a:tcPr/>
+                </a:tc>
+                <a:tc>
+                  <a:txBody>
+                    <a:bodyPr/>
+                    <a:lstStyle/>
+                    <a:p>
+                      <a:r>
+                        <a:rPr lang="en-US" sz="1200" dirty="0"/>
+                        <a:t>All</a:t>
+                      </a:r>
+                    </a:p>
+                  </a:txBody>
+                  <a:tcPr>
+                    <a:solidFill>
+                      <a:schemeClr val="accent6">
+                        <a:lumMod val="40000"/>
+                        <a:lumOff val="60000"/>
+                      </a:schemeClr>
+                    </a:solidFill>
+                  </a:tcPr>
+                </a:tc>
+                <a:extLst>
+                  <a:ext uri="{0D108BD9-81ED-4DB2-BD59-A6C34878D82A}">
+                    <a16:rowId xmlns:a16="http://schemas.microsoft.com/office/drawing/2014/main" val="4005396690"/>
+                  </a:ext>
+                </a:extLst>
+              </a:tr>
+              <a:tr h="290921">
+                <a:tc>
+                  <a:txBody>
+                    <a:bodyPr/>
+                    <a:lstStyle/>
+                    <a:p>
+                      <a:r>
+                        <a:rPr lang="en-US" sz="1200" dirty="0">
+                          <a:solidFill>
+                            <a:srgbClr val="FF0000"/>
+                          </a:solidFill>
+                        </a:rPr>
+                        <a:t>U2</a:t>
+                      </a:r>
+                    </a:p>
+                  </a:txBody>
+                  <a:tcPr/>
+                </a:tc>
+                <a:tc>
+                  <a:txBody>
+                    <a:bodyPr/>
+                    <a:lstStyle/>
+                    <a:p>
+                      <a:pPr marL="0" marR="0" lvl="0" indent="0" algn="l" defTabSz="914400" rtl="0" eaLnBrk="1" fontAlgn="auto" latinLnBrk="0" hangingPunct="1">
+                        <a:lnSpc>
+                          <a:spcPct val="100000"/>
+                        </a:lnSpc>
+                        <a:spcBef>
+                          <a:spcPts val="0"/>
+                        </a:spcBef>
+                        <a:spcAft>
+                          <a:spcPts val="0"/>
+                        </a:spcAft>
+                        <a:buClrTx/>
+                        <a:buSzTx/>
+                        <a:buFontTx/>
+                        <a:buNone/>
+                        <a:tabLst/>
+                        <a:defRPr/>
+                      </a:pPr>
+                      <a:r>
+                        <a:rPr lang="en-US" sz="1200" baseline="0" dirty="0">
+                          <a:solidFill>
+                            <a:schemeClr val="tx1"/>
+                          </a:solidFill>
+                        </a:rPr>
+                        <a:t>All technologies w/ IRP</a:t>
+                      </a:r>
+                    </a:p>
+                  </a:txBody>
+                  <a:tcPr/>
+                </a:tc>
+                <a:tc>
+                  <a:txBody>
+                    <a:bodyPr/>
+                    <a:lstStyle/>
+                    <a:p>
+                      <a:pPr marL="0" marR="0" lvl="0" indent="0" algn="l" defTabSz="914400" rtl="0" eaLnBrk="1" fontAlgn="auto" latinLnBrk="0" hangingPunct="1">
+                        <a:lnSpc>
+                          <a:spcPct val="100000"/>
+                        </a:lnSpc>
+                        <a:spcBef>
+                          <a:spcPts val="0"/>
+                        </a:spcBef>
+                        <a:spcAft>
+                          <a:spcPts val="0"/>
+                        </a:spcAft>
+                        <a:buClrTx/>
+                        <a:buSzTx/>
+                        <a:buFontTx/>
+                        <a:buNone/>
+                        <a:tabLst/>
+                        <a:defRPr/>
+                      </a:pPr>
+                      <a:r>
+                        <a:rPr lang="en-US" sz="1200" dirty="0"/>
+                        <a:t>All w/o distributed wind</a:t>
+                      </a:r>
+                    </a:p>
+                  </a:txBody>
+                  <a:tcPr>
+                    <a:solidFill>
+                      <a:schemeClr val="bg1"/>
+                    </a:solidFill>
+                  </a:tcPr>
+                </a:tc>
+                <a:extLst>
+                  <a:ext uri="{0D108BD9-81ED-4DB2-BD59-A6C34878D82A}">
+                    <a16:rowId xmlns:a16="http://schemas.microsoft.com/office/drawing/2014/main" val="1850604843"/>
+                  </a:ext>
+                </a:extLst>
+              </a:tr>
+              <a:tr h="290921">
+                <a:tc>
+                  <a:txBody>
+                    <a:bodyPr/>
+                    <a:lstStyle/>
+                    <a:p>
+                      <a:r>
+                        <a:rPr lang="en-US" sz="1200" dirty="0">
+                          <a:solidFill>
+                            <a:srgbClr val="FF0000"/>
+                          </a:solidFill>
+                        </a:rPr>
+                        <a:t>V</a:t>
+                      </a:r>
+                    </a:p>
+                  </a:txBody>
+                  <a:tcPr/>
+                </a:tc>
+                <a:tc>
+                  <a:txBody>
+                    <a:bodyPr/>
+                    <a:lstStyle/>
+                    <a:p>
+                      <a:pPr marL="0" marR="0" indent="0" algn="l" defTabSz="914400" rtl="0" eaLnBrk="1" fontAlgn="auto" latinLnBrk="0" hangingPunct="1">
+                        <a:lnSpc>
+                          <a:spcPct val="100000"/>
+                        </a:lnSpc>
+                        <a:spcBef>
+                          <a:spcPts val="0"/>
+                        </a:spcBef>
+                        <a:spcAft>
+                          <a:spcPts val="0"/>
+                        </a:spcAft>
+                        <a:buClrTx/>
+                        <a:buSzTx/>
+                        <a:buFontTx/>
+                        <a:buNone/>
+                        <a:tabLst/>
+                        <a:defRPr/>
+                      </a:pPr>
+                      <a:r>
+                        <a:rPr lang="en-US" sz="1200" baseline="0" dirty="0"/>
+                        <a:t>All technologies w/ new IRP</a:t>
+                      </a:r>
+                    </a:p>
+                  </a:txBody>
+                  <a:tcPr/>
+                </a:tc>
+                <a:tc>
+                  <a:txBody>
+                    <a:bodyPr/>
+                    <a:lstStyle/>
+                    <a:p>
+                      <a:r>
+                        <a:rPr lang="en-US" sz="1200" dirty="0"/>
+                        <a:t>All</a:t>
+                      </a:r>
+                    </a:p>
+                  </a:txBody>
+                  <a:tcPr>
+                    <a:solidFill>
+                      <a:schemeClr val="accent6">
+                        <a:lumMod val="40000"/>
+                        <a:lumOff val="60000"/>
+                      </a:schemeClr>
+                    </a:solidFill>
+                  </a:tcPr>
+                </a:tc>
+                <a:extLst>
+                  <a:ext uri="{0D108BD9-81ED-4DB2-BD59-A6C34878D82A}">
+                    <a16:rowId xmlns:a16="http://schemas.microsoft.com/office/drawing/2014/main" val="313723148"/>
+                  </a:ext>
+                </a:extLst>
+              </a:tr>
+              <a:tr h="290921">
+                <a:tc>
+                  <a:txBody>
+                    <a:bodyPr/>
+                    <a:lstStyle/>
+                    <a:p>
+                      <a:r>
+                        <a:rPr lang="en-US" sz="1200" dirty="0">
+                          <a:solidFill>
+                            <a:srgbClr val="FF0000"/>
+                          </a:solidFill>
+                        </a:rPr>
+                        <a:t>V2</a:t>
+                      </a:r>
+                    </a:p>
+                  </a:txBody>
+                  <a:tcPr/>
+                </a:tc>
+                <a:tc>
+                  <a:txBody>
+                    <a:bodyPr/>
+                    <a:lstStyle/>
+                    <a:p>
+                      <a:pPr marL="0" marR="0" lvl="0" indent="0" algn="l" defTabSz="914400" rtl="0" eaLnBrk="1" fontAlgn="auto" latinLnBrk="0" hangingPunct="1">
+                        <a:lnSpc>
+                          <a:spcPct val="100000"/>
+                        </a:lnSpc>
+                        <a:spcBef>
+                          <a:spcPts val="0"/>
+                        </a:spcBef>
+                        <a:spcAft>
+                          <a:spcPts val="0"/>
+                        </a:spcAft>
+                        <a:buClrTx/>
+                        <a:buSzTx/>
+                        <a:buFontTx/>
+                        <a:buNone/>
+                        <a:tabLst/>
+                        <a:defRPr/>
+                      </a:pPr>
+                      <a:r>
+                        <a:rPr lang="en-US" sz="1200" baseline="0" dirty="0">
+                          <a:solidFill>
+                            <a:schemeClr val="tx1"/>
+                          </a:solidFill>
+                        </a:rPr>
+                        <a:t>All technologies w/ new IRP</a:t>
+                      </a:r>
+                    </a:p>
+                  </a:txBody>
+                  <a:tcPr/>
+                </a:tc>
+                <a:tc>
+                  <a:txBody>
+                    <a:bodyPr/>
+                    <a:lstStyle/>
+                    <a:p>
+                      <a:pPr marL="0" marR="0" lvl="0" indent="0" algn="l" defTabSz="914400" rtl="0" eaLnBrk="1" fontAlgn="auto" latinLnBrk="0" hangingPunct="1">
+                        <a:lnSpc>
+                          <a:spcPct val="100000"/>
+                        </a:lnSpc>
+                        <a:spcBef>
+                          <a:spcPts val="0"/>
+                        </a:spcBef>
+                        <a:spcAft>
+                          <a:spcPts val="0"/>
+                        </a:spcAft>
+                        <a:buClrTx/>
+                        <a:buSzTx/>
+                        <a:buFontTx/>
+                        <a:buNone/>
+                        <a:tabLst/>
+                        <a:defRPr/>
+                      </a:pPr>
+                      <a:r>
+                        <a:rPr lang="en-US" sz="1200" dirty="0"/>
+                        <a:t>All w/o distributed wind</a:t>
+                      </a:r>
+                    </a:p>
+                  </a:txBody>
+                  <a:tcPr>
+                    <a:solidFill>
+                      <a:schemeClr val="bg1"/>
+                    </a:solidFill>
+                  </a:tcPr>
+                </a:tc>
+                <a:extLst>
+                  <a:ext uri="{0D108BD9-81ED-4DB2-BD59-A6C34878D82A}">
+                    <a16:rowId xmlns:a16="http://schemas.microsoft.com/office/drawing/2014/main" val="2823308070"/>
+                  </a:ext>
+                </a:extLst>
+              </a:tr>
+              <a:tr h="290921">
+                <a:tc>
+                  <a:txBody>
+                    <a:bodyPr/>
+                    <a:lstStyle/>
+                    <a:p>
+                      <a:r>
+                        <a:rPr lang="en-US" sz="1200" dirty="0"/>
+                        <a:t>WA</a:t>
+                      </a:r>
+                    </a:p>
+                  </a:txBody>
+                  <a:tcPr/>
+                </a:tc>
+                <a:tc>
+                  <a:txBody>
+                    <a:bodyPr/>
+                    <a:lstStyle/>
+                    <a:p>
+                      <a:pPr marL="0" marR="0" indent="0" algn="l" defTabSz="914400" rtl="0" eaLnBrk="1" fontAlgn="auto" latinLnBrk="0" hangingPunct="1">
+                        <a:lnSpc>
+                          <a:spcPct val="100000"/>
+                        </a:lnSpc>
+                        <a:spcBef>
+                          <a:spcPts val="0"/>
+                        </a:spcBef>
+                        <a:spcAft>
+                          <a:spcPts val="0"/>
+                        </a:spcAft>
+                        <a:buClrTx/>
+                        <a:buSzTx/>
+                        <a:buFontTx/>
+                        <a:buNone/>
+                        <a:tabLst/>
+                        <a:defRPr/>
+                      </a:pPr>
+                      <a:r>
+                        <a:rPr lang="en-US" sz="1200" dirty="0"/>
+                        <a:t>Current Infra w/o</a:t>
+                      </a:r>
+                      <a:r>
+                        <a:rPr lang="en-US" sz="1200" baseline="0" dirty="0"/>
+                        <a:t> IRP</a:t>
+                      </a:r>
+                    </a:p>
+                  </a:txBody>
+                  <a:tcPr/>
+                </a:tc>
+                <a:tc>
+                  <a:txBody>
+                    <a:bodyPr/>
+                    <a:lstStyle/>
+                    <a:p>
+                      <a:r>
+                        <a:rPr lang="en-US" sz="1200" dirty="0"/>
+                        <a:t>Centralized</a:t>
+                      </a:r>
+                    </a:p>
+                  </a:txBody>
+                  <a:tcPr>
+                    <a:solidFill>
+                      <a:schemeClr val="bg1">
+                        <a:lumMod val="75000"/>
+                      </a:schemeClr>
+                    </a:solidFill>
+                  </a:tcPr>
+                </a:tc>
+                <a:extLst>
+                  <a:ext uri="{0D108BD9-81ED-4DB2-BD59-A6C34878D82A}">
+                    <a16:rowId xmlns:a16="http://schemas.microsoft.com/office/drawing/2014/main" val="4153160432"/>
+                  </a:ext>
+                </a:extLst>
+              </a:tr>
+              <a:tr h="290921">
+                <a:tc>
+                  <a:txBody>
+                    <a:bodyPr/>
+                    <a:lstStyle/>
+                    <a:p>
+                      <a:r>
+                        <a:rPr lang="en-US" sz="1200" dirty="0"/>
+                        <a:t>WB</a:t>
+                      </a:r>
+                    </a:p>
+                  </a:txBody>
+                  <a:tcPr/>
+                </a:tc>
+                <a:tc>
+                  <a:txBody>
+                    <a:bodyPr/>
+                    <a:lstStyle/>
+                    <a:p>
+                      <a:pPr marL="0" marR="0" indent="0" algn="l" defTabSz="914400" rtl="0" eaLnBrk="1" fontAlgn="auto" latinLnBrk="0" hangingPunct="1">
+                        <a:lnSpc>
+                          <a:spcPct val="100000"/>
+                        </a:lnSpc>
+                        <a:spcBef>
+                          <a:spcPts val="0"/>
+                        </a:spcBef>
+                        <a:spcAft>
+                          <a:spcPts val="0"/>
+                        </a:spcAft>
+                        <a:buClrTx/>
+                        <a:buSzTx/>
+                        <a:buFontTx/>
+                        <a:buNone/>
+                        <a:tabLst/>
+                        <a:defRPr/>
+                      </a:pPr>
+                      <a:r>
+                        <a:rPr lang="en-US" sz="1200" dirty="0"/>
+                        <a:t>Current Infra w/o</a:t>
+                      </a:r>
+                      <a:r>
+                        <a:rPr lang="en-US" sz="1200" baseline="0" dirty="0"/>
+                        <a:t> IRP</a:t>
+                      </a:r>
+                    </a:p>
+                  </a:txBody>
+                  <a:tcPr/>
+                </a:tc>
+                <a:tc>
+                  <a:txBody>
+                    <a:bodyPr/>
+                    <a:lstStyle/>
+                    <a:p>
+                      <a:r>
+                        <a:rPr lang="en-US" sz="1200" dirty="0"/>
+                        <a:t>Distributed</a:t>
+                      </a:r>
+                    </a:p>
+                  </a:txBody>
+                  <a:tcPr>
+                    <a:solidFill>
+                      <a:schemeClr val="accent2">
+                        <a:lumMod val="60000"/>
+                        <a:lumOff val="40000"/>
+                      </a:schemeClr>
+                    </a:solidFill>
+                  </a:tcPr>
+                </a:tc>
+                <a:extLst>
+                  <a:ext uri="{0D108BD9-81ED-4DB2-BD59-A6C34878D82A}">
+                    <a16:rowId xmlns:a16="http://schemas.microsoft.com/office/drawing/2014/main" val="1374592847"/>
+                  </a:ext>
+                </a:extLst>
+              </a:tr>
+              <a:tr h="290921">
+                <a:tc>
+                  <a:txBody>
+                    <a:bodyPr/>
+                    <a:lstStyle/>
+                    <a:p>
+                      <a:r>
+                        <a:rPr lang="en-US" sz="1200" dirty="0"/>
+                        <a:t>WC</a:t>
+                      </a:r>
+                    </a:p>
+                  </a:txBody>
+                  <a:tcPr/>
+                </a:tc>
+                <a:tc>
+                  <a:txBody>
+                    <a:bodyPr/>
+                    <a:lstStyle/>
+                    <a:p>
+                      <a:pPr marL="0" marR="0" indent="0" algn="l" defTabSz="914400" rtl="0" eaLnBrk="1" fontAlgn="auto" latinLnBrk="0" hangingPunct="1">
+                        <a:lnSpc>
+                          <a:spcPct val="100000"/>
+                        </a:lnSpc>
+                        <a:spcBef>
+                          <a:spcPts val="0"/>
+                        </a:spcBef>
+                        <a:spcAft>
+                          <a:spcPts val="0"/>
+                        </a:spcAft>
+                        <a:buClrTx/>
+                        <a:buSzTx/>
+                        <a:buFontTx/>
+                        <a:buNone/>
+                        <a:tabLst/>
+                        <a:defRPr/>
+                      </a:pPr>
+                      <a:r>
+                        <a:rPr lang="en-US" sz="1200" dirty="0"/>
+                        <a:t>Current Infra w/o</a:t>
+                      </a:r>
+                      <a:r>
+                        <a:rPr lang="en-US" sz="1200" baseline="0" dirty="0"/>
+                        <a:t> IRP</a:t>
+                      </a:r>
+                    </a:p>
+                  </a:txBody>
+                  <a:tcPr/>
+                </a:tc>
+                <a:tc>
+                  <a:txBody>
+                    <a:bodyPr/>
+                    <a:lstStyle/>
+                    <a:p>
+                      <a:pPr marL="0" marR="0" lvl="0" indent="0" algn="l" defTabSz="914400" rtl="0" eaLnBrk="1" fontAlgn="auto" latinLnBrk="0" hangingPunct="1">
+                        <a:lnSpc>
+                          <a:spcPct val="100000"/>
+                        </a:lnSpc>
+                        <a:spcBef>
+                          <a:spcPts val="0"/>
+                        </a:spcBef>
+                        <a:spcAft>
+                          <a:spcPts val="0"/>
+                        </a:spcAft>
+                        <a:buClrTx/>
+                        <a:buSzTx/>
+                        <a:buFontTx/>
+                        <a:buNone/>
+                        <a:tabLst/>
+                        <a:defRPr/>
+                      </a:pPr>
+                      <a:r>
+                        <a:rPr lang="en-US" sz="1200" dirty="0"/>
+                        <a:t>Distributed w/o Wind</a:t>
+                      </a:r>
+                    </a:p>
+                  </a:txBody>
+                  <a:tcPr>
+                    <a:solidFill>
+                      <a:srgbClr val="7030A0"/>
+                    </a:solidFill>
+                  </a:tcPr>
+                </a:tc>
+                <a:extLst>
+                  <a:ext uri="{0D108BD9-81ED-4DB2-BD59-A6C34878D82A}">
+                    <a16:rowId xmlns:a16="http://schemas.microsoft.com/office/drawing/2014/main" val="1721866569"/>
+                  </a:ext>
+                </a:extLst>
+              </a:tr>
+              <a:tr h="290921">
+                <a:tc>
+                  <a:txBody>
+                    <a:bodyPr/>
+                    <a:lstStyle/>
+                    <a:p>
+                      <a:r>
+                        <a:rPr lang="en-US" sz="1200" dirty="0"/>
+                        <a:t>WD</a:t>
+                      </a:r>
+                    </a:p>
+                  </a:txBody>
+                  <a:tcPr/>
+                </a:tc>
+                <a:tc>
+                  <a:txBody>
+                    <a:bodyPr/>
+                    <a:lstStyle/>
+                    <a:p>
+                      <a:pPr marL="0" marR="0" indent="0" algn="l" defTabSz="914400" rtl="0" eaLnBrk="1" fontAlgn="auto" latinLnBrk="0" hangingPunct="1">
+                        <a:lnSpc>
+                          <a:spcPct val="100000"/>
+                        </a:lnSpc>
+                        <a:spcBef>
+                          <a:spcPts val="0"/>
+                        </a:spcBef>
+                        <a:spcAft>
+                          <a:spcPts val="0"/>
+                        </a:spcAft>
+                        <a:buClrTx/>
+                        <a:buSzTx/>
+                        <a:buFontTx/>
+                        <a:buNone/>
+                        <a:tabLst/>
+                        <a:defRPr/>
+                      </a:pPr>
+                      <a:r>
+                        <a:rPr lang="en-US" sz="1200" dirty="0"/>
+                        <a:t>Current Infra w/o</a:t>
+                      </a:r>
+                      <a:r>
+                        <a:rPr lang="en-US" sz="1200" baseline="0" dirty="0"/>
+                        <a:t> IRP</a:t>
+                      </a:r>
+                    </a:p>
+                  </a:txBody>
+                  <a:tcPr/>
+                </a:tc>
+                <a:tc>
+                  <a:txBody>
+                    <a:bodyPr/>
+                    <a:lstStyle/>
+                    <a:p>
+                      <a:r>
+                        <a:rPr lang="en-US" sz="1200" dirty="0"/>
+                        <a:t>Business-as-usual</a:t>
+                      </a:r>
+                    </a:p>
+                  </a:txBody>
+                  <a:tcPr>
+                    <a:solidFill>
+                      <a:srgbClr val="0070C0"/>
+                    </a:solidFill>
+                  </a:tcPr>
+                </a:tc>
+                <a:extLst>
+                  <a:ext uri="{0D108BD9-81ED-4DB2-BD59-A6C34878D82A}">
+                    <a16:rowId xmlns:a16="http://schemas.microsoft.com/office/drawing/2014/main" val="1629897343"/>
+                  </a:ext>
+                </a:extLst>
+              </a:tr>
+              <a:tr h="290921">
+                <a:tc>
+                  <a:txBody>
+                    <a:bodyPr/>
+                    <a:lstStyle/>
+                    <a:p>
+                      <a:r>
+                        <a:rPr lang="en-US" sz="1200" dirty="0">
+                          <a:solidFill>
+                            <a:srgbClr val="FF0000"/>
+                          </a:solidFill>
+                        </a:rPr>
+                        <a:t>WE</a:t>
+                      </a:r>
+                    </a:p>
+                  </a:txBody>
+                  <a:tcPr/>
+                </a:tc>
+                <a:tc>
+                  <a:txBody>
+                    <a:bodyPr/>
+                    <a:lstStyle/>
+                    <a:p>
+                      <a:pPr marL="0" marR="0" lvl="0" indent="0" algn="l" defTabSz="914400" rtl="0" eaLnBrk="1" fontAlgn="auto" latinLnBrk="0" hangingPunct="1">
+                        <a:lnSpc>
+                          <a:spcPct val="100000"/>
+                        </a:lnSpc>
+                        <a:spcBef>
+                          <a:spcPts val="0"/>
+                        </a:spcBef>
+                        <a:spcAft>
+                          <a:spcPts val="0"/>
+                        </a:spcAft>
+                        <a:buClrTx/>
+                        <a:buSzTx/>
+                        <a:buFontTx/>
+                        <a:buNone/>
+                        <a:tabLst/>
+                        <a:defRPr/>
+                      </a:pPr>
+                      <a:r>
+                        <a:rPr lang="en-US" sz="1200" dirty="0"/>
+                        <a:t>Current Infra w/o</a:t>
+                      </a:r>
+                      <a:r>
+                        <a:rPr lang="en-US" sz="1200" baseline="0" dirty="0"/>
+                        <a:t> IRP</a:t>
+                      </a:r>
+                    </a:p>
+                  </a:txBody>
+                  <a:tcPr/>
+                </a:tc>
+                <a:tc>
+                  <a:txBody>
+                    <a:bodyPr/>
+                    <a:lstStyle/>
+                    <a:p>
+                      <a:r>
+                        <a:rPr lang="en-US" sz="1200" dirty="0"/>
+                        <a:t>Centralized – natural gas</a:t>
+                      </a:r>
+                    </a:p>
+                  </a:txBody>
+                  <a:tcPr>
+                    <a:solidFill>
+                      <a:schemeClr val="bg1"/>
+                    </a:solidFill>
+                  </a:tcPr>
+                </a:tc>
+                <a:extLst>
+                  <a:ext uri="{0D108BD9-81ED-4DB2-BD59-A6C34878D82A}">
+                    <a16:rowId xmlns:a16="http://schemas.microsoft.com/office/drawing/2014/main" val="3220069263"/>
+                  </a:ext>
+                </a:extLst>
+              </a:tr>
+              <a:tr h="290921">
+                <a:tc>
+                  <a:txBody>
+                    <a:bodyPr/>
+                    <a:lstStyle/>
+                    <a:p>
+                      <a:r>
+                        <a:rPr lang="en-US" sz="1200" dirty="0">
+                          <a:solidFill>
+                            <a:srgbClr val="FF0000"/>
+                          </a:solidFill>
+                        </a:rPr>
+                        <a:t>WF</a:t>
+                      </a:r>
+                    </a:p>
+                  </a:txBody>
+                  <a:tcPr/>
+                </a:tc>
+                <a:tc>
+                  <a:txBody>
+                    <a:bodyPr/>
+                    <a:lstStyle/>
+                    <a:p>
+                      <a:pPr marL="0" marR="0" lvl="0" indent="0" algn="l" defTabSz="914400" rtl="0" eaLnBrk="1" fontAlgn="auto" latinLnBrk="0" hangingPunct="1">
+                        <a:lnSpc>
+                          <a:spcPct val="100000"/>
+                        </a:lnSpc>
+                        <a:spcBef>
+                          <a:spcPts val="0"/>
+                        </a:spcBef>
+                        <a:spcAft>
+                          <a:spcPts val="0"/>
+                        </a:spcAft>
+                        <a:buClrTx/>
+                        <a:buSzTx/>
+                        <a:buFontTx/>
+                        <a:buNone/>
+                        <a:tabLst/>
+                        <a:defRPr/>
+                      </a:pPr>
+                      <a:r>
+                        <a:rPr lang="en-US" sz="1200" dirty="0"/>
+                        <a:t>Current Infra w/o</a:t>
+                      </a:r>
+                      <a:r>
+                        <a:rPr lang="en-US" sz="1200" baseline="0" dirty="0"/>
+                        <a:t> IRP</a:t>
+                      </a:r>
+                    </a:p>
+                  </a:txBody>
+                  <a:tcPr/>
+                </a:tc>
+                <a:tc>
+                  <a:txBody>
+                    <a:bodyPr/>
+                    <a:lstStyle/>
+                    <a:p>
+                      <a:r>
+                        <a:rPr lang="en-US" sz="1200" dirty="0"/>
+                        <a:t>Distributed – natural gas</a:t>
+                      </a:r>
+                    </a:p>
+                  </a:txBody>
+                  <a:tcPr>
+                    <a:solidFill>
+                      <a:schemeClr val="bg1"/>
+                    </a:solidFill>
+                  </a:tcPr>
+                </a:tc>
+                <a:extLst>
+                  <a:ext uri="{0D108BD9-81ED-4DB2-BD59-A6C34878D82A}">
+                    <a16:rowId xmlns:a16="http://schemas.microsoft.com/office/drawing/2014/main" val="116377641"/>
+                  </a:ext>
+                </a:extLst>
+              </a:tr>
+              <a:tr h="290921">
+                <a:tc>
+                  <a:txBody>
+                    <a:bodyPr/>
+                    <a:lstStyle/>
+                    <a:p>
+                      <a:r>
+                        <a:rPr lang="en-US" sz="1200" dirty="0"/>
+                        <a:t>XA</a:t>
+                      </a:r>
+                    </a:p>
+                  </a:txBody>
+                  <a:tcPr/>
+                </a:tc>
+                <a:tc>
+                  <a:txBody>
+                    <a:bodyPr/>
+                    <a:lstStyle/>
+                    <a:p>
+                      <a:pPr marL="0" marR="0" indent="0" algn="l" defTabSz="914400" rtl="0" eaLnBrk="1" fontAlgn="auto" latinLnBrk="0" hangingPunct="1">
+                        <a:lnSpc>
+                          <a:spcPct val="100000"/>
+                        </a:lnSpc>
+                        <a:spcBef>
+                          <a:spcPts val="0"/>
+                        </a:spcBef>
+                        <a:spcAft>
+                          <a:spcPts val="0"/>
+                        </a:spcAft>
+                        <a:buClrTx/>
+                        <a:buSzTx/>
+                        <a:buFontTx/>
+                        <a:buNone/>
+                        <a:tabLst/>
+                        <a:defRPr/>
+                      </a:pPr>
+                      <a:r>
+                        <a:rPr lang="en-US" sz="1200" b="1" dirty="0"/>
+                        <a:t>Hardened Infra w/o</a:t>
+                      </a:r>
+                      <a:r>
+                        <a:rPr lang="en-US" sz="1200" b="1" baseline="0" dirty="0"/>
+                        <a:t> IRP</a:t>
+                      </a:r>
+                    </a:p>
+                  </a:txBody>
+                  <a:tcPr/>
+                </a:tc>
+                <a:tc>
+                  <a:txBody>
+                    <a:bodyPr/>
+                    <a:lstStyle/>
+                    <a:p>
+                      <a:r>
+                        <a:rPr lang="en-US" sz="1200" dirty="0"/>
+                        <a:t>Centralized</a:t>
+                      </a:r>
+                    </a:p>
+                  </a:txBody>
+                  <a:tcPr>
+                    <a:solidFill>
+                      <a:schemeClr val="bg1">
+                        <a:lumMod val="75000"/>
+                      </a:schemeClr>
+                    </a:solidFill>
+                  </a:tcPr>
+                </a:tc>
+                <a:extLst>
+                  <a:ext uri="{0D108BD9-81ED-4DB2-BD59-A6C34878D82A}">
+                    <a16:rowId xmlns:a16="http://schemas.microsoft.com/office/drawing/2014/main" val="653698369"/>
+                  </a:ext>
+                </a:extLst>
+              </a:tr>
+              <a:tr h="290921">
+                <a:tc>
+                  <a:txBody>
+                    <a:bodyPr/>
+                    <a:lstStyle/>
+                    <a:p>
+                      <a:r>
+                        <a:rPr lang="en-US" sz="1200" dirty="0"/>
+                        <a:t>XB</a:t>
+                      </a:r>
+                    </a:p>
+                  </a:txBody>
+                  <a:tcPr/>
+                </a:tc>
+                <a:tc>
+                  <a:txBody>
+                    <a:bodyPr/>
+                    <a:lstStyle/>
+                    <a:p>
+                      <a:pPr marL="0" marR="0" indent="0" algn="l" defTabSz="914400" rtl="0" eaLnBrk="1" fontAlgn="auto" latinLnBrk="0" hangingPunct="1">
+                        <a:lnSpc>
+                          <a:spcPct val="100000"/>
+                        </a:lnSpc>
+                        <a:spcBef>
+                          <a:spcPts val="0"/>
+                        </a:spcBef>
+                        <a:spcAft>
+                          <a:spcPts val="0"/>
+                        </a:spcAft>
+                        <a:buClrTx/>
+                        <a:buSzTx/>
+                        <a:buFontTx/>
+                        <a:buNone/>
+                        <a:tabLst/>
+                        <a:defRPr/>
+                      </a:pPr>
+                      <a:r>
+                        <a:rPr lang="en-US" sz="1200" b="1" dirty="0"/>
+                        <a:t>Hardened Infra w/o</a:t>
+                      </a:r>
+                      <a:r>
+                        <a:rPr lang="en-US" sz="1200" b="1" baseline="0" dirty="0"/>
+                        <a:t> IRP</a:t>
+                      </a:r>
+                    </a:p>
+                  </a:txBody>
+                  <a:tcPr/>
+                </a:tc>
+                <a:tc>
+                  <a:txBody>
+                    <a:bodyPr/>
+                    <a:lstStyle/>
+                    <a:p>
+                      <a:r>
+                        <a:rPr lang="en-US" sz="1200" dirty="0"/>
+                        <a:t>Distributed</a:t>
+                      </a:r>
+                    </a:p>
+                  </a:txBody>
+                  <a:tcPr>
+                    <a:solidFill>
+                      <a:schemeClr val="accent2">
+                        <a:lumMod val="60000"/>
+                        <a:lumOff val="40000"/>
+                      </a:schemeClr>
+                    </a:solidFill>
+                  </a:tcPr>
+                </a:tc>
+                <a:extLst>
+                  <a:ext uri="{0D108BD9-81ED-4DB2-BD59-A6C34878D82A}">
+                    <a16:rowId xmlns:a16="http://schemas.microsoft.com/office/drawing/2014/main" val="275822130"/>
+                  </a:ext>
+                </a:extLst>
+              </a:tr>
+              <a:tr h="290921">
+                <a:tc>
+                  <a:txBody>
+                    <a:bodyPr/>
+                    <a:lstStyle/>
+                    <a:p>
+                      <a:r>
+                        <a:rPr lang="en-US" sz="1200" dirty="0"/>
+                        <a:t>XC</a:t>
+                      </a:r>
+                    </a:p>
+                  </a:txBody>
+                  <a:tcPr/>
+                </a:tc>
+                <a:tc>
+                  <a:txBody>
+                    <a:bodyPr/>
+                    <a:lstStyle/>
+                    <a:p>
+                      <a:pPr marL="0" marR="0" lvl="0" indent="0" algn="l" defTabSz="914400" rtl="0" eaLnBrk="1" fontAlgn="auto" latinLnBrk="0" hangingPunct="1">
+                        <a:lnSpc>
+                          <a:spcPct val="100000"/>
+                        </a:lnSpc>
+                        <a:spcBef>
+                          <a:spcPts val="0"/>
+                        </a:spcBef>
+                        <a:spcAft>
+                          <a:spcPts val="0"/>
+                        </a:spcAft>
+                        <a:buClrTx/>
+                        <a:buSzTx/>
+                        <a:buFontTx/>
+                        <a:buNone/>
+                        <a:tabLst/>
+                        <a:defRPr/>
+                      </a:pPr>
+                      <a:r>
+                        <a:rPr lang="en-US" sz="1200" b="1" dirty="0"/>
+                        <a:t>Hardened Infra w/o</a:t>
+                      </a:r>
+                      <a:r>
+                        <a:rPr lang="en-US" sz="1200" b="1" baseline="0" dirty="0"/>
+                        <a:t> IRP</a:t>
+                      </a:r>
+                    </a:p>
+                  </a:txBody>
+                  <a:tcPr/>
+                </a:tc>
+                <a:tc>
+                  <a:txBody>
+                    <a:bodyPr/>
+                    <a:lstStyle/>
+                    <a:p>
+                      <a:pPr marL="0" marR="0" lvl="0" indent="0" algn="l" defTabSz="914400" rtl="0" eaLnBrk="1" fontAlgn="auto" latinLnBrk="0" hangingPunct="1">
+                        <a:lnSpc>
+                          <a:spcPct val="100000"/>
+                        </a:lnSpc>
+                        <a:spcBef>
+                          <a:spcPts val="0"/>
+                        </a:spcBef>
+                        <a:spcAft>
+                          <a:spcPts val="0"/>
+                        </a:spcAft>
+                        <a:buClrTx/>
+                        <a:buSzTx/>
+                        <a:buFontTx/>
+                        <a:buNone/>
+                        <a:tabLst/>
+                        <a:defRPr/>
+                      </a:pPr>
+                      <a:r>
+                        <a:rPr lang="en-US" sz="1200" dirty="0"/>
+                        <a:t>Distributed w/o Wind</a:t>
+                      </a:r>
+                    </a:p>
+                  </a:txBody>
+                  <a:tcPr>
+                    <a:solidFill>
+                      <a:srgbClr val="7030A0"/>
+                    </a:solidFill>
+                  </a:tcPr>
+                </a:tc>
+                <a:extLst>
+                  <a:ext uri="{0D108BD9-81ED-4DB2-BD59-A6C34878D82A}">
+                    <a16:rowId xmlns:a16="http://schemas.microsoft.com/office/drawing/2014/main" val="1180886549"/>
+                  </a:ext>
+                </a:extLst>
+              </a:tr>
+              <a:tr h="290921">
+                <a:tc>
+                  <a:txBody>
+                    <a:bodyPr/>
+                    <a:lstStyle/>
+                    <a:p>
+                      <a:r>
+                        <a:rPr lang="en-US" sz="1200" dirty="0"/>
+                        <a:t>XD</a:t>
+                      </a:r>
+                    </a:p>
+                  </a:txBody>
+                  <a:tcPr/>
+                </a:tc>
+                <a:tc>
+                  <a:txBody>
+                    <a:bodyPr/>
+                    <a:lstStyle/>
+                    <a:p>
+                      <a:pPr marL="0" marR="0" indent="0" algn="l" defTabSz="914400" rtl="0" eaLnBrk="1" fontAlgn="auto" latinLnBrk="0" hangingPunct="1">
+                        <a:lnSpc>
+                          <a:spcPct val="100000"/>
+                        </a:lnSpc>
+                        <a:spcBef>
+                          <a:spcPts val="0"/>
+                        </a:spcBef>
+                        <a:spcAft>
+                          <a:spcPts val="0"/>
+                        </a:spcAft>
+                        <a:buClrTx/>
+                        <a:buSzTx/>
+                        <a:buFontTx/>
+                        <a:buNone/>
+                        <a:tabLst/>
+                        <a:defRPr/>
+                      </a:pPr>
+                      <a:r>
+                        <a:rPr lang="en-US" sz="1200" b="1" dirty="0"/>
+                        <a:t>Hardened Infra w/o</a:t>
+                      </a:r>
+                      <a:r>
+                        <a:rPr lang="en-US" sz="1200" b="1" baseline="0" dirty="0"/>
+                        <a:t> IRP</a:t>
+                      </a:r>
+                    </a:p>
+                  </a:txBody>
+                  <a:tcPr/>
+                </a:tc>
+                <a:tc>
+                  <a:txBody>
+                    <a:bodyPr/>
+                    <a:lstStyle/>
+                    <a:p>
+                      <a:r>
+                        <a:rPr lang="en-US" sz="1200" dirty="0"/>
+                        <a:t>Business-as-usual</a:t>
+                      </a:r>
+                    </a:p>
+                  </a:txBody>
+                  <a:tcPr>
+                    <a:solidFill>
+                      <a:srgbClr val="0070C0"/>
+                    </a:solidFill>
+                  </a:tcPr>
+                </a:tc>
+                <a:extLst>
+                  <a:ext uri="{0D108BD9-81ED-4DB2-BD59-A6C34878D82A}">
+                    <a16:rowId xmlns:a16="http://schemas.microsoft.com/office/drawing/2014/main" val="3258577534"/>
+                  </a:ext>
+                </a:extLst>
+              </a:tr>
+              <a:tr h="290921">
+                <a:tc>
+                  <a:txBody>
+                    <a:bodyPr/>
+                    <a:lstStyle/>
+                    <a:p>
+                      <a:r>
+                        <a:rPr lang="en-US" sz="1200" dirty="0"/>
+                        <a:t>YA</a:t>
+                      </a:r>
+                    </a:p>
+                  </a:txBody>
+                  <a:tcPr/>
+                </a:tc>
+                <a:tc>
+                  <a:txBody>
+                    <a:bodyPr/>
+                    <a:lstStyle/>
+                    <a:p>
+                      <a:pPr marL="0" marR="0" indent="0" algn="l" defTabSz="914400" rtl="0" eaLnBrk="1" fontAlgn="auto" latinLnBrk="0" hangingPunct="1">
+                        <a:lnSpc>
+                          <a:spcPct val="100000"/>
+                        </a:lnSpc>
+                        <a:spcBef>
+                          <a:spcPts val="0"/>
+                        </a:spcBef>
+                        <a:spcAft>
+                          <a:spcPts val="0"/>
+                        </a:spcAft>
+                        <a:buClrTx/>
+                        <a:buSzTx/>
+                        <a:buFontTx/>
+                        <a:buNone/>
+                        <a:tabLst/>
+                        <a:defRPr/>
+                      </a:pPr>
+                      <a:r>
+                        <a:rPr lang="en-US" sz="1200" dirty="0"/>
+                        <a:t>Current Infra w/</a:t>
+                      </a:r>
+                      <a:r>
+                        <a:rPr lang="en-US" sz="1200" baseline="0" dirty="0"/>
+                        <a:t> IRP</a:t>
+                      </a:r>
+                    </a:p>
+                  </a:txBody>
+                  <a:tcPr/>
+                </a:tc>
+                <a:tc>
+                  <a:txBody>
+                    <a:bodyPr/>
+                    <a:lstStyle/>
+                    <a:p>
+                      <a:r>
+                        <a:rPr lang="en-US" sz="1200" dirty="0"/>
+                        <a:t>Centralized</a:t>
+                      </a:r>
+                    </a:p>
+                  </a:txBody>
+                  <a:tcPr>
+                    <a:solidFill>
+                      <a:schemeClr val="bg1">
+                        <a:lumMod val="75000"/>
+                      </a:schemeClr>
+                    </a:solidFill>
+                  </a:tcPr>
+                </a:tc>
+                <a:extLst>
+                  <a:ext uri="{0D108BD9-81ED-4DB2-BD59-A6C34878D82A}">
+                    <a16:rowId xmlns:a16="http://schemas.microsoft.com/office/drawing/2014/main" val="3380108376"/>
+                  </a:ext>
+                </a:extLst>
+              </a:tr>
+              <a:tr h="290921">
+                <a:tc>
+                  <a:txBody>
+                    <a:bodyPr/>
+                    <a:lstStyle/>
+                    <a:p>
+                      <a:r>
+                        <a:rPr lang="en-US" sz="1200" dirty="0"/>
+                        <a:t>YB</a:t>
+                      </a:r>
+                    </a:p>
+                  </a:txBody>
+                  <a:tcPr/>
+                </a:tc>
+                <a:tc>
+                  <a:txBody>
+                    <a:bodyPr/>
+                    <a:lstStyle/>
+                    <a:p>
+                      <a:pPr marL="0" marR="0" indent="0" algn="l" defTabSz="914400" rtl="0" eaLnBrk="1" fontAlgn="auto" latinLnBrk="0" hangingPunct="1">
+                        <a:lnSpc>
+                          <a:spcPct val="100000"/>
+                        </a:lnSpc>
+                        <a:spcBef>
+                          <a:spcPts val="0"/>
+                        </a:spcBef>
+                        <a:spcAft>
+                          <a:spcPts val="0"/>
+                        </a:spcAft>
+                        <a:buClrTx/>
+                        <a:buSzTx/>
+                        <a:buFontTx/>
+                        <a:buNone/>
+                        <a:tabLst/>
+                        <a:defRPr/>
+                      </a:pPr>
+                      <a:r>
+                        <a:rPr lang="en-US" sz="1200" dirty="0"/>
+                        <a:t>Current Infra w/</a:t>
+                      </a:r>
+                      <a:r>
+                        <a:rPr lang="en-US" sz="1200" baseline="0" dirty="0"/>
+                        <a:t> IRP</a:t>
+                      </a:r>
+                    </a:p>
+                  </a:txBody>
+                  <a:tcPr/>
+                </a:tc>
+                <a:tc>
+                  <a:txBody>
+                    <a:bodyPr/>
+                    <a:lstStyle/>
+                    <a:p>
+                      <a:r>
+                        <a:rPr lang="en-US" sz="1200" dirty="0"/>
+                        <a:t>Distributed</a:t>
+                      </a:r>
+                    </a:p>
+                  </a:txBody>
+                  <a:tcPr>
+                    <a:solidFill>
+                      <a:schemeClr val="accent2">
+                        <a:lumMod val="60000"/>
+                        <a:lumOff val="40000"/>
+                      </a:schemeClr>
+                    </a:solidFill>
+                  </a:tcPr>
+                </a:tc>
+                <a:extLst>
+                  <a:ext uri="{0D108BD9-81ED-4DB2-BD59-A6C34878D82A}">
+                    <a16:rowId xmlns:a16="http://schemas.microsoft.com/office/drawing/2014/main" val="4171818030"/>
+                  </a:ext>
+                </a:extLst>
+              </a:tr>
+              <a:tr h="290921">
+                <a:tc>
+                  <a:txBody>
+                    <a:bodyPr/>
+                    <a:lstStyle/>
+                    <a:p>
+                      <a:r>
+                        <a:rPr lang="en-US" sz="1200" dirty="0"/>
+                        <a:t>YC</a:t>
+                      </a:r>
+                    </a:p>
+                  </a:txBody>
+                  <a:tcPr/>
+                </a:tc>
+                <a:tc>
+                  <a:txBody>
+                    <a:bodyPr/>
+                    <a:lstStyle/>
+                    <a:p>
+                      <a:pPr marL="0" marR="0" lvl="0" indent="0" algn="l" defTabSz="914400" rtl="0" eaLnBrk="1" fontAlgn="auto" latinLnBrk="0" hangingPunct="1">
+                        <a:lnSpc>
+                          <a:spcPct val="100000"/>
+                        </a:lnSpc>
+                        <a:spcBef>
+                          <a:spcPts val="0"/>
+                        </a:spcBef>
+                        <a:spcAft>
+                          <a:spcPts val="0"/>
+                        </a:spcAft>
+                        <a:buClrTx/>
+                        <a:buSzTx/>
+                        <a:buFontTx/>
+                        <a:buNone/>
+                        <a:tabLst/>
+                        <a:defRPr/>
+                      </a:pPr>
+                      <a:r>
+                        <a:rPr lang="en-US" sz="1200" dirty="0"/>
+                        <a:t>Current Infra w/</a:t>
+                      </a:r>
+                      <a:r>
+                        <a:rPr lang="en-US" sz="1200" baseline="0" dirty="0"/>
+                        <a:t> IRP</a:t>
+                      </a:r>
+                    </a:p>
+                  </a:txBody>
+                  <a:tcPr/>
+                </a:tc>
+                <a:tc>
+                  <a:txBody>
+                    <a:bodyPr/>
+                    <a:lstStyle/>
+                    <a:p>
+                      <a:r>
+                        <a:rPr lang="en-US" sz="1200" dirty="0"/>
+                        <a:t>Distributed w/o Wind</a:t>
+                      </a:r>
+                    </a:p>
+                  </a:txBody>
+                  <a:tcPr>
+                    <a:solidFill>
+                      <a:srgbClr val="7030A0"/>
+                    </a:solidFill>
+                  </a:tcPr>
+                </a:tc>
+                <a:extLst>
+                  <a:ext uri="{0D108BD9-81ED-4DB2-BD59-A6C34878D82A}">
+                    <a16:rowId xmlns:a16="http://schemas.microsoft.com/office/drawing/2014/main" val="2440716064"/>
+                  </a:ext>
+                </a:extLst>
+              </a:tr>
+              <a:tr h="290921">
+                <a:tc>
+                  <a:txBody>
+                    <a:bodyPr/>
+                    <a:lstStyle/>
+                    <a:p>
+                      <a:r>
+                        <a:rPr lang="en-US" sz="1200" dirty="0"/>
+                        <a:t>ZA</a:t>
+                      </a:r>
+                    </a:p>
+                  </a:txBody>
+                  <a:tcPr/>
+                </a:tc>
+                <a:tc>
+                  <a:txBody>
+                    <a:bodyPr/>
+                    <a:lstStyle/>
+                    <a:p>
+                      <a:pPr marL="0" marR="0" indent="0" algn="l" defTabSz="914400" rtl="0" eaLnBrk="1" fontAlgn="auto" latinLnBrk="0" hangingPunct="1">
+                        <a:lnSpc>
+                          <a:spcPct val="100000"/>
+                        </a:lnSpc>
+                        <a:spcBef>
+                          <a:spcPts val="0"/>
+                        </a:spcBef>
+                        <a:spcAft>
+                          <a:spcPts val="0"/>
+                        </a:spcAft>
+                        <a:buClrTx/>
+                        <a:buSzTx/>
+                        <a:buFontTx/>
+                        <a:buNone/>
+                        <a:tabLst/>
+                        <a:defRPr/>
+                      </a:pPr>
+                      <a:r>
+                        <a:rPr lang="en-US" sz="1200" b="1" dirty="0"/>
+                        <a:t>Hardened Infra w/</a:t>
+                      </a:r>
+                      <a:r>
+                        <a:rPr lang="en-US" sz="1200" b="1" baseline="0" dirty="0"/>
+                        <a:t> IRP</a:t>
+                      </a:r>
+                    </a:p>
+                  </a:txBody>
+                  <a:tcPr/>
+                </a:tc>
+                <a:tc>
+                  <a:txBody>
+                    <a:bodyPr/>
+                    <a:lstStyle/>
+                    <a:p>
+                      <a:r>
+                        <a:rPr lang="en-US" sz="1200" dirty="0"/>
+                        <a:t>Centralized</a:t>
+                      </a:r>
+                    </a:p>
+                  </a:txBody>
+                  <a:tcPr>
+                    <a:solidFill>
+                      <a:schemeClr val="bg1">
+                        <a:lumMod val="75000"/>
+                      </a:schemeClr>
+                    </a:solidFill>
+                  </a:tcPr>
+                </a:tc>
+                <a:extLst>
+                  <a:ext uri="{0D108BD9-81ED-4DB2-BD59-A6C34878D82A}">
+                    <a16:rowId xmlns:a16="http://schemas.microsoft.com/office/drawing/2014/main" val="1475263509"/>
+                  </a:ext>
+                </a:extLst>
+              </a:tr>
+              <a:tr h="290921">
+                <a:tc>
+                  <a:txBody>
+                    <a:bodyPr/>
+                    <a:lstStyle/>
+                    <a:p>
+                      <a:r>
+                        <a:rPr lang="en-US" sz="1200" dirty="0"/>
+                        <a:t>ZB</a:t>
+                      </a:r>
+                    </a:p>
+                  </a:txBody>
+                  <a:tcPr/>
+                </a:tc>
+                <a:tc>
+                  <a:txBody>
+                    <a:bodyPr/>
+                    <a:lstStyle/>
+                    <a:p>
+                      <a:pPr marL="0" marR="0" indent="0" algn="l" defTabSz="914400" rtl="0" eaLnBrk="1" fontAlgn="auto" latinLnBrk="0" hangingPunct="1">
+                        <a:lnSpc>
+                          <a:spcPct val="100000"/>
+                        </a:lnSpc>
+                        <a:spcBef>
+                          <a:spcPts val="0"/>
+                        </a:spcBef>
+                        <a:spcAft>
+                          <a:spcPts val="0"/>
+                        </a:spcAft>
+                        <a:buClrTx/>
+                        <a:buSzTx/>
+                        <a:buFontTx/>
+                        <a:buNone/>
+                        <a:tabLst/>
+                        <a:defRPr/>
+                      </a:pPr>
+                      <a:r>
+                        <a:rPr lang="en-US" sz="1200" b="1" dirty="0"/>
+                        <a:t>Hardened Infra w/</a:t>
+                      </a:r>
+                      <a:r>
+                        <a:rPr lang="en-US" sz="1200" b="1" baseline="0" dirty="0"/>
+                        <a:t> IRP</a:t>
+                      </a:r>
+                    </a:p>
+                  </a:txBody>
+                  <a:tcPr/>
+                </a:tc>
+                <a:tc>
+                  <a:txBody>
+                    <a:bodyPr/>
+                    <a:lstStyle/>
+                    <a:p>
+                      <a:r>
+                        <a:rPr lang="en-US" sz="1200" dirty="0"/>
+                        <a:t>Distributed</a:t>
+                      </a:r>
+                    </a:p>
+                  </a:txBody>
+                  <a:tcPr>
+                    <a:solidFill>
+                      <a:schemeClr val="accent2">
+                        <a:lumMod val="60000"/>
+                        <a:lumOff val="40000"/>
+                      </a:schemeClr>
+                    </a:solidFill>
+                  </a:tcPr>
+                </a:tc>
+                <a:extLst>
+                  <a:ext uri="{0D108BD9-81ED-4DB2-BD59-A6C34878D82A}">
+                    <a16:rowId xmlns:a16="http://schemas.microsoft.com/office/drawing/2014/main" val="3826412125"/>
+                  </a:ext>
+                </a:extLst>
+              </a:tr>
+              <a:tr h="290921">
+                <a:tc>
+                  <a:txBody>
+                    <a:bodyPr/>
+                    <a:lstStyle/>
+                    <a:p>
+                      <a:r>
+                        <a:rPr lang="en-US" sz="1200" dirty="0"/>
+                        <a:t>ZC</a:t>
+                      </a:r>
+                    </a:p>
+                  </a:txBody>
+                  <a:tcPr/>
+                </a:tc>
+                <a:tc>
+                  <a:txBody>
+                    <a:bodyPr/>
+                    <a:lstStyle/>
+                    <a:p>
+                      <a:pPr marL="0" marR="0" lvl="0" indent="0" algn="l" defTabSz="914400" rtl="0" eaLnBrk="1" fontAlgn="auto" latinLnBrk="0" hangingPunct="1">
+                        <a:lnSpc>
+                          <a:spcPct val="100000"/>
+                        </a:lnSpc>
+                        <a:spcBef>
+                          <a:spcPts val="0"/>
+                        </a:spcBef>
+                        <a:spcAft>
+                          <a:spcPts val="0"/>
+                        </a:spcAft>
+                        <a:buClrTx/>
+                        <a:buSzTx/>
+                        <a:buFontTx/>
+                        <a:buNone/>
+                        <a:tabLst/>
+                        <a:defRPr/>
+                      </a:pPr>
+                      <a:r>
+                        <a:rPr lang="en-US" sz="1200" b="1" dirty="0"/>
+                        <a:t>Hardened Infra w/</a:t>
+                      </a:r>
+                      <a:r>
+                        <a:rPr lang="en-US" sz="1200" b="1" baseline="0" dirty="0"/>
+                        <a:t> IRP</a:t>
+                      </a:r>
+                    </a:p>
+                  </a:txBody>
+                  <a:tcPr/>
+                </a:tc>
+                <a:tc>
+                  <a:txBody>
+                    <a:bodyPr/>
+                    <a:lstStyle/>
+                    <a:p>
+                      <a:pPr marL="0" marR="0" lvl="0" indent="0" algn="l" defTabSz="914400" rtl="0" eaLnBrk="1" fontAlgn="auto" latinLnBrk="0" hangingPunct="1">
+                        <a:lnSpc>
+                          <a:spcPct val="100000"/>
+                        </a:lnSpc>
+                        <a:spcBef>
+                          <a:spcPts val="0"/>
+                        </a:spcBef>
+                        <a:spcAft>
+                          <a:spcPts val="0"/>
+                        </a:spcAft>
+                        <a:buClrTx/>
+                        <a:buSzTx/>
+                        <a:buFontTx/>
+                        <a:buNone/>
+                        <a:tabLst/>
+                        <a:defRPr/>
+                      </a:pPr>
+                      <a:r>
+                        <a:rPr lang="en-US" sz="1200" dirty="0"/>
+                        <a:t>Distributed w/o Wind</a:t>
+                      </a:r>
+                    </a:p>
+                  </a:txBody>
+                  <a:tcPr>
+                    <a:solidFill>
+                      <a:srgbClr val="7030A0"/>
+                    </a:solidFill>
+                  </a:tcPr>
+                </a:tc>
+                <a:extLst>
+                  <a:ext uri="{0D108BD9-81ED-4DB2-BD59-A6C34878D82A}">
+                    <a16:rowId xmlns:a16="http://schemas.microsoft.com/office/drawing/2014/main" val="731984826"/>
+                  </a:ext>
+                </a:extLst>
+              </a:tr>
+            </a:tbl>
+          </a:graphicData>
+        </a:graphic>
+      </p:graphicFrame>
+    </p:spTree>
+    <p:extLst>
+      <p:ext uri="{BB962C8B-B14F-4D97-AF65-F5344CB8AC3E}">
+        <p14:creationId xmlns:p14="http://schemas.microsoft.com/office/powerpoint/2010/main" val="2748858494"/>
+      </p:ext>
+    </p:extLst>
+  </p:cSld>
+  <p:clrMapOvr>
+    <a:masterClrMapping/>
+  </p:clrMapOvr>
+</p:sld>
+</file>
+
 <file path=ppt/theme/theme1.xml><?xml version="1.0" encoding="utf-8"?>
 <a:theme xmlns:a="http://schemas.openxmlformats.org/drawingml/2006/main" name="Office Theme">
   <a:themeElements>

</xml_diff>

<commit_message>
adjusted reserve margin constraint in temoa_stochastic updated model inputs
</commit_message>
<xml_diff>
--- a/projects/puerto_rico_stoch/data/scenario_overview.pptx
+++ b/projects/puerto_rico_stoch/data/scenario_overview.pptx
@@ -8,6 +8,7 @@
     <p:sldId id="257" r:id="rId2"/>
     <p:sldId id="259" r:id="rId3"/>
     <p:sldId id="260" r:id="rId4"/>
+    <p:sldId id="261" r:id="rId5"/>
   </p:sldIdLst>
   <p:sldSz cx="12192000" cy="6858000"/>
   <p:notesSz cx="6858000" cy="9144000"/>
@@ -243,7 +244,7 @@
           <a:p>
             <a:fld id="{4E0D474A-36D6-42D7-8D99-A750CFDD9A60}" type="datetimeFigureOut">
               <a:rPr lang="en-US" smtClean="0"/>
-              <a:t>3/24/2020</a:t>
+              <a:t>3/25/2020</a:t>
             </a:fld>
             <a:endParaRPr lang="en-US"/>
           </a:p>
@@ -411,7 +412,7 @@
           <a:p>
             <a:fld id="{4E0D474A-36D6-42D7-8D99-A750CFDD9A60}" type="datetimeFigureOut">
               <a:rPr lang="en-US" smtClean="0"/>
-              <a:t>3/24/2020</a:t>
+              <a:t>3/25/2020</a:t>
             </a:fld>
             <a:endParaRPr lang="en-US"/>
           </a:p>
@@ -589,7 +590,7 @@
           <a:p>
             <a:fld id="{4E0D474A-36D6-42D7-8D99-A750CFDD9A60}" type="datetimeFigureOut">
               <a:rPr lang="en-US" smtClean="0"/>
-              <a:t>3/24/2020</a:t>
+              <a:t>3/25/2020</a:t>
             </a:fld>
             <a:endParaRPr lang="en-US"/>
           </a:p>
@@ -757,7 +758,7 @@
           <a:p>
             <a:fld id="{4E0D474A-36D6-42D7-8D99-A750CFDD9A60}" type="datetimeFigureOut">
               <a:rPr lang="en-US" smtClean="0"/>
-              <a:t>3/24/2020</a:t>
+              <a:t>3/25/2020</a:t>
             </a:fld>
             <a:endParaRPr lang="en-US"/>
           </a:p>
@@ -1002,7 +1003,7 @@
           <a:p>
             <a:fld id="{4E0D474A-36D6-42D7-8D99-A750CFDD9A60}" type="datetimeFigureOut">
               <a:rPr lang="en-US" smtClean="0"/>
-              <a:t>3/24/2020</a:t>
+              <a:t>3/25/2020</a:t>
             </a:fld>
             <a:endParaRPr lang="en-US"/>
           </a:p>
@@ -1231,7 +1232,7 @@
           <a:p>
             <a:fld id="{4E0D474A-36D6-42D7-8D99-A750CFDD9A60}" type="datetimeFigureOut">
               <a:rPr lang="en-US" smtClean="0"/>
-              <a:t>3/24/2020</a:t>
+              <a:t>3/25/2020</a:t>
             </a:fld>
             <a:endParaRPr lang="en-US"/>
           </a:p>
@@ -1595,7 +1596,7 @@
           <a:p>
             <a:fld id="{4E0D474A-36D6-42D7-8D99-A750CFDD9A60}" type="datetimeFigureOut">
               <a:rPr lang="en-US" smtClean="0"/>
-              <a:t>3/24/2020</a:t>
+              <a:t>3/25/2020</a:t>
             </a:fld>
             <a:endParaRPr lang="en-US"/>
           </a:p>
@@ -1712,7 +1713,7 @@
           <a:p>
             <a:fld id="{4E0D474A-36D6-42D7-8D99-A750CFDD9A60}" type="datetimeFigureOut">
               <a:rPr lang="en-US" smtClean="0"/>
-              <a:t>3/24/2020</a:t>
+              <a:t>3/25/2020</a:t>
             </a:fld>
             <a:endParaRPr lang="en-US"/>
           </a:p>
@@ -1807,7 +1808,7 @@
           <a:p>
             <a:fld id="{4E0D474A-36D6-42D7-8D99-A750CFDD9A60}" type="datetimeFigureOut">
               <a:rPr lang="en-US" smtClean="0"/>
-              <a:t>3/24/2020</a:t>
+              <a:t>3/25/2020</a:t>
             </a:fld>
             <a:endParaRPr lang="en-US"/>
           </a:p>
@@ -2082,7 +2083,7 @@
           <a:p>
             <a:fld id="{4E0D474A-36D6-42D7-8D99-A750CFDD9A60}" type="datetimeFigureOut">
               <a:rPr lang="en-US" smtClean="0"/>
-              <a:t>3/24/2020</a:t>
+              <a:t>3/25/2020</a:t>
             </a:fld>
             <a:endParaRPr lang="en-US"/>
           </a:p>
@@ -2334,7 +2335,7 @@
           <a:p>
             <a:fld id="{4E0D474A-36D6-42D7-8D99-A750CFDD9A60}" type="datetimeFigureOut">
               <a:rPr lang="en-US" smtClean="0"/>
-              <a:t>3/24/2020</a:t>
+              <a:t>3/25/2020</a:t>
             </a:fld>
             <a:endParaRPr lang="en-US"/>
           </a:p>
@@ -2545,7 +2546,7 @@
           <a:p>
             <a:fld id="{4E0D474A-36D6-42D7-8D99-A750CFDD9A60}" type="datetimeFigureOut">
               <a:rPr lang="en-US" smtClean="0"/>
-              <a:t>3/24/2020</a:t>
+              <a:t>3/25/2020</a:t>
             </a:fld>
             <a:endParaRPr lang="en-US"/>
           </a:p>
@@ -9063,6 +9064,1605 @@
 </p:sld>
 </file>
 
+<file path=ppt/slides/slide4.xml><?xml version="1.0" encoding="utf-8"?>
+<p:sld xmlns:a="http://schemas.openxmlformats.org/drawingml/2006/main" xmlns:r="http://schemas.openxmlformats.org/officeDocument/2006/relationships" xmlns:p="http://schemas.openxmlformats.org/presentationml/2006/main">
+  <p:cSld>
+    <p:spTree>
+      <p:nvGrpSpPr>
+        <p:cNvPr id="1" name=""/>
+        <p:cNvGrpSpPr/>
+        <p:nvPr/>
+      </p:nvGrpSpPr>
+      <p:grpSpPr>
+        <a:xfrm>
+          <a:off x="0" y="0"/>
+          <a:ext cx="0" cy="0"/>
+          <a:chOff x="0" y="0"/>
+          <a:chExt cx="0" cy="0"/>
+        </a:xfrm>
+      </p:grpSpPr>
+      <p:graphicFrame>
+        <p:nvGraphicFramePr>
+          <p:cNvPr id="2" name="Table 1"/>
+          <p:cNvGraphicFramePr>
+            <a:graphicFrameLocks noGrp="1"/>
+          </p:cNvGraphicFramePr>
+          <p:nvPr/>
+        </p:nvGraphicFramePr>
+        <p:xfrm>
+          <a:off x="128661" y="3354904"/>
+          <a:ext cx="4020322" cy="1483360"/>
+        </p:xfrm>
+        <a:graphic>
+          <a:graphicData uri="http://schemas.openxmlformats.org/drawingml/2006/table">
+            <a:tbl>
+              <a:tblPr firstRow="1" bandRow="1">
+                <a:tableStyleId>{5C22544A-7EE6-4342-B048-85BDC9FD1C3A}</a:tableStyleId>
+              </a:tblPr>
+              <a:tblGrid>
+                <a:gridCol w="823247">
+                  <a:extLst>
+                    <a:ext uri="{9D8B030D-6E8A-4147-A177-3AD203B41FA5}">
+                      <a16:colId xmlns:a16="http://schemas.microsoft.com/office/drawing/2014/main" val="2648408335"/>
+                    </a:ext>
+                  </a:extLst>
+                </a:gridCol>
+                <a:gridCol w="3197075">
+                  <a:extLst>
+                    <a:ext uri="{9D8B030D-6E8A-4147-A177-3AD203B41FA5}">
+                      <a16:colId xmlns:a16="http://schemas.microsoft.com/office/drawing/2014/main" val="545094443"/>
+                    </a:ext>
+                  </a:extLst>
+                </a:gridCol>
+              </a:tblGrid>
+              <a:tr h="370840">
+                <a:tc>
+                  <a:txBody>
+                    <a:bodyPr/>
+                    <a:lstStyle/>
+                    <a:p>
+                      <a:r>
+                        <a:rPr lang="en-US" dirty="0"/>
+                        <a:t>Suffix</a:t>
+                      </a:r>
+                    </a:p>
+                  </a:txBody>
+                  <a:tcPr/>
+                </a:tc>
+                <a:tc>
+                  <a:txBody>
+                    <a:bodyPr/>
+                    <a:lstStyle/>
+                    <a:p>
+                      <a:r>
+                        <a:rPr lang="en-US" dirty="0"/>
+                        <a:t>Technology Groups</a:t>
+                      </a:r>
+                    </a:p>
+                  </a:txBody>
+                  <a:tcPr/>
+                </a:tc>
+                <a:extLst>
+                  <a:ext uri="{0D108BD9-81ED-4DB2-BD59-A6C34878D82A}">
+                    <a16:rowId xmlns:a16="http://schemas.microsoft.com/office/drawing/2014/main" val="4043718998"/>
+                  </a:ext>
+                </a:extLst>
+              </a:tr>
+              <a:tr h="370840">
+                <a:tc>
+                  <a:txBody>
+                    <a:bodyPr/>
+                    <a:lstStyle/>
+                    <a:p>
+                      <a:r>
+                        <a:rPr lang="en-US" dirty="0"/>
+                        <a:t>A</a:t>
+                      </a:r>
+                    </a:p>
+                  </a:txBody>
+                  <a:tcPr/>
+                </a:tc>
+                <a:tc>
+                  <a:txBody>
+                    <a:bodyPr/>
+                    <a:lstStyle/>
+                    <a:p>
+                      <a:r>
+                        <a:rPr lang="en-US" dirty="0"/>
+                        <a:t>Centralized</a:t>
+                      </a:r>
+                    </a:p>
+                  </a:txBody>
+                  <a:tcPr/>
+                </a:tc>
+                <a:extLst>
+                  <a:ext uri="{0D108BD9-81ED-4DB2-BD59-A6C34878D82A}">
+                    <a16:rowId xmlns:a16="http://schemas.microsoft.com/office/drawing/2014/main" val="4153160432"/>
+                  </a:ext>
+                </a:extLst>
+              </a:tr>
+              <a:tr h="370840">
+                <a:tc>
+                  <a:txBody>
+                    <a:bodyPr/>
+                    <a:lstStyle/>
+                    <a:p>
+                      <a:r>
+                        <a:rPr lang="en-US" dirty="0"/>
+                        <a:t>B</a:t>
+                      </a:r>
+                    </a:p>
+                  </a:txBody>
+                  <a:tcPr/>
+                </a:tc>
+                <a:tc>
+                  <a:txBody>
+                    <a:bodyPr/>
+                    <a:lstStyle/>
+                    <a:p>
+                      <a:r>
+                        <a:rPr lang="en-US" dirty="0"/>
+                        <a:t>Distributed</a:t>
+                      </a:r>
+                    </a:p>
+                  </a:txBody>
+                  <a:tcPr/>
+                </a:tc>
+                <a:extLst>
+                  <a:ext uri="{0D108BD9-81ED-4DB2-BD59-A6C34878D82A}">
+                    <a16:rowId xmlns:a16="http://schemas.microsoft.com/office/drawing/2014/main" val="1374592847"/>
+                  </a:ext>
+                </a:extLst>
+              </a:tr>
+              <a:tr h="370840">
+                <a:tc>
+                  <a:txBody>
+                    <a:bodyPr/>
+                    <a:lstStyle/>
+                    <a:p>
+                      <a:r>
+                        <a:rPr lang="en-US" dirty="0"/>
+                        <a:t>C</a:t>
+                      </a:r>
+                    </a:p>
+                  </a:txBody>
+                  <a:tcPr/>
+                </a:tc>
+                <a:tc>
+                  <a:txBody>
+                    <a:bodyPr/>
+                    <a:lstStyle/>
+                    <a:p>
+                      <a:r>
+                        <a:rPr lang="en-US" dirty="0"/>
+                        <a:t>Business-as-usual (no IRP)</a:t>
+                      </a:r>
+                    </a:p>
+                  </a:txBody>
+                  <a:tcPr/>
+                </a:tc>
+                <a:extLst>
+                  <a:ext uri="{0D108BD9-81ED-4DB2-BD59-A6C34878D82A}">
+                    <a16:rowId xmlns:a16="http://schemas.microsoft.com/office/drawing/2014/main" val="1629897343"/>
+                  </a:ext>
+                </a:extLst>
+              </a:tr>
+            </a:tbl>
+          </a:graphicData>
+        </a:graphic>
+      </p:graphicFrame>
+      <p:graphicFrame>
+        <p:nvGraphicFramePr>
+          <p:cNvPr id="3" name="Table 2"/>
+          <p:cNvGraphicFramePr>
+            <a:graphicFrameLocks noGrp="1"/>
+          </p:cNvGraphicFramePr>
+          <p:nvPr/>
+        </p:nvGraphicFramePr>
+        <p:xfrm>
+          <a:off x="61244" y="402450"/>
+          <a:ext cx="4155156" cy="2595880"/>
+        </p:xfrm>
+        <a:graphic>
+          <a:graphicData uri="http://schemas.openxmlformats.org/drawingml/2006/table">
+            <a:tbl>
+              <a:tblPr firstRow="1" bandRow="1">
+                <a:tableStyleId>{5C22544A-7EE6-4342-B048-85BDC9FD1C3A}</a:tableStyleId>
+              </a:tblPr>
+              <a:tblGrid>
+                <a:gridCol w="850857">
+                  <a:extLst>
+                    <a:ext uri="{9D8B030D-6E8A-4147-A177-3AD203B41FA5}">
+                      <a16:colId xmlns:a16="http://schemas.microsoft.com/office/drawing/2014/main" val="2648408335"/>
+                    </a:ext>
+                  </a:extLst>
+                </a:gridCol>
+                <a:gridCol w="3304299">
+                  <a:extLst>
+                    <a:ext uri="{9D8B030D-6E8A-4147-A177-3AD203B41FA5}">
+                      <a16:colId xmlns:a16="http://schemas.microsoft.com/office/drawing/2014/main" val="545094443"/>
+                    </a:ext>
+                  </a:extLst>
+                </a:gridCol>
+              </a:tblGrid>
+              <a:tr h="370840">
+                <a:tc>
+                  <a:txBody>
+                    <a:bodyPr/>
+                    <a:lstStyle/>
+                    <a:p>
+                      <a:r>
+                        <a:rPr lang="en-US" dirty="0"/>
+                        <a:t>Prefix</a:t>
+                      </a:r>
+                    </a:p>
+                  </a:txBody>
+                  <a:tcPr/>
+                </a:tc>
+                <a:tc>
+                  <a:txBody>
+                    <a:bodyPr/>
+                    <a:lstStyle/>
+                    <a:p>
+                      <a:r>
+                        <a:rPr lang="en-US" dirty="0"/>
+                        <a:t>Scenario</a:t>
+                      </a:r>
+                    </a:p>
+                  </a:txBody>
+                  <a:tcPr/>
+                </a:tc>
+                <a:extLst>
+                  <a:ext uri="{0D108BD9-81ED-4DB2-BD59-A6C34878D82A}">
+                    <a16:rowId xmlns:a16="http://schemas.microsoft.com/office/drawing/2014/main" val="4043718998"/>
+                  </a:ext>
+                </a:extLst>
+              </a:tr>
+              <a:tr h="370840">
+                <a:tc>
+                  <a:txBody>
+                    <a:bodyPr/>
+                    <a:lstStyle/>
+                    <a:p>
+                      <a:r>
+                        <a:rPr lang="en-US" dirty="0"/>
+                        <a:t>T</a:t>
+                      </a:r>
+                    </a:p>
+                  </a:txBody>
+                  <a:tcPr/>
+                </a:tc>
+                <a:tc>
+                  <a:txBody>
+                    <a:bodyPr/>
+                    <a:lstStyle/>
+                    <a:p>
+                      <a:r>
+                        <a:rPr lang="en-US" baseline="0" dirty="0"/>
+                        <a:t>All technologies w/o IRP</a:t>
+                      </a:r>
+                    </a:p>
+                  </a:txBody>
+                  <a:tcPr/>
+                </a:tc>
+                <a:extLst>
+                  <a:ext uri="{0D108BD9-81ED-4DB2-BD59-A6C34878D82A}">
+                    <a16:rowId xmlns:a16="http://schemas.microsoft.com/office/drawing/2014/main" val="4249334561"/>
+                  </a:ext>
+                </a:extLst>
+              </a:tr>
+              <a:tr h="370840">
+                <a:tc>
+                  <a:txBody>
+                    <a:bodyPr/>
+                    <a:lstStyle/>
+                    <a:p>
+                      <a:r>
+                        <a:rPr lang="en-US" dirty="0"/>
+                        <a:t>U</a:t>
+                      </a:r>
+                    </a:p>
+                  </a:txBody>
+                  <a:tcPr/>
+                </a:tc>
+                <a:tc>
+                  <a:txBody>
+                    <a:bodyPr/>
+                    <a:lstStyle/>
+                    <a:p>
+                      <a:pPr marL="0" marR="0" indent="0" algn="l" defTabSz="914400" rtl="0" eaLnBrk="1" fontAlgn="auto" latinLnBrk="0" hangingPunct="1">
+                        <a:lnSpc>
+                          <a:spcPct val="100000"/>
+                        </a:lnSpc>
+                        <a:spcBef>
+                          <a:spcPts val="0"/>
+                        </a:spcBef>
+                        <a:spcAft>
+                          <a:spcPts val="0"/>
+                        </a:spcAft>
+                        <a:buClrTx/>
+                        <a:buSzTx/>
+                        <a:buFontTx/>
+                        <a:buNone/>
+                        <a:tabLst/>
+                        <a:defRPr/>
+                      </a:pPr>
+                      <a:r>
+                        <a:rPr lang="en-US" baseline="0" dirty="0"/>
+                        <a:t>All technologies w/ IRP</a:t>
+                      </a:r>
+                    </a:p>
+                  </a:txBody>
+                  <a:tcPr/>
+                </a:tc>
+                <a:extLst>
+                  <a:ext uri="{0D108BD9-81ED-4DB2-BD59-A6C34878D82A}">
+                    <a16:rowId xmlns:a16="http://schemas.microsoft.com/office/drawing/2014/main" val="1987041860"/>
+                  </a:ext>
+                </a:extLst>
+              </a:tr>
+              <a:tr h="370840">
+                <a:tc>
+                  <a:txBody>
+                    <a:bodyPr/>
+                    <a:lstStyle/>
+                    <a:p>
+                      <a:r>
+                        <a:rPr lang="en-US" dirty="0"/>
+                        <a:t>W</a:t>
+                      </a:r>
+                    </a:p>
+                  </a:txBody>
+                  <a:tcPr/>
+                </a:tc>
+                <a:tc>
+                  <a:txBody>
+                    <a:bodyPr/>
+                    <a:lstStyle/>
+                    <a:p>
+                      <a:r>
+                        <a:rPr lang="en-US" dirty="0"/>
+                        <a:t>Current Infra w/o</a:t>
+                      </a:r>
+                      <a:r>
+                        <a:rPr lang="en-US" baseline="0" dirty="0"/>
+                        <a:t> IRP</a:t>
+                      </a:r>
+                    </a:p>
+                  </a:txBody>
+                  <a:tcPr/>
+                </a:tc>
+                <a:extLst>
+                  <a:ext uri="{0D108BD9-81ED-4DB2-BD59-A6C34878D82A}">
+                    <a16:rowId xmlns:a16="http://schemas.microsoft.com/office/drawing/2014/main" val="4153160432"/>
+                  </a:ext>
+                </a:extLst>
+              </a:tr>
+              <a:tr h="370840">
+                <a:tc>
+                  <a:txBody>
+                    <a:bodyPr/>
+                    <a:lstStyle/>
+                    <a:p>
+                      <a:r>
+                        <a:rPr lang="en-US" dirty="0"/>
+                        <a:t>X</a:t>
+                      </a:r>
+                    </a:p>
+                  </a:txBody>
+                  <a:tcPr/>
+                </a:tc>
+                <a:tc>
+                  <a:txBody>
+                    <a:bodyPr/>
+                    <a:lstStyle/>
+                    <a:p>
+                      <a:r>
+                        <a:rPr lang="en-US" dirty="0"/>
+                        <a:t>Hardened Infra w/o</a:t>
+                      </a:r>
+                      <a:r>
+                        <a:rPr lang="en-US" baseline="0" dirty="0"/>
+                        <a:t> IRP</a:t>
+                      </a:r>
+                    </a:p>
+                  </a:txBody>
+                  <a:tcPr/>
+                </a:tc>
+                <a:extLst>
+                  <a:ext uri="{0D108BD9-81ED-4DB2-BD59-A6C34878D82A}">
+                    <a16:rowId xmlns:a16="http://schemas.microsoft.com/office/drawing/2014/main" val="1374592847"/>
+                  </a:ext>
+                </a:extLst>
+              </a:tr>
+              <a:tr h="370840">
+                <a:tc>
+                  <a:txBody>
+                    <a:bodyPr/>
+                    <a:lstStyle/>
+                    <a:p>
+                      <a:r>
+                        <a:rPr lang="en-US" dirty="0"/>
+                        <a:t>Y</a:t>
+                      </a:r>
+                    </a:p>
+                  </a:txBody>
+                  <a:tcPr/>
+                </a:tc>
+                <a:tc>
+                  <a:txBody>
+                    <a:bodyPr/>
+                    <a:lstStyle/>
+                    <a:p>
+                      <a:r>
+                        <a:rPr lang="en-US" dirty="0"/>
+                        <a:t>Current Infra w/</a:t>
+                      </a:r>
+                      <a:r>
+                        <a:rPr lang="en-US" baseline="0" dirty="0"/>
+                        <a:t> IRP</a:t>
+                      </a:r>
+                    </a:p>
+                  </a:txBody>
+                  <a:tcPr/>
+                </a:tc>
+                <a:extLst>
+                  <a:ext uri="{0D108BD9-81ED-4DB2-BD59-A6C34878D82A}">
+                    <a16:rowId xmlns:a16="http://schemas.microsoft.com/office/drawing/2014/main" val="1629897343"/>
+                  </a:ext>
+                </a:extLst>
+              </a:tr>
+              <a:tr h="370840">
+                <a:tc>
+                  <a:txBody>
+                    <a:bodyPr/>
+                    <a:lstStyle/>
+                    <a:p>
+                      <a:r>
+                        <a:rPr lang="en-US" dirty="0"/>
+                        <a:t>Z</a:t>
+                      </a:r>
+                    </a:p>
+                  </a:txBody>
+                  <a:tcPr/>
+                </a:tc>
+                <a:tc>
+                  <a:txBody>
+                    <a:bodyPr/>
+                    <a:lstStyle/>
+                    <a:p>
+                      <a:r>
+                        <a:rPr lang="en-US" dirty="0"/>
+                        <a:t>Hardened Infra w/</a:t>
+                      </a:r>
+                      <a:r>
+                        <a:rPr lang="en-US" baseline="0" dirty="0"/>
+                        <a:t> IRP</a:t>
+                      </a:r>
+                    </a:p>
+                  </a:txBody>
+                  <a:tcPr/>
+                </a:tc>
+                <a:extLst>
+                  <a:ext uri="{0D108BD9-81ED-4DB2-BD59-A6C34878D82A}">
+                    <a16:rowId xmlns:a16="http://schemas.microsoft.com/office/drawing/2014/main" val="278724709"/>
+                  </a:ext>
+                </a:extLst>
+              </a:tr>
+            </a:tbl>
+          </a:graphicData>
+        </a:graphic>
+      </p:graphicFrame>
+      <p:graphicFrame>
+        <p:nvGraphicFramePr>
+          <p:cNvPr id="4" name="Table 3"/>
+          <p:cNvGraphicFramePr>
+            <a:graphicFrameLocks noGrp="1"/>
+          </p:cNvGraphicFramePr>
+          <p:nvPr>
+            <p:extLst>
+              <p:ext uri="{D42A27DB-BD31-4B8C-83A1-F6EECF244321}">
+                <p14:modId xmlns:p14="http://schemas.microsoft.com/office/powerpoint/2010/main" val="1242487649"/>
+              </p:ext>
+            </p:extLst>
+          </p:nvPr>
+        </p:nvGraphicFramePr>
+        <p:xfrm>
+          <a:off x="4341690" y="9312"/>
+          <a:ext cx="7721649" cy="4363815"/>
+        </p:xfrm>
+        <a:graphic>
+          <a:graphicData uri="http://schemas.openxmlformats.org/drawingml/2006/table">
+            <a:tbl>
+              <a:tblPr firstRow="1" bandRow="1">
+                <a:tableStyleId>{5C22544A-7EE6-4342-B048-85BDC9FD1C3A}</a:tableStyleId>
+              </a:tblPr>
+              <a:tblGrid>
+                <a:gridCol w="579755">
+                  <a:extLst>
+                    <a:ext uri="{9D8B030D-6E8A-4147-A177-3AD203B41FA5}">
+                      <a16:colId xmlns:a16="http://schemas.microsoft.com/office/drawing/2014/main" val="2648408335"/>
+                    </a:ext>
+                  </a:extLst>
+                </a:gridCol>
+                <a:gridCol w="3195892">
+                  <a:extLst>
+                    <a:ext uri="{9D8B030D-6E8A-4147-A177-3AD203B41FA5}">
+                      <a16:colId xmlns:a16="http://schemas.microsoft.com/office/drawing/2014/main" val="3573707232"/>
+                    </a:ext>
+                  </a:extLst>
+                </a:gridCol>
+                <a:gridCol w="3946002">
+                  <a:extLst>
+                    <a:ext uri="{9D8B030D-6E8A-4147-A177-3AD203B41FA5}">
+                      <a16:colId xmlns:a16="http://schemas.microsoft.com/office/drawing/2014/main" val="545094443"/>
+                    </a:ext>
+                  </a:extLst>
+                </a:gridCol>
+              </a:tblGrid>
+              <a:tr h="290921">
+                <a:tc>
+                  <a:txBody>
+                    <a:bodyPr/>
+                    <a:lstStyle/>
+                    <a:p>
+                      <a:endParaRPr lang="en-US" sz="1200" dirty="0"/>
+                    </a:p>
+                  </a:txBody>
+                  <a:tcPr/>
+                </a:tc>
+                <a:tc>
+                  <a:txBody>
+                    <a:bodyPr/>
+                    <a:lstStyle/>
+                    <a:p>
+                      <a:r>
+                        <a:rPr lang="en-US" sz="1200" dirty="0"/>
+                        <a:t>Scenarios</a:t>
+                      </a:r>
+                    </a:p>
+                  </a:txBody>
+                  <a:tcPr/>
+                </a:tc>
+                <a:tc>
+                  <a:txBody>
+                    <a:bodyPr/>
+                    <a:lstStyle/>
+                    <a:p>
+                      <a:r>
+                        <a:rPr lang="en-US" sz="1200" dirty="0"/>
+                        <a:t>Technology Groups</a:t>
+                      </a:r>
+                    </a:p>
+                  </a:txBody>
+                  <a:tcPr/>
+                </a:tc>
+                <a:extLst>
+                  <a:ext uri="{0D108BD9-81ED-4DB2-BD59-A6C34878D82A}">
+                    <a16:rowId xmlns:a16="http://schemas.microsoft.com/office/drawing/2014/main" val="4043718998"/>
+                  </a:ext>
+                </a:extLst>
+              </a:tr>
+              <a:tr h="290921">
+                <a:tc>
+                  <a:txBody>
+                    <a:bodyPr/>
+                    <a:lstStyle/>
+                    <a:p>
+                      <a:r>
+                        <a:rPr lang="en-US" sz="1200" dirty="0"/>
+                        <a:t>T</a:t>
+                      </a:r>
+                    </a:p>
+                  </a:txBody>
+                  <a:tcPr/>
+                </a:tc>
+                <a:tc>
+                  <a:txBody>
+                    <a:bodyPr/>
+                    <a:lstStyle/>
+                    <a:p>
+                      <a:r>
+                        <a:rPr lang="en-US" sz="1200" baseline="0" dirty="0"/>
+                        <a:t>All technologies w/o IRP</a:t>
+                      </a:r>
+                    </a:p>
+                  </a:txBody>
+                  <a:tcPr/>
+                </a:tc>
+                <a:tc>
+                  <a:txBody>
+                    <a:bodyPr/>
+                    <a:lstStyle/>
+                    <a:p>
+                      <a:r>
+                        <a:rPr lang="en-US" sz="1200" dirty="0"/>
+                        <a:t>All</a:t>
+                      </a:r>
+                    </a:p>
+                  </a:txBody>
+                  <a:tcPr>
+                    <a:solidFill>
+                      <a:schemeClr val="accent6">
+                        <a:lumMod val="40000"/>
+                        <a:lumOff val="60000"/>
+                      </a:schemeClr>
+                    </a:solidFill>
+                  </a:tcPr>
+                </a:tc>
+                <a:extLst>
+                  <a:ext uri="{0D108BD9-81ED-4DB2-BD59-A6C34878D82A}">
+                    <a16:rowId xmlns:a16="http://schemas.microsoft.com/office/drawing/2014/main" val="1008783455"/>
+                  </a:ext>
+                </a:extLst>
+              </a:tr>
+              <a:tr h="290921">
+                <a:tc>
+                  <a:txBody>
+                    <a:bodyPr/>
+                    <a:lstStyle/>
+                    <a:p>
+                      <a:r>
+                        <a:rPr lang="en-US" sz="1200" dirty="0"/>
+                        <a:t>U</a:t>
+                      </a:r>
+                    </a:p>
+                  </a:txBody>
+                  <a:tcPr/>
+                </a:tc>
+                <a:tc>
+                  <a:txBody>
+                    <a:bodyPr/>
+                    <a:lstStyle/>
+                    <a:p>
+                      <a:pPr marL="0" marR="0" indent="0" algn="l" defTabSz="914400" rtl="0" eaLnBrk="1" fontAlgn="auto" latinLnBrk="0" hangingPunct="1">
+                        <a:lnSpc>
+                          <a:spcPct val="100000"/>
+                        </a:lnSpc>
+                        <a:spcBef>
+                          <a:spcPts val="0"/>
+                        </a:spcBef>
+                        <a:spcAft>
+                          <a:spcPts val="0"/>
+                        </a:spcAft>
+                        <a:buClrTx/>
+                        <a:buSzTx/>
+                        <a:buFontTx/>
+                        <a:buNone/>
+                        <a:tabLst/>
+                        <a:defRPr/>
+                      </a:pPr>
+                      <a:r>
+                        <a:rPr lang="en-US" sz="1200" baseline="0" dirty="0"/>
+                        <a:t>All technologies w/ IRP</a:t>
+                      </a:r>
+                    </a:p>
+                  </a:txBody>
+                  <a:tcPr/>
+                </a:tc>
+                <a:tc>
+                  <a:txBody>
+                    <a:bodyPr/>
+                    <a:lstStyle/>
+                    <a:p>
+                      <a:r>
+                        <a:rPr lang="en-US" sz="1200" dirty="0"/>
+                        <a:t>All</a:t>
+                      </a:r>
+                    </a:p>
+                  </a:txBody>
+                  <a:tcPr>
+                    <a:solidFill>
+                      <a:schemeClr val="accent6">
+                        <a:lumMod val="40000"/>
+                        <a:lumOff val="60000"/>
+                      </a:schemeClr>
+                    </a:solidFill>
+                  </a:tcPr>
+                </a:tc>
+                <a:extLst>
+                  <a:ext uri="{0D108BD9-81ED-4DB2-BD59-A6C34878D82A}">
+                    <a16:rowId xmlns:a16="http://schemas.microsoft.com/office/drawing/2014/main" val="4005396690"/>
+                  </a:ext>
+                </a:extLst>
+              </a:tr>
+              <a:tr h="290921">
+                <a:tc>
+                  <a:txBody>
+                    <a:bodyPr/>
+                    <a:lstStyle/>
+                    <a:p>
+                      <a:r>
+                        <a:rPr lang="en-US" sz="1200" dirty="0"/>
+                        <a:t>WA</a:t>
+                      </a:r>
+                    </a:p>
+                  </a:txBody>
+                  <a:tcPr/>
+                </a:tc>
+                <a:tc>
+                  <a:txBody>
+                    <a:bodyPr/>
+                    <a:lstStyle/>
+                    <a:p>
+                      <a:pPr marL="0" marR="0" indent="0" algn="l" defTabSz="914400" rtl="0" eaLnBrk="1" fontAlgn="auto" latinLnBrk="0" hangingPunct="1">
+                        <a:lnSpc>
+                          <a:spcPct val="100000"/>
+                        </a:lnSpc>
+                        <a:spcBef>
+                          <a:spcPts val="0"/>
+                        </a:spcBef>
+                        <a:spcAft>
+                          <a:spcPts val="0"/>
+                        </a:spcAft>
+                        <a:buClrTx/>
+                        <a:buSzTx/>
+                        <a:buFontTx/>
+                        <a:buNone/>
+                        <a:tabLst/>
+                        <a:defRPr/>
+                      </a:pPr>
+                      <a:r>
+                        <a:rPr lang="en-US" sz="1200" dirty="0"/>
+                        <a:t>Current Infra w/o</a:t>
+                      </a:r>
+                      <a:r>
+                        <a:rPr lang="en-US" sz="1200" baseline="0" dirty="0"/>
+                        <a:t> IRP</a:t>
+                      </a:r>
+                    </a:p>
+                  </a:txBody>
+                  <a:tcPr/>
+                </a:tc>
+                <a:tc>
+                  <a:txBody>
+                    <a:bodyPr/>
+                    <a:lstStyle/>
+                    <a:p>
+                      <a:r>
+                        <a:rPr lang="en-US" sz="1200" dirty="0"/>
+                        <a:t>Centralized</a:t>
+                      </a:r>
+                    </a:p>
+                  </a:txBody>
+                  <a:tcPr>
+                    <a:solidFill>
+                      <a:schemeClr val="bg1">
+                        <a:lumMod val="75000"/>
+                      </a:schemeClr>
+                    </a:solidFill>
+                  </a:tcPr>
+                </a:tc>
+                <a:extLst>
+                  <a:ext uri="{0D108BD9-81ED-4DB2-BD59-A6C34878D82A}">
+                    <a16:rowId xmlns:a16="http://schemas.microsoft.com/office/drawing/2014/main" val="4153160432"/>
+                  </a:ext>
+                </a:extLst>
+              </a:tr>
+              <a:tr h="290921">
+                <a:tc>
+                  <a:txBody>
+                    <a:bodyPr/>
+                    <a:lstStyle/>
+                    <a:p>
+                      <a:r>
+                        <a:rPr lang="en-US" sz="1200" dirty="0"/>
+                        <a:t>WB</a:t>
+                      </a:r>
+                    </a:p>
+                  </a:txBody>
+                  <a:tcPr/>
+                </a:tc>
+                <a:tc>
+                  <a:txBody>
+                    <a:bodyPr/>
+                    <a:lstStyle/>
+                    <a:p>
+                      <a:pPr marL="0" marR="0" indent="0" algn="l" defTabSz="914400" rtl="0" eaLnBrk="1" fontAlgn="auto" latinLnBrk="0" hangingPunct="1">
+                        <a:lnSpc>
+                          <a:spcPct val="100000"/>
+                        </a:lnSpc>
+                        <a:spcBef>
+                          <a:spcPts val="0"/>
+                        </a:spcBef>
+                        <a:spcAft>
+                          <a:spcPts val="0"/>
+                        </a:spcAft>
+                        <a:buClrTx/>
+                        <a:buSzTx/>
+                        <a:buFontTx/>
+                        <a:buNone/>
+                        <a:tabLst/>
+                        <a:defRPr/>
+                      </a:pPr>
+                      <a:r>
+                        <a:rPr lang="en-US" sz="1200" dirty="0"/>
+                        <a:t>Current Infra w/o</a:t>
+                      </a:r>
+                      <a:r>
+                        <a:rPr lang="en-US" sz="1200" baseline="0" dirty="0"/>
+                        <a:t> IRP</a:t>
+                      </a:r>
+                    </a:p>
+                  </a:txBody>
+                  <a:tcPr/>
+                </a:tc>
+                <a:tc>
+                  <a:txBody>
+                    <a:bodyPr/>
+                    <a:lstStyle/>
+                    <a:p>
+                      <a:r>
+                        <a:rPr lang="en-US" sz="1200" dirty="0"/>
+                        <a:t>Distributed</a:t>
+                      </a:r>
+                    </a:p>
+                  </a:txBody>
+                  <a:tcPr>
+                    <a:solidFill>
+                      <a:schemeClr val="accent2">
+                        <a:lumMod val="60000"/>
+                        <a:lumOff val="40000"/>
+                      </a:schemeClr>
+                    </a:solidFill>
+                  </a:tcPr>
+                </a:tc>
+                <a:extLst>
+                  <a:ext uri="{0D108BD9-81ED-4DB2-BD59-A6C34878D82A}">
+                    <a16:rowId xmlns:a16="http://schemas.microsoft.com/office/drawing/2014/main" val="1374592847"/>
+                  </a:ext>
+                </a:extLst>
+              </a:tr>
+              <a:tr h="290921">
+                <a:tc>
+                  <a:txBody>
+                    <a:bodyPr/>
+                    <a:lstStyle/>
+                    <a:p>
+                      <a:r>
+                        <a:rPr lang="en-US" sz="1200" dirty="0"/>
+                        <a:t>WD</a:t>
+                      </a:r>
+                    </a:p>
+                  </a:txBody>
+                  <a:tcPr/>
+                </a:tc>
+                <a:tc>
+                  <a:txBody>
+                    <a:bodyPr/>
+                    <a:lstStyle/>
+                    <a:p>
+                      <a:pPr marL="0" marR="0" indent="0" algn="l" defTabSz="914400" rtl="0" eaLnBrk="1" fontAlgn="auto" latinLnBrk="0" hangingPunct="1">
+                        <a:lnSpc>
+                          <a:spcPct val="100000"/>
+                        </a:lnSpc>
+                        <a:spcBef>
+                          <a:spcPts val="0"/>
+                        </a:spcBef>
+                        <a:spcAft>
+                          <a:spcPts val="0"/>
+                        </a:spcAft>
+                        <a:buClrTx/>
+                        <a:buSzTx/>
+                        <a:buFontTx/>
+                        <a:buNone/>
+                        <a:tabLst/>
+                        <a:defRPr/>
+                      </a:pPr>
+                      <a:r>
+                        <a:rPr lang="en-US" sz="1200" dirty="0"/>
+                        <a:t>Current Infra w/o</a:t>
+                      </a:r>
+                      <a:r>
+                        <a:rPr lang="en-US" sz="1200" baseline="0" dirty="0"/>
+                        <a:t> IRP</a:t>
+                      </a:r>
+                    </a:p>
+                  </a:txBody>
+                  <a:tcPr/>
+                </a:tc>
+                <a:tc>
+                  <a:txBody>
+                    <a:bodyPr/>
+                    <a:lstStyle/>
+                    <a:p>
+                      <a:r>
+                        <a:rPr lang="en-US" sz="1200" dirty="0"/>
+                        <a:t>Business-as-usual</a:t>
+                      </a:r>
+                    </a:p>
+                  </a:txBody>
+                  <a:tcPr>
+                    <a:solidFill>
+                      <a:srgbClr val="0070C0"/>
+                    </a:solidFill>
+                  </a:tcPr>
+                </a:tc>
+                <a:extLst>
+                  <a:ext uri="{0D108BD9-81ED-4DB2-BD59-A6C34878D82A}">
+                    <a16:rowId xmlns:a16="http://schemas.microsoft.com/office/drawing/2014/main" val="1629897343"/>
+                  </a:ext>
+                </a:extLst>
+              </a:tr>
+              <a:tr h="290921">
+                <a:tc>
+                  <a:txBody>
+                    <a:bodyPr/>
+                    <a:lstStyle/>
+                    <a:p>
+                      <a:r>
+                        <a:rPr lang="en-US" sz="1200" dirty="0">
+                          <a:solidFill>
+                            <a:srgbClr val="FF0000"/>
+                          </a:solidFill>
+                        </a:rPr>
+                        <a:t>WE</a:t>
+                      </a:r>
+                    </a:p>
+                  </a:txBody>
+                  <a:tcPr/>
+                </a:tc>
+                <a:tc>
+                  <a:txBody>
+                    <a:bodyPr/>
+                    <a:lstStyle/>
+                    <a:p>
+                      <a:pPr marL="0" marR="0" lvl="0" indent="0" algn="l" defTabSz="914400" rtl="0" eaLnBrk="1" fontAlgn="auto" latinLnBrk="0" hangingPunct="1">
+                        <a:lnSpc>
+                          <a:spcPct val="100000"/>
+                        </a:lnSpc>
+                        <a:spcBef>
+                          <a:spcPts val="0"/>
+                        </a:spcBef>
+                        <a:spcAft>
+                          <a:spcPts val="0"/>
+                        </a:spcAft>
+                        <a:buClrTx/>
+                        <a:buSzTx/>
+                        <a:buFontTx/>
+                        <a:buNone/>
+                        <a:tabLst/>
+                        <a:defRPr/>
+                      </a:pPr>
+                      <a:r>
+                        <a:rPr lang="en-US" sz="1200" dirty="0"/>
+                        <a:t>Current Infra w/o</a:t>
+                      </a:r>
+                      <a:r>
+                        <a:rPr lang="en-US" sz="1200" baseline="0" dirty="0"/>
+                        <a:t> IRP</a:t>
+                      </a:r>
+                    </a:p>
+                  </a:txBody>
+                  <a:tcPr/>
+                </a:tc>
+                <a:tc>
+                  <a:txBody>
+                    <a:bodyPr/>
+                    <a:lstStyle/>
+                    <a:p>
+                      <a:r>
+                        <a:rPr lang="en-US" sz="1200" dirty="0"/>
+                        <a:t>Centralized – natural gas</a:t>
+                      </a:r>
+                    </a:p>
+                  </a:txBody>
+                  <a:tcPr>
+                    <a:solidFill>
+                      <a:schemeClr val="bg1"/>
+                    </a:solidFill>
+                  </a:tcPr>
+                </a:tc>
+                <a:extLst>
+                  <a:ext uri="{0D108BD9-81ED-4DB2-BD59-A6C34878D82A}">
+                    <a16:rowId xmlns:a16="http://schemas.microsoft.com/office/drawing/2014/main" val="3220069263"/>
+                  </a:ext>
+                </a:extLst>
+              </a:tr>
+              <a:tr h="290921">
+                <a:tc>
+                  <a:txBody>
+                    <a:bodyPr/>
+                    <a:lstStyle/>
+                    <a:p>
+                      <a:r>
+                        <a:rPr lang="en-US" sz="1200" dirty="0">
+                          <a:solidFill>
+                            <a:srgbClr val="FF0000"/>
+                          </a:solidFill>
+                        </a:rPr>
+                        <a:t>WF</a:t>
+                      </a:r>
+                    </a:p>
+                  </a:txBody>
+                  <a:tcPr/>
+                </a:tc>
+                <a:tc>
+                  <a:txBody>
+                    <a:bodyPr/>
+                    <a:lstStyle/>
+                    <a:p>
+                      <a:pPr marL="0" marR="0" lvl="0" indent="0" algn="l" defTabSz="914400" rtl="0" eaLnBrk="1" fontAlgn="auto" latinLnBrk="0" hangingPunct="1">
+                        <a:lnSpc>
+                          <a:spcPct val="100000"/>
+                        </a:lnSpc>
+                        <a:spcBef>
+                          <a:spcPts val="0"/>
+                        </a:spcBef>
+                        <a:spcAft>
+                          <a:spcPts val="0"/>
+                        </a:spcAft>
+                        <a:buClrTx/>
+                        <a:buSzTx/>
+                        <a:buFontTx/>
+                        <a:buNone/>
+                        <a:tabLst/>
+                        <a:defRPr/>
+                      </a:pPr>
+                      <a:r>
+                        <a:rPr lang="en-US" sz="1200" dirty="0"/>
+                        <a:t>Current Infra w/o</a:t>
+                      </a:r>
+                      <a:r>
+                        <a:rPr lang="en-US" sz="1200" baseline="0" dirty="0"/>
+                        <a:t> IRP</a:t>
+                      </a:r>
+                    </a:p>
+                  </a:txBody>
+                  <a:tcPr/>
+                </a:tc>
+                <a:tc>
+                  <a:txBody>
+                    <a:bodyPr/>
+                    <a:lstStyle/>
+                    <a:p>
+                      <a:r>
+                        <a:rPr lang="en-US" sz="1200" dirty="0"/>
+                        <a:t>Distributed – natural gas</a:t>
+                      </a:r>
+                    </a:p>
+                  </a:txBody>
+                  <a:tcPr>
+                    <a:solidFill>
+                      <a:schemeClr val="bg1"/>
+                    </a:solidFill>
+                  </a:tcPr>
+                </a:tc>
+                <a:extLst>
+                  <a:ext uri="{0D108BD9-81ED-4DB2-BD59-A6C34878D82A}">
+                    <a16:rowId xmlns:a16="http://schemas.microsoft.com/office/drawing/2014/main" val="116377641"/>
+                  </a:ext>
+                </a:extLst>
+              </a:tr>
+              <a:tr h="290921">
+                <a:tc>
+                  <a:txBody>
+                    <a:bodyPr/>
+                    <a:lstStyle/>
+                    <a:p>
+                      <a:r>
+                        <a:rPr lang="en-US" sz="1200" dirty="0"/>
+                        <a:t>XA</a:t>
+                      </a:r>
+                    </a:p>
+                  </a:txBody>
+                  <a:tcPr/>
+                </a:tc>
+                <a:tc>
+                  <a:txBody>
+                    <a:bodyPr/>
+                    <a:lstStyle/>
+                    <a:p>
+                      <a:pPr marL="0" marR="0" indent="0" algn="l" defTabSz="914400" rtl="0" eaLnBrk="1" fontAlgn="auto" latinLnBrk="0" hangingPunct="1">
+                        <a:lnSpc>
+                          <a:spcPct val="100000"/>
+                        </a:lnSpc>
+                        <a:spcBef>
+                          <a:spcPts val="0"/>
+                        </a:spcBef>
+                        <a:spcAft>
+                          <a:spcPts val="0"/>
+                        </a:spcAft>
+                        <a:buClrTx/>
+                        <a:buSzTx/>
+                        <a:buFontTx/>
+                        <a:buNone/>
+                        <a:tabLst/>
+                        <a:defRPr/>
+                      </a:pPr>
+                      <a:r>
+                        <a:rPr lang="en-US" sz="1200" b="1" dirty="0"/>
+                        <a:t>Hardened Infra w/o</a:t>
+                      </a:r>
+                      <a:r>
+                        <a:rPr lang="en-US" sz="1200" b="1" baseline="0" dirty="0"/>
+                        <a:t> IRP</a:t>
+                      </a:r>
+                    </a:p>
+                  </a:txBody>
+                  <a:tcPr/>
+                </a:tc>
+                <a:tc>
+                  <a:txBody>
+                    <a:bodyPr/>
+                    <a:lstStyle/>
+                    <a:p>
+                      <a:r>
+                        <a:rPr lang="en-US" sz="1200" dirty="0"/>
+                        <a:t>Centralized</a:t>
+                      </a:r>
+                    </a:p>
+                  </a:txBody>
+                  <a:tcPr>
+                    <a:solidFill>
+                      <a:schemeClr val="bg1">
+                        <a:lumMod val="75000"/>
+                      </a:schemeClr>
+                    </a:solidFill>
+                  </a:tcPr>
+                </a:tc>
+                <a:extLst>
+                  <a:ext uri="{0D108BD9-81ED-4DB2-BD59-A6C34878D82A}">
+                    <a16:rowId xmlns:a16="http://schemas.microsoft.com/office/drawing/2014/main" val="653698369"/>
+                  </a:ext>
+                </a:extLst>
+              </a:tr>
+              <a:tr h="290921">
+                <a:tc>
+                  <a:txBody>
+                    <a:bodyPr/>
+                    <a:lstStyle/>
+                    <a:p>
+                      <a:r>
+                        <a:rPr lang="en-US" sz="1200" dirty="0"/>
+                        <a:t>XB</a:t>
+                      </a:r>
+                    </a:p>
+                  </a:txBody>
+                  <a:tcPr/>
+                </a:tc>
+                <a:tc>
+                  <a:txBody>
+                    <a:bodyPr/>
+                    <a:lstStyle/>
+                    <a:p>
+                      <a:pPr marL="0" marR="0" indent="0" algn="l" defTabSz="914400" rtl="0" eaLnBrk="1" fontAlgn="auto" latinLnBrk="0" hangingPunct="1">
+                        <a:lnSpc>
+                          <a:spcPct val="100000"/>
+                        </a:lnSpc>
+                        <a:spcBef>
+                          <a:spcPts val="0"/>
+                        </a:spcBef>
+                        <a:spcAft>
+                          <a:spcPts val="0"/>
+                        </a:spcAft>
+                        <a:buClrTx/>
+                        <a:buSzTx/>
+                        <a:buFontTx/>
+                        <a:buNone/>
+                        <a:tabLst/>
+                        <a:defRPr/>
+                      </a:pPr>
+                      <a:r>
+                        <a:rPr lang="en-US" sz="1200" b="1" dirty="0"/>
+                        <a:t>Hardened Infra w/o</a:t>
+                      </a:r>
+                      <a:r>
+                        <a:rPr lang="en-US" sz="1200" b="1" baseline="0" dirty="0"/>
+                        <a:t> IRP</a:t>
+                      </a:r>
+                    </a:p>
+                  </a:txBody>
+                  <a:tcPr/>
+                </a:tc>
+                <a:tc>
+                  <a:txBody>
+                    <a:bodyPr/>
+                    <a:lstStyle/>
+                    <a:p>
+                      <a:r>
+                        <a:rPr lang="en-US" sz="1200" dirty="0"/>
+                        <a:t>Distributed</a:t>
+                      </a:r>
+                    </a:p>
+                  </a:txBody>
+                  <a:tcPr>
+                    <a:solidFill>
+                      <a:schemeClr val="accent2">
+                        <a:lumMod val="60000"/>
+                        <a:lumOff val="40000"/>
+                      </a:schemeClr>
+                    </a:solidFill>
+                  </a:tcPr>
+                </a:tc>
+                <a:extLst>
+                  <a:ext uri="{0D108BD9-81ED-4DB2-BD59-A6C34878D82A}">
+                    <a16:rowId xmlns:a16="http://schemas.microsoft.com/office/drawing/2014/main" val="275822130"/>
+                  </a:ext>
+                </a:extLst>
+              </a:tr>
+              <a:tr h="290921">
+                <a:tc>
+                  <a:txBody>
+                    <a:bodyPr/>
+                    <a:lstStyle/>
+                    <a:p>
+                      <a:r>
+                        <a:rPr lang="en-US" sz="1200" dirty="0"/>
+                        <a:t>XD</a:t>
+                      </a:r>
+                    </a:p>
+                  </a:txBody>
+                  <a:tcPr/>
+                </a:tc>
+                <a:tc>
+                  <a:txBody>
+                    <a:bodyPr/>
+                    <a:lstStyle/>
+                    <a:p>
+                      <a:pPr marL="0" marR="0" indent="0" algn="l" defTabSz="914400" rtl="0" eaLnBrk="1" fontAlgn="auto" latinLnBrk="0" hangingPunct="1">
+                        <a:lnSpc>
+                          <a:spcPct val="100000"/>
+                        </a:lnSpc>
+                        <a:spcBef>
+                          <a:spcPts val="0"/>
+                        </a:spcBef>
+                        <a:spcAft>
+                          <a:spcPts val="0"/>
+                        </a:spcAft>
+                        <a:buClrTx/>
+                        <a:buSzTx/>
+                        <a:buFontTx/>
+                        <a:buNone/>
+                        <a:tabLst/>
+                        <a:defRPr/>
+                      </a:pPr>
+                      <a:r>
+                        <a:rPr lang="en-US" sz="1200" b="1" dirty="0"/>
+                        <a:t>Hardened Infra w/o</a:t>
+                      </a:r>
+                      <a:r>
+                        <a:rPr lang="en-US" sz="1200" b="1" baseline="0" dirty="0"/>
+                        <a:t> IRP</a:t>
+                      </a:r>
+                    </a:p>
+                  </a:txBody>
+                  <a:tcPr/>
+                </a:tc>
+                <a:tc>
+                  <a:txBody>
+                    <a:bodyPr/>
+                    <a:lstStyle/>
+                    <a:p>
+                      <a:r>
+                        <a:rPr lang="en-US" sz="1200" dirty="0"/>
+                        <a:t>Business-as-usual</a:t>
+                      </a:r>
+                    </a:p>
+                  </a:txBody>
+                  <a:tcPr>
+                    <a:solidFill>
+                      <a:srgbClr val="0070C0"/>
+                    </a:solidFill>
+                  </a:tcPr>
+                </a:tc>
+                <a:extLst>
+                  <a:ext uri="{0D108BD9-81ED-4DB2-BD59-A6C34878D82A}">
+                    <a16:rowId xmlns:a16="http://schemas.microsoft.com/office/drawing/2014/main" val="3258577534"/>
+                  </a:ext>
+                </a:extLst>
+              </a:tr>
+              <a:tr h="290921">
+                <a:tc>
+                  <a:txBody>
+                    <a:bodyPr/>
+                    <a:lstStyle/>
+                    <a:p>
+                      <a:r>
+                        <a:rPr lang="en-US" sz="1200" dirty="0"/>
+                        <a:t>YA</a:t>
+                      </a:r>
+                    </a:p>
+                  </a:txBody>
+                  <a:tcPr/>
+                </a:tc>
+                <a:tc>
+                  <a:txBody>
+                    <a:bodyPr/>
+                    <a:lstStyle/>
+                    <a:p>
+                      <a:pPr marL="0" marR="0" indent="0" algn="l" defTabSz="914400" rtl="0" eaLnBrk="1" fontAlgn="auto" latinLnBrk="0" hangingPunct="1">
+                        <a:lnSpc>
+                          <a:spcPct val="100000"/>
+                        </a:lnSpc>
+                        <a:spcBef>
+                          <a:spcPts val="0"/>
+                        </a:spcBef>
+                        <a:spcAft>
+                          <a:spcPts val="0"/>
+                        </a:spcAft>
+                        <a:buClrTx/>
+                        <a:buSzTx/>
+                        <a:buFontTx/>
+                        <a:buNone/>
+                        <a:tabLst/>
+                        <a:defRPr/>
+                      </a:pPr>
+                      <a:r>
+                        <a:rPr lang="en-US" sz="1200" dirty="0"/>
+                        <a:t>Current Infra w/</a:t>
+                      </a:r>
+                      <a:r>
+                        <a:rPr lang="en-US" sz="1200" baseline="0" dirty="0"/>
+                        <a:t> IRP</a:t>
+                      </a:r>
+                    </a:p>
+                  </a:txBody>
+                  <a:tcPr/>
+                </a:tc>
+                <a:tc>
+                  <a:txBody>
+                    <a:bodyPr/>
+                    <a:lstStyle/>
+                    <a:p>
+                      <a:r>
+                        <a:rPr lang="en-US" sz="1200" dirty="0"/>
+                        <a:t>Centralized</a:t>
+                      </a:r>
+                    </a:p>
+                  </a:txBody>
+                  <a:tcPr>
+                    <a:solidFill>
+                      <a:schemeClr val="bg1">
+                        <a:lumMod val="75000"/>
+                      </a:schemeClr>
+                    </a:solidFill>
+                  </a:tcPr>
+                </a:tc>
+                <a:extLst>
+                  <a:ext uri="{0D108BD9-81ED-4DB2-BD59-A6C34878D82A}">
+                    <a16:rowId xmlns:a16="http://schemas.microsoft.com/office/drawing/2014/main" val="3380108376"/>
+                  </a:ext>
+                </a:extLst>
+              </a:tr>
+              <a:tr h="290921">
+                <a:tc>
+                  <a:txBody>
+                    <a:bodyPr/>
+                    <a:lstStyle/>
+                    <a:p>
+                      <a:r>
+                        <a:rPr lang="en-US" sz="1200" dirty="0"/>
+                        <a:t>YB</a:t>
+                      </a:r>
+                    </a:p>
+                  </a:txBody>
+                  <a:tcPr/>
+                </a:tc>
+                <a:tc>
+                  <a:txBody>
+                    <a:bodyPr/>
+                    <a:lstStyle/>
+                    <a:p>
+                      <a:pPr marL="0" marR="0" indent="0" algn="l" defTabSz="914400" rtl="0" eaLnBrk="1" fontAlgn="auto" latinLnBrk="0" hangingPunct="1">
+                        <a:lnSpc>
+                          <a:spcPct val="100000"/>
+                        </a:lnSpc>
+                        <a:spcBef>
+                          <a:spcPts val="0"/>
+                        </a:spcBef>
+                        <a:spcAft>
+                          <a:spcPts val="0"/>
+                        </a:spcAft>
+                        <a:buClrTx/>
+                        <a:buSzTx/>
+                        <a:buFontTx/>
+                        <a:buNone/>
+                        <a:tabLst/>
+                        <a:defRPr/>
+                      </a:pPr>
+                      <a:r>
+                        <a:rPr lang="en-US" sz="1200" dirty="0"/>
+                        <a:t>Current Infra w/</a:t>
+                      </a:r>
+                      <a:r>
+                        <a:rPr lang="en-US" sz="1200" baseline="0" dirty="0"/>
+                        <a:t> IRP</a:t>
+                      </a:r>
+                    </a:p>
+                  </a:txBody>
+                  <a:tcPr/>
+                </a:tc>
+                <a:tc>
+                  <a:txBody>
+                    <a:bodyPr/>
+                    <a:lstStyle/>
+                    <a:p>
+                      <a:r>
+                        <a:rPr lang="en-US" sz="1200" dirty="0"/>
+                        <a:t>Distributed</a:t>
+                      </a:r>
+                    </a:p>
+                  </a:txBody>
+                  <a:tcPr>
+                    <a:solidFill>
+                      <a:schemeClr val="accent2">
+                        <a:lumMod val="60000"/>
+                        <a:lumOff val="40000"/>
+                      </a:schemeClr>
+                    </a:solidFill>
+                  </a:tcPr>
+                </a:tc>
+                <a:extLst>
+                  <a:ext uri="{0D108BD9-81ED-4DB2-BD59-A6C34878D82A}">
+                    <a16:rowId xmlns:a16="http://schemas.microsoft.com/office/drawing/2014/main" val="4171818030"/>
+                  </a:ext>
+                </a:extLst>
+              </a:tr>
+              <a:tr h="290921">
+                <a:tc>
+                  <a:txBody>
+                    <a:bodyPr/>
+                    <a:lstStyle/>
+                    <a:p>
+                      <a:r>
+                        <a:rPr lang="en-US" sz="1200" dirty="0"/>
+                        <a:t>ZA</a:t>
+                      </a:r>
+                    </a:p>
+                  </a:txBody>
+                  <a:tcPr/>
+                </a:tc>
+                <a:tc>
+                  <a:txBody>
+                    <a:bodyPr/>
+                    <a:lstStyle/>
+                    <a:p>
+                      <a:pPr marL="0" marR="0" indent="0" algn="l" defTabSz="914400" rtl="0" eaLnBrk="1" fontAlgn="auto" latinLnBrk="0" hangingPunct="1">
+                        <a:lnSpc>
+                          <a:spcPct val="100000"/>
+                        </a:lnSpc>
+                        <a:spcBef>
+                          <a:spcPts val="0"/>
+                        </a:spcBef>
+                        <a:spcAft>
+                          <a:spcPts val="0"/>
+                        </a:spcAft>
+                        <a:buClrTx/>
+                        <a:buSzTx/>
+                        <a:buFontTx/>
+                        <a:buNone/>
+                        <a:tabLst/>
+                        <a:defRPr/>
+                      </a:pPr>
+                      <a:r>
+                        <a:rPr lang="en-US" sz="1200" b="1" dirty="0"/>
+                        <a:t>Hardened Infra w/</a:t>
+                      </a:r>
+                      <a:r>
+                        <a:rPr lang="en-US" sz="1200" b="1" baseline="0" dirty="0"/>
+                        <a:t> IRP</a:t>
+                      </a:r>
+                    </a:p>
+                  </a:txBody>
+                  <a:tcPr/>
+                </a:tc>
+                <a:tc>
+                  <a:txBody>
+                    <a:bodyPr/>
+                    <a:lstStyle/>
+                    <a:p>
+                      <a:r>
+                        <a:rPr lang="en-US" sz="1200" dirty="0"/>
+                        <a:t>Centralized</a:t>
+                      </a:r>
+                    </a:p>
+                  </a:txBody>
+                  <a:tcPr>
+                    <a:solidFill>
+                      <a:schemeClr val="bg1">
+                        <a:lumMod val="75000"/>
+                      </a:schemeClr>
+                    </a:solidFill>
+                  </a:tcPr>
+                </a:tc>
+                <a:extLst>
+                  <a:ext uri="{0D108BD9-81ED-4DB2-BD59-A6C34878D82A}">
+                    <a16:rowId xmlns:a16="http://schemas.microsoft.com/office/drawing/2014/main" val="1475263509"/>
+                  </a:ext>
+                </a:extLst>
+              </a:tr>
+              <a:tr h="290921">
+                <a:tc>
+                  <a:txBody>
+                    <a:bodyPr/>
+                    <a:lstStyle/>
+                    <a:p>
+                      <a:r>
+                        <a:rPr lang="en-US" sz="1200" dirty="0"/>
+                        <a:t>ZB</a:t>
+                      </a:r>
+                    </a:p>
+                  </a:txBody>
+                  <a:tcPr/>
+                </a:tc>
+                <a:tc>
+                  <a:txBody>
+                    <a:bodyPr/>
+                    <a:lstStyle/>
+                    <a:p>
+                      <a:pPr marL="0" marR="0" indent="0" algn="l" defTabSz="914400" rtl="0" eaLnBrk="1" fontAlgn="auto" latinLnBrk="0" hangingPunct="1">
+                        <a:lnSpc>
+                          <a:spcPct val="100000"/>
+                        </a:lnSpc>
+                        <a:spcBef>
+                          <a:spcPts val="0"/>
+                        </a:spcBef>
+                        <a:spcAft>
+                          <a:spcPts val="0"/>
+                        </a:spcAft>
+                        <a:buClrTx/>
+                        <a:buSzTx/>
+                        <a:buFontTx/>
+                        <a:buNone/>
+                        <a:tabLst/>
+                        <a:defRPr/>
+                      </a:pPr>
+                      <a:r>
+                        <a:rPr lang="en-US" sz="1200" b="1" dirty="0"/>
+                        <a:t>Hardened Infra w/</a:t>
+                      </a:r>
+                      <a:r>
+                        <a:rPr lang="en-US" sz="1200" b="1" baseline="0" dirty="0"/>
+                        <a:t> IRP</a:t>
+                      </a:r>
+                    </a:p>
+                  </a:txBody>
+                  <a:tcPr/>
+                </a:tc>
+                <a:tc>
+                  <a:txBody>
+                    <a:bodyPr/>
+                    <a:lstStyle/>
+                    <a:p>
+                      <a:r>
+                        <a:rPr lang="en-US" sz="1200" dirty="0"/>
+                        <a:t>Distributed</a:t>
+                      </a:r>
+                    </a:p>
+                  </a:txBody>
+                  <a:tcPr>
+                    <a:solidFill>
+                      <a:schemeClr val="accent2">
+                        <a:lumMod val="60000"/>
+                        <a:lumOff val="40000"/>
+                      </a:schemeClr>
+                    </a:solidFill>
+                  </a:tcPr>
+                </a:tc>
+                <a:extLst>
+                  <a:ext uri="{0D108BD9-81ED-4DB2-BD59-A6C34878D82A}">
+                    <a16:rowId xmlns:a16="http://schemas.microsoft.com/office/drawing/2014/main" val="3826412125"/>
+                  </a:ext>
+                </a:extLst>
+              </a:tr>
+            </a:tbl>
+          </a:graphicData>
+        </a:graphic>
+      </p:graphicFrame>
+    </p:spTree>
+    <p:extLst>
+      <p:ext uri="{BB962C8B-B14F-4D97-AF65-F5344CB8AC3E}">
+        <p14:creationId xmlns:p14="http://schemas.microsoft.com/office/powerpoint/2010/main" val="3227922961"/>
+      </p:ext>
+    </p:extLst>
+  </p:cSld>
+  <p:clrMapOvr>
+    <a:masterClrMapping/>
+  </p:clrMapOvr>
+</p:sld>
+</file>
+
 <file path=ppt/theme/theme1.xml><?xml version="1.0" encoding="utf-8"?>
 <a:theme xmlns:a="http://schemas.openxmlformats.org/drawingml/2006/main" name="Office Theme">
   <a:themeElements>

</xml_diff>

<commit_message>
expanded scenarios and post processing
</commit_message>
<xml_diff>
--- a/projects/puerto_rico_stoch/data/scenario_overview.pptx
+++ b/projects/puerto_rico_stoch/data/scenario_overview.pptx
@@ -244,7 +244,7 @@
           <a:p>
             <a:fld id="{4E0D474A-36D6-42D7-8D99-A750CFDD9A60}" type="datetimeFigureOut">
               <a:rPr lang="en-US" smtClean="0"/>
-              <a:t>3/26/2020</a:t>
+              <a:t>4/1/2020</a:t>
             </a:fld>
             <a:endParaRPr lang="en-US"/>
           </a:p>
@@ -412,7 +412,7 @@
           <a:p>
             <a:fld id="{4E0D474A-36D6-42D7-8D99-A750CFDD9A60}" type="datetimeFigureOut">
               <a:rPr lang="en-US" smtClean="0"/>
-              <a:t>3/26/2020</a:t>
+              <a:t>4/1/2020</a:t>
             </a:fld>
             <a:endParaRPr lang="en-US"/>
           </a:p>
@@ -590,7 +590,7 @@
           <a:p>
             <a:fld id="{4E0D474A-36D6-42D7-8D99-A750CFDD9A60}" type="datetimeFigureOut">
               <a:rPr lang="en-US" smtClean="0"/>
-              <a:t>3/26/2020</a:t>
+              <a:t>4/1/2020</a:t>
             </a:fld>
             <a:endParaRPr lang="en-US"/>
           </a:p>
@@ -758,7 +758,7 @@
           <a:p>
             <a:fld id="{4E0D474A-36D6-42D7-8D99-A750CFDD9A60}" type="datetimeFigureOut">
               <a:rPr lang="en-US" smtClean="0"/>
-              <a:t>3/26/2020</a:t>
+              <a:t>4/1/2020</a:t>
             </a:fld>
             <a:endParaRPr lang="en-US"/>
           </a:p>
@@ -1003,7 +1003,7 @@
           <a:p>
             <a:fld id="{4E0D474A-36D6-42D7-8D99-A750CFDD9A60}" type="datetimeFigureOut">
               <a:rPr lang="en-US" smtClean="0"/>
-              <a:t>3/26/2020</a:t>
+              <a:t>4/1/2020</a:t>
             </a:fld>
             <a:endParaRPr lang="en-US"/>
           </a:p>
@@ -1232,7 +1232,7 @@
           <a:p>
             <a:fld id="{4E0D474A-36D6-42D7-8D99-A750CFDD9A60}" type="datetimeFigureOut">
               <a:rPr lang="en-US" smtClean="0"/>
-              <a:t>3/26/2020</a:t>
+              <a:t>4/1/2020</a:t>
             </a:fld>
             <a:endParaRPr lang="en-US"/>
           </a:p>
@@ -1596,7 +1596,7 @@
           <a:p>
             <a:fld id="{4E0D474A-36D6-42D7-8D99-A750CFDD9A60}" type="datetimeFigureOut">
               <a:rPr lang="en-US" smtClean="0"/>
-              <a:t>3/26/2020</a:t>
+              <a:t>4/1/2020</a:t>
             </a:fld>
             <a:endParaRPr lang="en-US"/>
           </a:p>
@@ -1713,7 +1713,7 @@
           <a:p>
             <a:fld id="{4E0D474A-36D6-42D7-8D99-A750CFDD9A60}" type="datetimeFigureOut">
               <a:rPr lang="en-US" smtClean="0"/>
-              <a:t>3/26/2020</a:t>
+              <a:t>4/1/2020</a:t>
             </a:fld>
             <a:endParaRPr lang="en-US"/>
           </a:p>
@@ -1808,7 +1808,7 @@
           <a:p>
             <a:fld id="{4E0D474A-36D6-42D7-8D99-A750CFDD9A60}" type="datetimeFigureOut">
               <a:rPr lang="en-US" smtClean="0"/>
-              <a:t>3/26/2020</a:t>
+              <a:t>4/1/2020</a:t>
             </a:fld>
             <a:endParaRPr lang="en-US"/>
           </a:p>
@@ -2083,7 +2083,7 @@
           <a:p>
             <a:fld id="{4E0D474A-36D6-42D7-8D99-A750CFDD9A60}" type="datetimeFigureOut">
               <a:rPr lang="en-US" smtClean="0"/>
-              <a:t>3/26/2020</a:t>
+              <a:t>4/1/2020</a:t>
             </a:fld>
             <a:endParaRPr lang="en-US"/>
           </a:p>
@@ -2335,7 +2335,7 @@
           <a:p>
             <a:fld id="{4E0D474A-36D6-42D7-8D99-A750CFDD9A60}" type="datetimeFigureOut">
               <a:rPr lang="en-US" smtClean="0"/>
-              <a:t>3/26/2020</a:t>
+              <a:t>4/1/2020</a:t>
             </a:fld>
             <a:endParaRPr lang="en-US"/>
           </a:p>
@@ -2546,7 +2546,7 @@
           <a:p>
             <a:fld id="{4E0D474A-36D6-42D7-8D99-A750CFDD9A60}" type="datetimeFigureOut">
               <a:rPr lang="en-US" smtClean="0"/>
-              <a:t>3/26/2020</a:t>
+              <a:t>4/1/2020</a:t>
             </a:fld>
             <a:endParaRPr lang="en-US"/>
           </a:p>
@@ -9087,10 +9087,16 @@
           <p:cNvGraphicFramePr>
             <a:graphicFrameLocks noGrp="1"/>
           </p:cNvGraphicFramePr>
-          <p:nvPr/>
+          <p:nvPr>
+            <p:extLst>
+              <p:ext uri="{D42A27DB-BD31-4B8C-83A1-F6EECF244321}">
+                <p14:modId xmlns:p14="http://schemas.microsoft.com/office/powerpoint/2010/main" val="659103927"/>
+              </p:ext>
+            </p:extLst>
+          </p:nvPr>
         </p:nvGraphicFramePr>
         <p:xfrm>
-          <a:off x="128661" y="3354904"/>
+          <a:off x="128661" y="4463182"/>
           <a:ext cx="4020322" cy="1483360"/>
         </p:xfrm>
         <a:graphic>
@@ -9257,11 +9263,17 @@
           <p:cNvGraphicFramePr>
             <a:graphicFrameLocks noGrp="1"/>
           </p:cNvGraphicFramePr>
-          <p:nvPr/>
+          <p:nvPr>
+            <p:extLst>
+              <p:ext uri="{D42A27DB-BD31-4B8C-83A1-F6EECF244321}">
+                <p14:modId xmlns:p14="http://schemas.microsoft.com/office/powerpoint/2010/main" val="3462324862"/>
+              </p:ext>
+            </p:extLst>
+          </p:nvPr>
         </p:nvGraphicFramePr>
         <p:xfrm>
           <a:off x="61244" y="402450"/>
-          <a:ext cx="4155156" cy="2595880"/>
+          <a:ext cx="4155156" cy="3708400"/>
         </p:xfrm>
         <a:graphic>
           <a:graphicData uri="http://schemas.openxmlformats.org/drawingml/2006/table">
@@ -9409,6 +9421,56 @@
                     <a:p>
                       <a:r>
                         <a:rPr lang="en-US" dirty="0"/>
+                        <a:t>V</a:t>
+                      </a:r>
+                    </a:p>
+                  </a:txBody>
+                  <a:tcPr/>
+                </a:tc>
+                <a:tc>
+                  <a:txBody>
+                    <a:bodyPr/>
+                    <a:lstStyle/>
+                    <a:p>
+                      <a:pPr marL="0" marR="0" lvl="0" indent="0" algn="l" defTabSz="914400" rtl="0" eaLnBrk="1" fontAlgn="auto" latinLnBrk="0" hangingPunct="1">
+                        <a:lnSpc>
+                          <a:spcPct val="100000"/>
+                        </a:lnSpc>
+                        <a:spcBef>
+                          <a:spcPts val="0"/>
+                        </a:spcBef>
+                        <a:spcAft>
+                          <a:spcPts val="0"/>
+                        </a:spcAft>
+                        <a:buClrTx/>
+                        <a:buSzTx/>
+                        <a:buFontTx/>
+                        <a:buNone/>
+                        <a:tabLst/>
+                        <a:defRPr/>
+                      </a:pPr>
+                      <a:r>
+                        <a:rPr lang="en-US" baseline="0" dirty="0"/>
+                        <a:t>All technologies w/ carbon tax</a:t>
+                      </a:r>
+                    </a:p>
+                  </a:txBody>
+                  <a:tcPr/>
+                </a:tc>
+                <a:extLst>
+                  <a:ext uri="{0D108BD9-81ED-4DB2-BD59-A6C34878D82A}">
+                    <a16:rowId xmlns:a16="http://schemas.microsoft.com/office/drawing/2014/main" val="1452656216"/>
+                  </a:ext>
+                </a:extLst>
+              </a:tr>
+              <a:tr h="370840">
+                <a:tc>
+                  <a:txBody>
+                    <a:bodyPr/>
+                    <a:lstStyle/>
+                    <a:p>
+                      <a:r>
+                        <a:rPr lang="en-US" dirty="0"/>
                         <a:t>W</a:t>
                       </a:r>
                     </a:p>
@@ -9546,6 +9608,70 @@
                 <a:extLst>
                   <a:ext uri="{0D108BD9-81ED-4DB2-BD59-A6C34878D82A}">
                     <a16:rowId xmlns:a16="http://schemas.microsoft.com/office/drawing/2014/main" val="278724709"/>
+                  </a:ext>
+                </a:extLst>
+              </a:tr>
+              <a:tr h="370840">
+                <a:tc>
+                  <a:txBody>
+                    <a:bodyPr/>
+                    <a:lstStyle/>
+                    <a:p>
+                      <a:r>
+                        <a:rPr lang="en-US" dirty="0"/>
+                        <a:t>A</a:t>
+                      </a:r>
+                    </a:p>
+                  </a:txBody>
+                  <a:tcPr/>
+                </a:tc>
+                <a:tc>
+                  <a:txBody>
+                    <a:bodyPr/>
+                    <a:lstStyle/>
+                    <a:p>
+                      <a:r>
+                        <a:rPr lang="en-US" dirty="0"/>
+                        <a:t>Current Infra w/</a:t>
+                      </a:r>
+                      <a:r>
+                        <a:rPr lang="en-US" baseline="0" dirty="0"/>
+                        <a:t> carbon tax</a:t>
+                      </a:r>
+                    </a:p>
+                  </a:txBody>
+                  <a:tcPr/>
+                </a:tc>
+                <a:extLst>
+                  <a:ext uri="{0D108BD9-81ED-4DB2-BD59-A6C34878D82A}">
+                    <a16:rowId xmlns:a16="http://schemas.microsoft.com/office/drawing/2014/main" val="26666546"/>
+                  </a:ext>
+                </a:extLst>
+              </a:tr>
+              <a:tr h="370840">
+                <a:tc>
+                  <a:txBody>
+                    <a:bodyPr/>
+                    <a:lstStyle/>
+                    <a:p>
+                      <a:endParaRPr lang="en-US" dirty="0"/>
+                    </a:p>
+                  </a:txBody>
+                  <a:tcPr/>
+                </a:tc>
+                <a:tc>
+                  <a:txBody>
+                    <a:bodyPr/>
+                    <a:lstStyle/>
+                    <a:p>
+                      <a:endParaRPr lang="en-US" baseline="0" dirty="0"/>
+                    </a:p>
+                  </a:txBody>
+                  <a:tcPr/>
+                </a:tc>
+                <a:extLst>
+                  <a:ext uri="{0D108BD9-81ED-4DB2-BD59-A6C34878D82A}">
+                    <a16:rowId xmlns:a16="http://schemas.microsoft.com/office/drawing/2014/main" val="2682411585"/>
                   </a:ext>
                 </a:extLst>
               </a:tr>
@@ -9562,14 +9688,14 @@
           <p:nvPr>
             <p:extLst>
               <p:ext uri="{D42A27DB-BD31-4B8C-83A1-F6EECF244321}">
-                <p14:modId xmlns:p14="http://schemas.microsoft.com/office/powerpoint/2010/main" val="1242487649"/>
+                <p14:modId xmlns:p14="http://schemas.microsoft.com/office/powerpoint/2010/main" val="2889483624"/>
               </p:ext>
             </p:extLst>
           </p:nvPr>
         </p:nvGraphicFramePr>
         <p:xfrm>
           <a:off x="4341690" y="9312"/>
-          <a:ext cx="7721649" cy="4363815"/>
+          <a:ext cx="7721649" cy="6109341"/>
         </p:xfrm>
         <a:graphic>
           <a:graphicData uri="http://schemas.openxmlformats.org/drawingml/2006/table">
@@ -9774,7 +9900,7 @@
                     <a:p>
                       <a:r>
                         <a:rPr lang="en-US" sz="1200" dirty="0"/>
-                        <a:t>WA</a:t>
+                        <a:t>V</a:t>
                       </a:r>
                     </a:p>
                   </a:txBody>
@@ -9803,39 +9929,36 @@
                         <a:defRPr/>
                       </a:pPr>
                       <a:r>
+                        <a:rPr lang="en-US" sz="1200" baseline="0" dirty="0"/>
+                        <a:t>All technologies w/ carbon tax</a:t>
+                      </a:r>
+                    </a:p>
+                  </a:txBody>
+                  <a:tcPr/>
+                </a:tc>
+                <a:tc>
+                  <a:txBody>
+                    <a:bodyPr/>
+                    <a:lstStyle/>
+                    <a:p>
+                      <a:r>
                         <a:rPr lang="en-US" sz="1200" dirty="0"/>
-                        <a:t>Current Infra w/o</a:t>
-                      </a:r>
-                      <a:r>
-                        <a:rPr lang="en-US" sz="1200" baseline="0" dirty="0"/>
-                        <a:t> IRP</a:t>
-                      </a:r>
-                    </a:p>
-                  </a:txBody>
-                  <a:tcPr/>
-                </a:tc>
-                <a:tc>
-                  <a:txBody>
-                    <a:bodyPr/>
-                    <a:lstStyle/>
-                    <a:p>
-                      <a:r>
-                        <a:rPr lang="en-US" sz="1200" dirty="0"/>
-                        <a:t>Centralized</a:t>
+                        <a:t>All</a:t>
                       </a:r>
                     </a:p>
                   </a:txBody>
                   <a:tcPr>
                     <a:solidFill>
-                      <a:schemeClr val="bg1">
-                        <a:lumMod val="75000"/>
+                      <a:schemeClr val="accent6">
+                        <a:lumMod val="40000"/>
+                        <a:lumOff val="60000"/>
                       </a:schemeClr>
                     </a:solidFill>
                   </a:tcPr>
                 </a:tc>
                 <a:extLst>
                   <a:ext uri="{0D108BD9-81ED-4DB2-BD59-A6C34878D82A}">
-                    <a16:rowId xmlns:a16="http://schemas.microsoft.com/office/drawing/2014/main" val="4153160432"/>
+                    <a16:rowId xmlns:a16="http://schemas.microsoft.com/office/drawing/2014/main" val="3768440687"/>
                   </a:ext>
                 </a:extLst>
               </a:tr>
@@ -9847,7 +9970,7 @@
                     <a:p>
                       <a:r>
                         <a:rPr lang="en-US" sz="1200" dirty="0"/>
-                        <a:t>WB</a:t>
+                        <a:t>WA</a:t>
                       </a:r>
                     </a:p>
                   </a:txBody>
@@ -9894,6 +10017,79 @@
                     <a:p>
                       <a:r>
                         <a:rPr lang="en-US" sz="1200" dirty="0"/>
+                        <a:t>Centralized</a:t>
+                      </a:r>
+                    </a:p>
+                  </a:txBody>
+                  <a:tcPr>
+                    <a:solidFill>
+                      <a:schemeClr val="bg1">
+                        <a:lumMod val="75000"/>
+                      </a:schemeClr>
+                    </a:solidFill>
+                  </a:tcPr>
+                </a:tc>
+                <a:extLst>
+                  <a:ext uri="{0D108BD9-81ED-4DB2-BD59-A6C34878D82A}">
+                    <a16:rowId xmlns:a16="http://schemas.microsoft.com/office/drawing/2014/main" val="4153160432"/>
+                  </a:ext>
+                </a:extLst>
+              </a:tr>
+              <a:tr h="290921">
+                <a:tc>
+                  <a:txBody>
+                    <a:bodyPr/>
+                    <a:lstStyle/>
+                    <a:p>
+                      <a:r>
+                        <a:rPr lang="en-US" sz="1200" dirty="0"/>
+                        <a:t>WB</a:t>
+                      </a:r>
+                    </a:p>
+                  </a:txBody>
+                  <a:tcPr/>
+                </a:tc>
+                <a:tc>
+                  <a:txBody>
+                    <a:bodyPr/>
+                    <a:lstStyle/>
+                    <a:p>
+                      <a:pPr marL="0" marR="0" indent="0" algn="l" defTabSz="914400" rtl="0" eaLnBrk="1" fontAlgn="auto" latinLnBrk="0" hangingPunct="1">
+                        <a:lnSpc>
+                          <a:spcPct val="100000"/>
+                        </a:lnSpc>
+                        <a:spcBef>
+                          <a:spcPts val="0"/>
+                        </a:spcBef>
+                        <a:spcAft>
+                          <a:spcPts val="0"/>
+                        </a:spcAft>
+                        <a:buClrTx/>
+                        <a:buSzTx/>
+                        <a:buFontTx/>
+                        <a:buNone/>
+                        <a:tabLst/>
+                        <a:defRPr/>
+                      </a:pPr>
+                      <a:r>
+                        <a:rPr lang="en-US" sz="1200" dirty="0"/>
+                        <a:t>Current Infra w/o</a:t>
+                      </a:r>
+                      <a:r>
+                        <a:rPr lang="en-US" sz="1200" baseline="0" dirty="0"/>
+                        <a:t> IRP</a:t>
+                      </a:r>
+                    </a:p>
+                  </a:txBody>
+                  <a:tcPr/>
+                </a:tc>
+                <a:tc>
+                  <a:txBody>
+                    <a:bodyPr/>
+                    <a:lstStyle/>
+                    <a:p>
+                      <a:r>
+                        <a:rPr lang="en-US" sz="1200" dirty="0"/>
                         <a:t>Distributed</a:t>
                       </a:r>
                     </a:p>
@@ -10643,6 +10839,369 @@
                 <a:extLst>
                   <a:ext uri="{0D108BD9-81ED-4DB2-BD59-A6C34878D82A}">
                     <a16:rowId xmlns:a16="http://schemas.microsoft.com/office/drawing/2014/main" val="3826412125"/>
+                  </a:ext>
+                </a:extLst>
+              </a:tr>
+              <a:tr h="290921">
+                <a:tc>
+                  <a:txBody>
+                    <a:bodyPr/>
+                    <a:lstStyle/>
+                    <a:p>
+                      <a:r>
+                        <a:rPr lang="en-US" sz="1200" dirty="0"/>
+                        <a:t>AA</a:t>
+                      </a:r>
+                    </a:p>
+                  </a:txBody>
+                  <a:tcPr/>
+                </a:tc>
+                <a:tc>
+                  <a:txBody>
+                    <a:bodyPr/>
+                    <a:lstStyle/>
+                    <a:p>
+                      <a:pPr marL="0" marR="0" indent="0" algn="l" defTabSz="914400" rtl="0" eaLnBrk="1" fontAlgn="auto" latinLnBrk="0" hangingPunct="1">
+                        <a:lnSpc>
+                          <a:spcPct val="100000"/>
+                        </a:lnSpc>
+                        <a:spcBef>
+                          <a:spcPts val="0"/>
+                        </a:spcBef>
+                        <a:spcAft>
+                          <a:spcPts val="0"/>
+                        </a:spcAft>
+                        <a:buClrTx/>
+                        <a:buSzTx/>
+                        <a:buFontTx/>
+                        <a:buNone/>
+                        <a:tabLst/>
+                        <a:defRPr/>
+                      </a:pPr>
+                      <a:r>
+                        <a:rPr lang="en-US" sz="1200" dirty="0"/>
+                        <a:t>Current Infra w/ carbon tax</a:t>
+                      </a:r>
+                      <a:endParaRPr lang="en-US" sz="1200" baseline="0" dirty="0"/>
+                    </a:p>
+                  </a:txBody>
+                  <a:tcPr/>
+                </a:tc>
+                <a:tc>
+                  <a:txBody>
+                    <a:bodyPr/>
+                    <a:lstStyle/>
+                    <a:p>
+                      <a:r>
+                        <a:rPr lang="en-US" sz="1200" dirty="0"/>
+                        <a:t>Centralized</a:t>
+                      </a:r>
+                    </a:p>
+                  </a:txBody>
+                  <a:tcPr>
+                    <a:solidFill>
+                      <a:schemeClr val="accent2">
+                        <a:lumMod val="60000"/>
+                        <a:lumOff val="40000"/>
+                      </a:schemeClr>
+                    </a:solidFill>
+                  </a:tcPr>
+                </a:tc>
+                <a:extLst>
+                  <a:ext uri="{0D108BD9-81ED-4DB2-BD59-A6C34878D82A}">
+                    <a16:rowId xmlns:a16="http://schemas.microsoft.com/office/drawing/2014/main" val="567620902"/>
+                  </a:ext>
+                </a:extLst>
+              </a:tr>
+              <a:tr h="290921">
+                <a:tc>
+                  <a:txBody>
+                    <a:bodyPr/>
+                    <a:lstStyle/>
+                    <a:p>
+                      <a:r>
+                        <a:rPr lang="en-US" sz="1200" dirty="0"/>
+                        <a:t>AB</a:t>
+                      </a:r>
+                    </a:p>
+                  </a:txBody>
+                  <a:tcPr/>
+                </a:tc>
+                <a:tc>
+                  <a:txBody>
+                    <a:bodyPr/>
+                    <a:lstStyle/>
+                    <a:p>
+                      <a:pPr marL="0" marR="0" indent="0" algn="l" defTabSz="914400" rtl="0" eaLnBrk="1" fontAlgn="auto" latinLnBrk="0" hangingPunct="1">
+                        <a:lnSpc>
+                          <a:spcPct val="100000"/>
+                        </a:lnSpc>
+                        <a:spcBef>
+                          <a:spcPts val="0"/>
+                        </a:spcBef>
+                        <a:spcAft>
+                          <a:spcPts val="0"/>
+                        </a:spcAft>
+                        <a:buClrTx/>
+                        <a:buSzTx/>
+                        <a:buFontTx/>
+                        <a:buNone/>
+                        <a:tabLst/>
+                        <a:defRPr/>
+                      </a:pPr>
+                      <a:r>
+                        <a:rPr lang="en-US" sz="1200" dirty="0"/>
+                        <a:t>Current Infra w/ carbon tax</a:t>
+                      </a:r>
+                      <a:endParaRPr lang="en-US" sz="1200" baseline="0" dirty="0"/>
+                    </a:p>
+                  </a:txBody>
+                  <a:tcPr/>
+                </a:tc>
+                <a:tc>
+                  <a:txBody>
+                    <a:bodyPr/>
+                    <a:lstStyle/>
+                    <a:p>
+                      <a:r>
+                        <a:rPr lang="en-US" sz="1200" dirty="0"/>
+                        <a:t>Distributed</a:t>
+                      </a:r>
+                    </a:p>
+                  </a:txBody>
+                  <a:tcPr>
+                    <a:solidFill>
+                      <a:schemeClr val="accent2">
+                        <a:lumMod val="60000"/>
+                        <a:lumOff val="40000"/>
+                      </a:schemeClr>
+                    </a:solidFill>
+                  </a:tcPr>
+                </a:tc>
+                <a:extLst>
+                  <a:ext uri="{0D108BD9-81ED-4DB2-BD59-A6C34878D82A}">
+                    <a16:rowId xmlns:a16="http://schemas.microsoft.com/office/drawing/2014/main" val="393797061"/>
+                  </a:ext>
+                </a:extLst>
+              </a:tr>
+              <a:tr h="290921">
+                <a:tc>
+                  <a:txBody>
+                    <a:bodyPr/>
+                    <a:lstStyle/>
+                    <a:p>
+                      <a:r>
+                        <a:rPr lang="en-US" sz="1200" dirty="0"/>
+                        <a:t>AD</a:t>
+                      </a:r>
+                    </a:p>
+                  </a:txBody>
+                  <a:tcPr/>
+                </a:tc>
+                <a:tc>
+                  <a:txBody>
+                    <a:bodyPr/>
+                    <a:lstStyle/>
+                    <a:p>
+                      <a:pPr marL="0" marR="0" indent="0" algn="l" defTabSz="914400" rtl="0" eaLnBrk="1" fontAlgn="auto" latinLnBrk="0" hangingPunct="1">
+                        <a:lnSpc>
+                          <a:spcPct val="100000"/>
+                        </a:lnSpc>
+                        <a:spcBef>
+                          <a:spcPts val="0"/>
+                        </a:spcBef>
+                        <a:spcAft>
+                          <a:spcPts val="0"/>
+                        </a:spcAft>
+                        <a:buClrTx/>
+                        <a:buSzTx/>
+                        <a:buFontTx/>
+                        <a:buNone/>
+                        <a:tabLst/>
+                        <a:defRPr/>
+                      </a:pPr>
+                      <a:r>
+                        <a:rPr lang="en-US" sz="1200" dirty="0"/>
+                        <a:t>Current Infra w/ carbon tax</a:t>
+                      </a:r>
+                      <a:endParaRPr lang="en-US" sz="1200" baseline="0" dirty="0"/>
+                    </a:p>
+                  </a:txBody>
+                  <a:tcPr/>
+                </a:tc>
+                <a:tc>
+                  <a:txBody>
+                    <a:bodyPr/>
+                    <a:lstStyle/>
+                    <a:p>
+                      <a:r>
+                        <a:rPr lang="en-US" sz="1200" dirty="0"/>
+                        <a:t>Business-as-usual</a:t>
+                      </a:r>
+                    </a:p>
+                  </a:txBody>
+                  <a:tcPr>
+                    <a:solidFill>
+                      <a:schemeClr val="accent2">
+                        <a:lumMod val="60000"/>
+                        <a:lumOff val="40000"/>
+                      </a:schemeClr>
+                    </a:solidFill>
+                  </a:tcPr>
+                </a:tc>
+                <a:extLst>
+                  <a:ext uri="{0D108BD9-81ED-4DB2-BD59-A6C34878D82A}">
+                    <a16:rowId xmlns:a16="http://schemas.microsoft.com/office/drawing/2014/main" val="2683319738"/>
+                  </a:ext>
+                </a:extLst>
+              </a:tr>
+              <a:tr h="290921">
+                <a:tc>
+                  <a:txBody>
+                    <a:bodyPr/>
+                    <a:lstStyle/>
+                    <a:p>
+                      <a:r>
+                        <a:rPr lang="en-US" sz="1200" dirty="0">
+                          <a:solidFill>
+                            <a:srgbClr val="FF0000"/>
+                          </a:solidFill>
+                        </a:rPr>
+                        <a:t>AE</a:t>
+                      </a:r>
+                    </a:p>
+                  </a:txBody>
+                  <a:tcPr/>
+                </a:tc>
+                <a:tc>
+                  <a:txBody>
+                    <a:bodyPr/>
+                    <a:lstStyle/>
+                    <a:p>
+                      <a:pPr marL="0" marR="0" lvl="0" indent="0" algn="l" defTabSz="914400" rtl="0" eaLnBrk="1" fontAlgn="auto" latinLnBrk="0" hangingPunct="1">
+                        <a:lnSpc>
+                          <a:spcPct val="100000"/>
+                        </a:lnSpc>
+                        <a:spcBef>
+                          <a:spcPts val="0"/>
+                        </a:spcBef>
+                        <a:spcAft>
+                          <a:spcPts val="0"/>
+                        </a:spcAft>
+                        <a:buClrTx/>
+                        <a:buSzTx/>
+                        <a:buFontTx/>
+                        <a:buNone/>
+                        <a:tabLst/>
+                        <a:defRPr/>
+                      </a:pPr>
+                      <a:r>
+                        <a:rPr lang="en-US" sz="1200" dirty="0"/>
+                        <a:t>Current Infra w/ carbon tax</a:t>
+                      </a:r>
+                      <a:endParaRPr lang="en-US" sz="1200" baseline="0" dirty="0"/>
+                    </a:p>
+                  </a:txBody>
+                  <a:tcPr/>
+                </a:tc>
+                <a:tc>
+                  <a:txBody>
+                    <a:bodyPr/>
+                    <a:lstStyle/>
+                    <a:p>
+                      <a:r>
+                        <a:rPr lang="en-US" sz="1200" dirty="0"/>
+                        <a:t>Centralized – natural gas</a:t>
+                      </a:r>
+                    </a:p>
+                  </a:txBody>
+                  <a:tcPr>
+                    <a:solidFill>
+                      <a:schemeClr val="accent2">
+                        <a:lumMod val="60000"/>
+                        <a:lumOff val="40000"/>
+                      </a:schemeClr>
+                    </a:solidFill>
+                  </a:tcPr>
+                </a:tc>
+                <a:extLst>
+                  <a:ext uri="{0D108BD9-81ED-4DB2-BD59-A6C34878D82A}">
+                    <a16:rowId xmlns:a16="http://schemas.microsoft.com/office/drawing/2014/main" val="1699271782"/>
+                  </a:ext>
+                </a:extLst>
+              </a:tr>
+              <a:tr h="290921">
+                <a:tc>
+                  <a:txBody>
+                    <a:bodyPr/>
+                    <a:lstStyle/>
+                    <a:p>
+                      <a:r>
+                        <a:rPr lang="en-US" sz="1200" dirty="0">
+                          <a:solidFill>
+                            <a:srgbClr val="FF0000"/>
+                          </a:solidFill>
+                        </a:rPr>
+                        <a:t>AF</a:t>
+                      </a:r>
+                    </a:p>
+                  </a:txBody>
+                  <a:tcPr/>
+                </a:tc>
+                <a:tc>
+                  <a:txBody>
+                    <a:bodyPr/>
+                    <a:lstStyle/>
+                    <a:p>
+                      <a:pPr marL="0" marR="0" lvl="0" indent="0" algn="l" defTabSz="914400" rtl="0" eaLnBrk="1" fontAlgn="auto" latinLnBrk="0" hangingPunct="1">
+                        <a:lnSpc>
+                          <a:spcPct val="100000"/>
+                        </a:lnSpc>
+                        <a:spcBef>
+                          <a:spcPts val="0"/>
+                        </a:spcBef>
+                        <a:spcAft>
+                          <a:spcPts val="0"/>
+                        </a:spcAft>
+                        <a:buClrTx/>
+                        <a:buSzTx/>
+                        <a:buFontTx/>
+                        <a:buNone/>
+                        <a:tabLst/>
+                        <a:defRPr/>
+                      </a:pPr>
+                      <a:r>
+                        <a:rPr lang="en-US" sz="1200" dirty="0"/>
+                        <a:t>Current Infra w/ carbon tax</a:t>
+                      </a:r>
+                      <a:endParaRPr lang="en-US" sz="1200" baseline="0" dirty="0"/>
+                    </a:p>
+                  </a:txBody>
+                  <a:tcPr/>
+                </a:tc>
+                <a:tc>
+                  <a:txBody>
+                    <a:bodyPr/>
+                    <a:lstStyle/>
+                    <a:p>
+                      <a:r>
+                        <a:rPr lang="en-US" sz="1200" dirty="0"/>
+                        <a:t>Distributed – natural gas</a:t>
+                      </a:r>
+                    </a:p>
+                  </a:txBody>
+                  <a:tcPr>
+                    <a:solidFill>
+                      <a:schemeClr val="accent2">
+                        <a:lumMod val="60000"/>
+                        <a:lumOff val="40000"/>
+                      </a:schemeClr>
+                    </a:solidFill>
+                  </a:tcPr>
+                </a:tc>
+                <a:extLst>
+                  <a:ext uri="{0D108BD9-81ED-4DB2-BD59-A6C34878D82A}">
+                    <a16:rowId xmlns:a16="http://schemas.microsoft.com/office/drawing/2014/main" val="4273235968"/>
                   </a:ext>
                 </a:extLst>
               </a:tr>

</xml_diff>